<commit_message>
Angies figures are at the bottom of Project_Day2_Plots_Angie.ipynb
</commit_message>
<xml_diff>
--- a/Iceland_presentation.pptx
+++ b/Iceland_presentation.pptx
@@ -6,10 +6,15 @@
   </p:sldMasterIdLst>
   <p:sldIdLst>
     <p:sldId id="256" r:id="rId2"/>
-    <p:sldId id="257" r:id="rId3"/>
+    <p:sldId id="261" r:id="rId3"/>
     <p:sldId id="258" r:id="rId4"/>
-    <p:sldId id="259" r:id="rId5"/>
-    <p:sldId id="260" r:id="rId6"/>
+    <p:sldId id="257" r:id="rId5"/>
+    <p:sldId id="259" r:id="rId6"/>
+    <p:sldId id="260" r:id="rId7"/>
+    <p:sldId id="262" r:id="rId8"/>
+    <p:sldId id="263" r:id="rId9"/>
+    <p:sldId id="264" r:id="rId10"/>
+    <p:sldId id="265" r:id="rId11"/>
   </p:sldIdLst>
   <p:sldSz cx="12192000" cy="6858000"/>
   <p:notesSz cx="6858000" cy="9144000"/>
@@ -108,6 +113,11 @@
       </a:defRPr>
     </a:lvl9pPr>
   </p:defaultTextStyle>
+  <p:extLst>
+    <p:ext uri="{EFAFB233-063F-42B5-8137-9DF3F51BA10A}">
+      <p15:sldGuideLst xmlns:p15="http://schemas.microsoft.com/office/powerpoint/2012/main"/>
+    </p:ext>
+  </p:extLst>
 </p:presentation>
 </file>
 
@@ -161,7 +171,7 @@
           <a:noFill/>
           <a:extLst>
             <a:ext uri="{909E8E84-426E-40dd-AFC4-6F175D3DCCD1}">
-              <a14:hiddenFill xmlns:a14="http://schemas.microsoft.com/office/drawing/2010/main" xmlns="">
+              <a14:hiddenFill xmlns="" xmlns:a14="http://schemas.microsoft.com/office/drawing/2010/main">
                 <a:solidFill>
                   <a:srgbClr val="FFFFFF"/>
                 </a:solidFill>
@@ -221,7 +231,7 @@
             </a:ln>
             <a:extLst>
               <a:ext uri="{91240B29-F687-4f45-9708-019B960494DF}">
-                <a14:hiddenLine xmlns:a14="http://schemas.microsoft.com/office/drawing/2010/main" xmlns="" w="9525">
+                <a14:hiddenLine xmlns="" xmlns:a14="http://schemas.microsoft.com/office/drawing/2010/main" w="9525">
                   <a:solidFill>
                     <a:srgbClr val="000000"/>
                   </a:solidFill>
@@ -311,7 +321,7 @@
             </a:ln>
             <a:extLst>
               <a:ext uri="{91240B29-F687-4f45-9708-019B960494DF}">
-                <a14:hiddenLine xmlns:a14="http://schemas.microsoft.com/office/drawing/2010/main" xmlns="" w="9525">
+                <a14:hiddenLine xmlns="" xmlns:a14="http://schemas.microsoft.com/office/drawing/2010/main" w="9525">
                   <a:solidFill>
                     <a:srgbClr val="000000"/>
                   </a:solidFill>
@@ -401,7 +411,7 @@
             </a:ln>
             <a:extLst>
               <a:ext uri="{91240B29-F687-4f45-9708-019B960494DF}">
-                <a14:hiddenLine xmlns:a14="http://schemas.microsoft.com/office/drawing/2010/main" xmlns="" w="9525">
+                <a14:hiddenLine xmlns="" xmlns:a14="http://schemas.microsoft.com/office/drawing/2010/main" w="9525">
                   <a:solidFill>
                     <a:srgbClr val="000000"/>
                   </a:solidFill>
@@ -435,7 +445,7 @@
             </a:ln>
             <a:extLst>
               <a:ext uri="{91240B29-F687-4f45-9708-019B960494DF}">
-                <a14:hiddenLine xmlns:a14="http://schemas.microsoft.com/office/drawing/2010/main" xmlns="" w="9525">
+                <a14:hiddenLine xmlns="" xmlns:a14="http://schemas.microsoft.com/office/drawing/2010/main" w="9525">
                   <a:solidFill>
                     <a:srgbClr val="000000"/>
                   </a:solidFill>
@@ -525,7 +535,7 @@
             </a:ln>
             <a:extLst>
               <a:ext uri="{91240B29-F687-4f45-9708-019B960494DF}">
-                <a14:hiddenLine xmlns:a14="http://schemas.microsoft.com/office/drawing/2010/main" xmlns="" w="9525">
+                <a14:hiddenLine xmlns="" xmlns:a14="http://schemas.microsoft.com/office/drawing/2010/main" w="9525">
                   <a:solidFill>
                     <a:srgbClr val="000000"/>
                   </a:solidFill>
@@ -587,7 +597,7 @@
             </a:ln>
             <a:extLst>
               <a:ext uri="{91240B29-F687-4f45-9708-019B960494DF}">
-                <a14:hiddenLine xmlns:a14="http://schemas.microsoft.com/office/drawing/2010/main" xmlns="" w="9525">
+                <a14:hiddenLine xmlns="" xmlns:a14="http://schemas.microsoft.com/office/drawing/2010/main" w="9525">
                   <a:solidFill>
                     <a:srgbClr val="000000"/>
                   </a:solidFill>
@@ -649,7 +659,7 @@
             </a:ln>
             <a:extLst>
               <a:ext uri="{91240B29-F687-4f45-9708-019B960494DF}">
-                <a14:hiddenLine xmlns:a14="http://schemas.microsoft.com/office/drawing/2010/main" xmlns="" w="9525">
+                <a14:hiddenLine xmlns="" xmlns:a14="http://schemas.microsoft.com/office/drawing/2010/main" w="9525">
                   <a:solidFill>
                     <a:srgbClr val="000000"/>
                   </a:solidFill>
@@ -739,7 +749,7 @@
             </a:ln>
             <a:extLst>
               <a:ext uri="{91240B29-F687-4f45-9708-019B960494DF}">
-                <a14:hiddenLine xmlns:a14="http://schemas.microsoft.com/office/drawing/2010/main" xmlns="" w="9525">
+                <a14:hiddenLine xmlns="" xmlns:a14="http://schemas.microsoft.com/office/drawing/2010/main" w="9525">
                   <a:solidFill>
                     <a:srgbClr val="000000"/>
                   </a:solidFill>
@@ -801,7 +811,7 @@
             </a:ln>
             <a:extLst>
               <a:ext uri="{91240B29-F687-4f45-9708-019B960494DF}">
-                <a14:hiddenLine xmlns:a14="http://schemas.microsoft.com/office/drawing/2010/main" xmlns="" w="9525">
+                <a14:hiddenLine xmlns="" xmlns:a14="http://schemas.microsoft.com/office/drawing/2010/main" w="9525">
                   <a:solidFill>
                     <a:srgbClr val="000000"/>
                   </a:solidFill>
@@ -863,7 +873,7 @@
             </a:ln>
             <a:extLst>
               <a:ext uri="{91240B29-F687-4f45-9708-019B960494DF}">
-                <a14:hiddenLine xmlns:a14="http://schemas.microsoft.com/office/drawing/2010/main" xmlns="" w="9525">
+                <a14:hiddenLine xmlns="" xmlns:a14="http://schemas.microsoft.com/office/drawing/2010/main" w="9525">
                   <a:solidFill>
                     <a:srgbClr val="000000"/>
                   </a:solidFill>
@@ -953,7 +963,7 @@
             </a:ln>
             <a:extLst>
               <a:ext uri="{91240B29-F687-4f45-9708-019B960494DF}">
-                <a14:hiddenLine xmlns:a14="http://schemas.microsoft.com/office/drawing/2010/main" xmlns="" w="9525">
+                <a14:hiddenLine xmlns="" xmlns:a14="http://schemas.microsoft.com/office/drawing/2010/main" w="9525">
                   <a:solidFill>
                     <a:srgbClr val="000000"/>
                   </a:solidFill>
@@ -1043,7 +1053,7 @@
             </a:ln>
             <a:extLst>
               <a:ext uri="{91240B29-F687-4f45-9708-019B960494DF}">
-                <a14:hiddenLine xmlns:a14="http://schemas.microsoft.com/office/drawing/2010/main" xmlns="" w="9525">
+                <a14:hiddenLine xmlns="" xmlns:a14="http://schemas.microsoft.com/office/drawing/2010/main" w="9525">
                   <a:solidFill>
                     <a:srgbClr val="000000"/>
                   </a:solidFill>
@@ -1105,7 +1115,7 @@
             </a:ln>
             <a:extLst>
               <a:ext uri="{91240B29-F687-4f45-9708-019B960494DF}">
-                <a14:hiddenLine xmlns:a14="http://schemas.microsoft.com/office/drawing/2010/main" xmlns="" w="9525">
+                <a14:hiddenLine xmlns="" xmlns:a14="http://schemas.microsoft.com/office/drawing/2010/main" w="9525">
                   <a:solidFill>
                     <a:srgbClr val="000000"/>
                   </a:solidFill>
@@ -1215,7 +1225,7 @@
             </a:ln>
             <a:extLst>
               <a:ext uri="{91240B29-F687-4f45-9708-019B960494DF}">
-                <a14:hiddenLine xmlns:a14="http://schemas.microsoft.com/office/drawing/2010/main" xmlns="" w="9525">
+                <a14:hiddenLine xmlns="" xmlns:a14="http://schemas.microsoft.com/office/drawing/2010/main" w="9525">
                   <a:solidFill>
                     <a:srgbClr val="000000"/>
                   </a:solidFill>
@@ -1277,7 +1287,7 @@
             </a:ln>
             <a:extLst>
               <a:ext uri="{91240B29-F687-4f45-9708-019B960494DF}">
-                <a14:hiddenLine xmlns:a14="http://schemas.microsoft.com/office/drawing/2010/main" xmlns="" w="9525">
+                <a14:hiddenLine xmlns="" xmlns:a14="http://schemas.microsoft.com/office/drawing/2010/main" w="9525">
                   <a:solidFill>
                     <a:srgbClr val="000000"/>
                   </a:solidFill>
@@ -1367,7 +1377,7 @@
             </a:ln>
             <a:extLst>
               <a:ext uri="{91240B29-F687-4f45-9708-019B960494DF}">
-                <a14:hiddenLine xmlns:a14="http://schemas.microsoft.com/office/drawing/2010/main" xmlns="" w="9525">
+                <a14:hiddenLine xmlns="" xmlns:a14="http://schemas.microsoft.com/office/drawing/2010/main" w="9525">
                   <a:solidFill>
                     <a:srgbClr val="000000"/>
                   </a:solidFill>
@@ -1457,7 +1467,7 @@
             </a:ln>
             <a:extLst>
               <a:ext uri="{91240B29-F687-4f45-9708-019B960494DF}">
-                <a14:hiddenLine xmlns:a14="http://schemas.microsoft.com/office/drawing/2010/main" xmlns="" w="9525">
+                <a14:hiddenLine xmlns="" xmlns:a14="http://schemas.microsoft.com/office/drawing/2010/main" w="9525">
                   <a:solidFill>
                     <a:srgbClr val="000000"/>
                   </a:solidFill>
@@ -1519,7 +1529,7 @@
             </a:ln>
             <a:extLst>
               <a:ext uri="{91240B29-F687-4f45-9708-019B960494DF}">
-                <a14:hiddenLine xmlns:a14="http://schemas.microsoft.com/office/drawing/2010/main" xmlns="" w="9525">
+                <a14:hiddenLine xmlns="" xmlns:a14="http://schemas.microsoft.com/office/drawing/2010/main" w="9525">
                   <a:solidFill>
                     <a:srgbClr val="000000"/>
                   </a:solidFill>
@@ -1609,7 +1619,7 @@
             </a:ln>
             <a:extLst>
               <a:ext uri="{91240B29-F687-4f45-9708-019B960494DF}">
-                <a14:hiddenLine xmlns:a14="http://schemas.microsoft.com/office/drawing/2010/main" xmlns="" w="9525">
+                <a14:hiddenLine xmlns="" xmlns:a14="http://schemas.microsoft.com/office/drawing/2010/main" w="9525">
                   <a:solidFill>
                     <a:srgbClr val="000000"/>
                   </a:solidFill>
@@ -1699,7 +1709,7 @@
             </a:ln>
             <a:extLst>
               <a:ext uri="{91240B29-F687-4f45-9708-019B960494DF}">
-                <a14:hiddenLine xmlns:a14="http://schemas.microsoft.com/office/drawing/2010/main" xmlns="" w="9525">
+                <a14:hiddenLine xmlns="" xmlns:a14="http://schemas.microsoft.com/office/drawing/2010/main" w="9525">
                   <a:solidFill>
                     <a:srgbClr val="000000"/>
                   </a:solidFill>
@@ -1755,7 +1765,7 @@
             </a:ln>
             <a:extLst>
               <a:ext uri="{91240B29-F687-4f45-9708-019B960494DF}">
-                <a14:hiddenLine xmlns:a14="http://schemas.microsoft.com/office/drawing/2010/main" xmlns="" w="9525">
+                <a14:hiddenLine xmlns="" xmlns:a14="http://schemas.microsoft.com/office/drawing/2010/main" w="9525">
                   <a:solidFill>
                     <a:srgbClr val="000000"/>
                   </a:solidFill>
@@ -1845,7 +1855,7 @@
             </a:ln>
             <a:extLst>
               <a:ext uri="{91240B29-F687-4f45-9708-019B960494DF}">
-                <a14:hiddenLine xmlns:a14="http://schemas.microsoft.com/office/drawing/2010/main" xmlns="" w="9525">
+                <a14:hiddenLine xmlns="" xmlns:a14="http://schemas.microsoft.com/office/drawing/2010/main" w="9525">
                   <a:solidFill>
                     <a:srgbClr val="000000"/>
                   </a:solidFill>
@@ -1901,7 +1911,7 @@
             </a:ln>
             <a:extLst>
               <a:ext uri="{91240B29-F687-4f45-9708-019B960494DF}">
-                <a14:hiddenLine xmlns:a14="http://schemas.microsoft.com/office/drawing/2010/main" xmlns="" w="9525">
+                <a14:hiddenLine xmlns="" xmlns:a14="http://schemas.microsoft.com/office/drawing/2010/main" w="9525">
                   <a:solidFill>
                     <a:srgbClr val="000000"/>
                   </a:solidFill>
@@ -1991,7 +2001,7 @@
             </a:ln>
             <a:extLst>
               <a:ext uri="{91240B29-F687-4f45-9708-019B960494DF}">
-                <a14:hiddenLine xmlns:a14="http://schemas.microsoft.com/office/drawing/2010/main" xmlns="" w="9525">
+                <a14:hiddenLine xmlns="" xmlns:a14="http://schemas.microsoft.com/office/drawing/2010/main" w="9525">
                   <a:solidFill>
                     <a:srgbClr val="000000"/>
                   </a:solidFill>
@@ -2059,7 +2069,7 @@
             </a:ln>
             <a:extLst>
               <a:ext uri="{91240B29-F687-4f45-9708-019B960494DF}">
-                <a14:hiddenLine xmlns:a14="http://schemas.microsoft.com/office/drawing/2010/main" xmlns="" w="9525">
+                <a14:hiddenLine xmlns="" xmlns:a14="http://schemas.microsoft.com/office/drawing/2010/main" w="9525">
                   <a:solidFill>
                     <a:srgbClr val="000000"/>
                   </a:solidFill>
@@ -2149,7 +2159,7 @@
             </a:ln>
             <a:extLst>
               <a:ext uri="{91240B29-F687-4f45-9708-019B960494DF}">
-                <a14:hiddenLine xmlns:a14="http://schemas.microsoft.com/office/drawing/2010/main" xmlns="" w="9525">
+                <a14:hiddenLine xmlns="" xmlns:a14="http://schemas.microsoft.com/office/drawing/2010/main" w="9525">
                   <a:solidFill>
                     <a:srgbClr val="000000"/>
                   </a:solidFill>
@@ -2217,7 +2227,7 @@
             </a:ln>
             <a:extLst>
               <a:ext uri="{91240B29-F687-4f45-9708-019B960494DF}">
-                <a14:hiddenLine xmlns:a14="http://schemas.microsoft.com/office/drawing/2010/main" xmlns="" w="9525">
+                <a14:hiddenLine xmlns="" xmlns:a14="http://schemas.microsoft.com/office/drawing/2010/main" w="9525">
                   <a:solidFill>
                     <a:srgbClr val="000000"/>
                   </a:solidFill>
@@ -2307,7 +2317,7 @@
             </a:ln>
             <a:extLst>
               <a:ext uri="{91240B29-F687-4f45-9708-019B960494DF}">
-                <a14:hiddenLine xmlns:a14="http://schemas.microsoft.com/office/drawing/2010/main" xmlns="" w="9525">
+                <a14:hiddenLine xmlns="" xmlns:a14="http://schemas.microsoft.com/office/drawing/2010/main" w="9525">
                   <a:solidFill>
                     <a:srgbClr val="000000"/>
                   </a:solidFill>
@@ -2341,7 +2351,7 @@
             </a:ln>
             <a:extLst>
               <a:ext uri="{91240B29-F687-4f45-9708-019B960494DF}">
-                <a14:hiddenLine xmlns:a14="http://schemas.microsoft.com/office/drawing/2010/main" xmlns="" w="9525">
+                <a14:hiddenLine xmlns="" xmlns:a14="http://schemas.microsoft.com/office/drawing/2010/main" w="9525">
                   <a:solidFill>
                     <a:srgbClr val="000000"/>
                   </a:solidFill>
@@ -2431,7 +2441,7 @@
             </a:ln>
             <a:extLst>
               <a:ext uri="{91240B29-F687-4f45-9708-019B960494DF}">
-                <a14:hiddenLine xmlns:a14="http://schemas.microsoft.com/office/drawing/2010/main" xmlns="" w="9525">
+                <a14:hiddenLine xmlns="" xmlns:a14="http://schemas.microsoft.com/office/drawing/2010/main" w="9525">
                   <a:solidFill>
                     <a:srgbClr val="000000"/>
                   </a:solidFill>
@@ -2493,7 +2503,7 @@
             </a:ln>
             <a:extLst>
               <a:ext uri="{91240B29-F687-4f45-9708-019B960494DF}">
-                <a14:hiddenLine xmlns:a14="http://schemas.microsoft.com/office/drawing/2010/main" xmlns="" w="9525">
+                <a14:hiddenLine xmlns="" xmlns:a14="http://schemas.microsoft.com/office/drawing/2010/main" w="9525">
                   <a:solidFill>
                     <a:srgbClr val="000000"/>
                   </a:solidFill>
@@ -2555,7 +2565,7 @@
             </a:ln>
             <a:extLst>
               <a:ext uri="{91240B29-F687-4f45-9708-019B960494DF}">
-                <a14:hiddenLine xmlns:a14="http://schemas.microsoft.com/office/drawing/2010/main" xmlns="" w="9525">
+                <a14:hiddenLine xmlns="" xmlns:a14="http://schemas.microsoft.com/office/drawing/2010/main" w="9525">
                   <a:solidFill>
                     <a:srgbClr val="000000"/>
                   </a:solidFill>
@@ -2645,7 +2655,7 @@
             </a:ln>
             <a:extLst>
               <a:ext uri="{91240B29-F687-4f45-9708-019B960494DF}">
-                <a14:hiddenLine xmlns:a14="http://schemas.microsoft.com/office/drawing/2010/main" xmlns="" w="9525">
+                <a14:hiddenLine xmlns="" xmlns:a14="http://schemas.microsoft.com/office/drawing/2010/main" w="9525">
                   <a:solidFill>
                     <a:srgbClr val="000000"/>
                   </a:solidFill>
@@ -2713,7 +2723,7 @@
             </a:ln>
             <a:extLst>
               <a:ext uri="{91240B29-F687-4f45-9708-019B960494DF}">
-                <a14:hiddenLine xmlns:a14="http://schemas.microsoft.com/office/drawing/2010/main" xmlns="" w="9525">
+                <a14:hiddenLine xmlns="" xmlns:a14="http://schemas.microsoft.com/office/drawing/2010/main" w="9525">
                   <a:solidFill>
                     <a:srgbClr val="000000"/>
                   </a:solidFill>
@@ -2775,7 +2785,7 @@
             </a:ln>
             <a:extLst>
               <a:ext uri="{91240B29-F687-4f45-9708-019B960494DF}">
-                <a14:hiddenLine xmlns:a14="http://schemas.microsoft.com/office/drawing/2010/main" xmlns="" w="9525">
+                <a14:hiddenLine xmlns="" xmlns:a14="http://schemas.microsoft.com/office/drawing/2010/main" w="9525">
                   <a:solidFill>
                     <a:srgbClr val="000000"/>
                   </a:solidFill>
@@ -2865,7 +2875,7 @@
             </a:ln>
             <a:extLst>
               <a:ext uri="{91240B29-F687-4f45-9708-019B960494DF}">
-                <a14:hiddenLine xmlns:a14="http://schemas.microsoft.com/office/drawing/2010/main" xmlns="" w="9525">
+                <a14:hiddenLine xmlns="" xmlns:a14="http://schemas.microsoft.com/office/drawing/2010/main" w="9525">
                   <a:solidFill>
                     <a:srgbClr val="000000"/>
                   </a:solidFill>
@@ -2927,7 +2937,7 @@
             </a:ln>
             <a:extLst>
               <a:ext uri="{91240B29-F687-4f45-9708-019B960494DF}">
-                <a14:hiddenLine xmlns:a14="http://schemas.microsoft.com/office/drawing/2010/main" xmlns="" w="9525">
+                <a14:hiddenLine xmlns="" xmlns:a14="http://schemas.microsoft.com/office/drawing/2010/main" w="9525">
                   <a:solidFill>
                     <a:srgbClr val="000000"/>
                   </a:solidFill>
@@ -3017,7 +3027,7 @@
             </a:ln>
             <a:extLst>
               <a:ext uri="{91240B29-F687-4f45-9708-019B960494DF}">
-                <a14:hiddenLine xmlns:a14="http://schemas.microsoft.com/office/drawing/2010/main" xmlns="" w="9525">
+                <a14:hiddenLine xmlns="" xmlns:a14="http://schemas.microsoft.com/office/drawing/2010/main" w="9525">
                   <a:solidFill>
                     <a:srgbClr val="000000"/>
                   </a:solidFill>
@@ -3079,7 +3089,7 @@
             </a:ln>
             <a:extLst>
               <a:ext uri="{91240B29-F687-4f45-9708-019B960494DF}">
-                <a14:hiddenLine xmlns:a14="http://schemas.microsoft.com/office/drawing/2010/main" xmlns="" w="9525">
+                <a14:hiddenLine xmlns="" xmlns:a14="http://schemas.microsoft.com/office/drawing/2010/main" w="9525">
                   <a:solidFill>
                     <a:srgbClr val="000000"/>
                   </a:solidFill>
@@ -3169,7 +3179,7 @@
             </a:ln>
             <a:extLst>
               <a:ext uri="{91240B29-F687-4f45-9708-019B960494DF}">
-                <a14:hiddenLine xmlns:a14="http://schemas.microsoft.com/office/drawing/2010/main" xmlns="" w="9525">
+                <a14:hiddenLine xmlns="" xmlns:a14="http://schemas.microsoft.com/office/drawing/2010/main" w="9525">
                   <a:solidFill>
                     <a:srgbClr val="000000"/>
                   </a:solidFill>
@@ -3203,7 +3213,7 @@
             </a:ln>
             <a:extLst>
               <a:ext uri="{91240B29-F687-4f45-9708-019B960494DF}">
-                <a14:hiddenLine xmlns:a14="http://schemas.microsoft.com/office/drawing/2010/main" xmlns="" w="9525">
+                <a14:hiddenLine xmlns="" xmlns:a14="http://schemas.microsoft.com/office/drawing/2010/main" w="9525">
                   <a:solidFill>
                     <a:srgbClr val="000000"/>
                   </a:solidFill>
@@ -3268,7 +3278,7 @@
             </a:ln>
             <a:extLst>
               <a:ext uri="{91240B29-F687-4f45-9708-019B960494DF}">
-                <a14:hiddenLine xmlns:a14="http://schemas.microsoft.com/office/drawing/2010/main" xmlns="" w="9525">
+                <a14:hiddenLine xmlns="" xmlns:a14="http://schemas.microsoft.com/office/drawing/2010/main" w="9525">
                   <a:solidFill>
                     <a:srgbClr val="000000"/>
                   </a:solidFill>
@@ -3358,7 +3368,7 @@
             </a:ln>
             <a:extLst>
               <a:ext uri="{91240B29-F687-4f45-9708-019B960494DF}">
-                <a14:hiddenLine xmlns:a14="http://schemas.microsoft.com/office/drawing/2010/main" xmlns="" w="9525">
+                <a14:hiddenLine xmlns="" xmlns:a14="http://schemas.microsoft.com/office/drawing/2010/main" w="9525">
                   <a:solidFill>
                     <a:srgbClr val="000000"/>
                   </a:solidFill>
@@ -3420,7 +3430,7 @@
             </a:ln>
             <a:extLst>
               <a:ext uri="{91240B29-F687-4f45-9708-019B960494DF}">
-                <a14:hiddenLine xmlns:a14="http://schemas.microsoft.com/office/drawing/2010/main" xmlns="" w="9525">
+                <a14:hiddenLine xmlns="" xmlns:a14="http://schemas.microsoft.com/office/drawing/2010/main" w="9525">
                   <a:solidFill>
                     <a:srgbClr val="000000"/>
                   </a:solidFill>
@@ -3510,7 +3520,7 @@
             </a:ln>
             <a:extLst>
               <a:ext uri="{91240B29-F687-4f45-9708-019B960494DF}">
-                <a14:hiddenLine xmlns:a14="http://schemas.microsoft.com/office/drawing/2010/main" xmlns="" w="9525">
+                <a14:hiddenLine xmlns="" xmlns:a14="http://schemas.microsoft.com/office/drawing/2010/main" w="9525">
                   <a:solidFill>
                     <a:srgbClr val="000000"/>
                   </a:solidFill>
@@ -3600,7 +3610,7 @@
             </a:ln>
             <a:extLst>
               <a:ext uri="{91240B29-F687-4f45-9708-019B960494DF}">
-                <a14:hiddenLine xmlns:a14="http://schemas.microsoft.com/office/drawing/2010/main" xmlns="" w="9525">
+                <a14:hiddenLine xmlns="" xmlns:a14="http://schemas.microsoft.com/office/drawing/2010/main" w="9525">
                   <a:solidFill>
                     <a:srgbClr val="000000"/>
                   </a:solidFill>
@@ -3665,7 +3675,7 @@
             </a:ln>
             <a:extLst>
               <a:ext uri="{91240B29-F687-4f45-9708-019B960494DF}">
-                <a14:hiddenLine xmlns:a14="http://schemas.microsoft.com/office/drawing/2010/main" xmlns="" w="9525">
+                <a14:hiddenLine xmlns="" xmlns:a14="http://schemas.microsoft.com/office/drawing/2010/main" w="9525">
                   <a:solidFill>
                     <a:srgbClr val="000000"/>
                   </a:solidFill>
@@ -3727,7 +3737,7 @@
             </a:ln>
             <a:extLst>
               <a:ext uri="{91240B29-F687-4f45-9708-019B960494DF}">
-                <a14:hiddenLine xmlns:a14="http://schemas.microsoft.com/office/drawing/2010/main" xmlns="" w="9525">
+                <a14:hiddenLine xmlns="" xmlns:a14="http://schemas.microsoft.com/office/drawing/2010/main" w="9525">
                   <a:solidFill>
                     <a:srgbClr val="000000"/>
                   </a:solidFill>
@@ -3817,7 +3827,7 @@
             </a:ln>
             <a:extLst>
               <a:ext uri="{91240B29-F687-4f45-9708-019B960494DF}">
-                <a14:hiddenLine xmlns:a14="http://schemas.microsoft.com/office/drawing/2010/main" xmlns="" w="9525">
+                <a14:hiddenLine xmlns="" xmlns:a14="http://schemas.microsoft.com/office/drawing/2010/main" w="9525">
                   <a:solidFill>
                     <a:srgbClr val="000000"/>
                   </a:solidFill>
@@ -3907,7 +3917,7 @@
             </a:ln>
             <a:extLst>
               <a:ext uri="{91240B29-F687-4f45-9708-019B960494DF}">
-                <a14:hiddenLine xmlns:a14="http://schemas.microsoft.com/office/drawing/2010/main" xmlns="" w="9525">
+                <a14:hiddenLine xmlns="" xmlns:a14="http://schemas.microsoft.com/office/drawing/2010/main" w="9525">
                   <a:solidFill>
                     <a:srgbClr val="000000"/>
                   </a:solidFill>
@@ -3969,7 +3979,7 @@
             </a:ln>
             <a:extLst>
               <a:ext uri="{91240B29-F687-4f45-9708-019B960494DF}">
-                <a14:hiddenLine xmlns:a14="http://schemas.microsoft.com/office/drawing/2010/main" xmlns="" w="9525">
+                <a14:hiddenLine xmlns="" xmlns:a14="http://schemas.microsoft.com/office/drawing/2010/main" w="9525">
                   <a:solidFill>
                     <a:srgbClr val="000000"/>
                   </a:solidFill>
@@ -4089,7 +4099,7 @@
             </a:ln>
             <a:extLst>
               <a:ext uri="{91240B29-F687-4f45-9708-019B960494DF}">
-                <a14:hiddenLine xmlns:a14="http://schemas.microsoft.com/office/drawing/2010/main" xmlns="" w="9525">
+                <a14:hiddenLine xmlns="" xmlns:a14="http://schemas.microsoft.com/office/drawing/2010/main" w="9525">
                   <a:solidFill>
                     <a:srgbClr val="000000"/>
                   </a:solidFill>
@@ -4157,7 +4167,7 @@
             </a:ln>
             <a:extLst>
               <a:ext uri="{91240B29-F687-4f45-9708-019B960494DF}">
-                <a14:hiddenLine xmlns:a14="http://schemas.microsoft.com/office/drawing/2010/main" xmlns="" w="9525">
+                <a14:hiddenLine xmlns="" xmlns:a14="http://schemas.microsoft.com/office/drawing/2010/main" w="9525">
                   <a:solidFill>
                     <a:srgbClr val="000000"/>
                   </a:solidFill>
@@ -4247,7 +4257,7 @@
             </a:ln>
             <a:extLst>
               <a:ext uri="{91240B29-F687-4f45-9708-019B960494DF}">
-                <a14:hiddenLine xmlns:a14="http://schemas.microsoft.com/office/drawing/2010/main" xmlns="" w="9525">
+                <a14:hiddenLine xmlns="" xmlns:a14="http://schemas.microsoft.com/office/drawing/2010/main" w="9525">
                   <a:solidFill>
                     <a:srgbClr val="000000"/>
                   </a:solidFill>
@@ -8969,7 +8979,7 @@
           <a:noFill/>
           <a:extLst>
             <a:ext uri="{909E8E84-426E-40dd-AFC4-6F175D3DCCD1}">
-              <a14:hiddenFill xmlns:a14="http://schemas.microsoft.com/office/drawing/2010/main" xmlns="">
+              <a14:hiddenFill xmlns="" xmlns:a14="http://schemas.microsoft.com/office/drawing/2010/main">
                 <a:solidFill>
                   <a:srgbClr val="FFFFFF"/>
                 </a:solidFill>
@@ -9043,7 +9053,7 @@
               </a:ln>
               <a:extLst>
                 <a:ext uri="{91240B29-F687-4f45-9708-019B960494DF}">
-                  <a14:hiddenLine xmlns:a14="http://schemas.microsoft.com/office/drawing/2010/main" xmlns="" w="9525">
+                  <a14:hiddenLine xmlns="" xmlns:a14="http://schemas.microsoft.com/office/drawing/2010/main" w="9525">
                     <a:solidFill>
                       <a:srgbClr val="000000"/>
                     </a:solidFill>
@@ -9133,7 +9143,7 @@
               </a:ln>
               <a:extLst>
                 <a:ext uri="{91240B29-F687-4f45-9708-019B960494DF}">
-                  <a14:hiddenLine xmlns:a14="http://schemas.microsoft.com/office/drawing/2010/main" xmlns="" w="9525">
+                  <a14:hiddenLine xmlns="" xmlns:a14="http://schemas.microsoft.com/office/drawing/2010/main" w="9525">
                     <a:solidFill>
                       <a:srgbClr val="000000"/>
                     </a:solidFill>
@@ -9223,7 +9233,7 @@
               </a:ln>
               <a:extLst>
                 <a:ext uri="{91240B29-F687-4f45-9708-019B960494DF}">
-                  <a14:hiddenLine xmlns:a14="http://schemas.microsoft.com/office/drawing/2010/main" xmlns="" w="9525">
+                  <a14:hiddenLine xmlns="" xmlns:a14="http://schemas.microsoft.com/office/drawing/2010/main" w="9525">
                     <a:solidFill>
                       <a:srgbClr val="000000"/>
                     </a:solidFill>
@@ -9285,7 +9295,7 @@
               </a:ln>
               <a:extLst>
                 <a:ext uri="{91240B29-F687-4f45-9708-019B960494DF}">
-                  <a14:hiddenLine xmlns:a14="http://schemas.microsoft.com/office/drawing/2010/main" xmlns="" w="9525">
+                  <a14:hiddenLine xmlns="" xmlns:a14="http://schemas.microsoft.com/office/drawing/2010/main" w="9525">
                     <a:solidFill>
                       <a:srgbClr val="000000"/>
                     </a:solidFill>
@@ -9375,7 +9385,7 @@
               </a:ln>
               <a:extLst>
                 <a:ext uri="{91240B29-F687-4f45-9708-019B960494DF}">
-                  <a14:hiddenLine xmlns:a14="http://schemas.microsoft.com/office/drawing/2010/main" xmlns="" w="9525">
+                  <a14:hiddenLine xmlns="" xmlns:a14="http://schemas.microsoft.com/office/drawing/2010/main" w="9525">
                     <a:solidFill>
                       <a:srgbClr val="000000"/>
                     </a:solidFill>
@@ -9437,7 +9447,7 @@
               </a:ln>
               <a:extLst>
                 <a:ext uri="{91240B29-F687-4f45-9708-019B960494DF}">
-                  <a14:hiddenLine xmlns:a14="http://schemas.microsoft.com/office/drawing/2010/main" xmlns="" w="9525">
+                  <a14:hiddenLine xmlns="" xmlns:a14="http://schemas.microsoft.com/office/drawing/2010/main" w="9525">
                     <a:solidFill>
                       <a:srgbClr val="000000"/>
                     </a:solidFill>
@@ -9499,7 +9509,7 @@
               </a:ln>
               <a:extLst>
                 <a:ext uri="{91240B29-F687-4f45-9708-019B960494DF}">
-                  <a14:hiddenLine xmlns:a14="http://schemas.microsoft.com/office/drawing/2010/main" xmlns="" w="9525">
+                  <a14:hiddenLine xmlns="" xmlns:a14="http://schemas.microsoft.com/office/drawing/2010/main" w="9525">
                     <a:solidFill>
                       <a:srgbClr val="000000"/>
                     </a:solidFill>
@@ -9589,7 +9599,7 @@
               </a:ln>
               <a:extLst>
                 <a:ext uri="{91240B29-F687-4f45-9708-019B960494DF}">
-                  <a14:hiddenLine xmlns:a14="http://schemas.microsoft.com/office/drawing/2010/main" xmlns="" w="9525">
+                  <a14:hiddenLine xmlns="" xmlns:a14="http://schemas.microsoft.com/office/drawing/2010/main" w="9525">
                     <a:solidFill>
                       <a:srgbClr val="000000"/>
                     </a:solidFill>
@@ -9679,7 +9689,7 @@
               </a:ln>
               <a:extLst>
                 <a:ext uri="{91240B29-F687-4f45-9708-019B960494DF}">
-                  <a14:hiddenLine xmlns:a14="http://schemas.microsoft.com/office/drawing/2010/main" xmlns="" w="9525">
+                  <a14:hiddenLine xmlns="" xmlns:a14="http://schemas.microsoft.com/office/drawing/2010/main" w="9525">
                     <a:solidFill>
                       <a:srgbClr val="000000"/>
                     </a:solidFill>
@@ -9741,7 +9751,7 @@
               </a:ln>
               <a:extLst>
                 <a:ext uri="{91240B29-F687-4f45-9708-019B960494DF}">
-                  <a14:hiddenLine xmlns:a14="http://schemas.microsoft.com/office/drawing/2010/main" xmlns="" w="9525">
+                  <a14:hiddenLine xmlns="" xmlns:a14="http://schemas.microsoft.com/office/drawing/2010/main" w="9525">
                     <a:solidFill>
                       <a:srgbClr val="000000"/>
                     </a:solidFill>
@@ -9851,7 +9861,7 @@
               </a:ln>
               <a:extLst>
                 <a:ext uri="{91240B29-F687-4f45-9708-019B960494DF}">
-                  <a14:hiddenLine xmlns:a14="http://schemas.microsoft.com/office/drawing/2010/main" xmlns="" w="9525">
+                  <a14:hiddenLine xmlns="" xmlns:a14="http://schemas.microsoft.com/office/drawing/2010/main" w="9525">
                     <a:solidFill>
                       <a:srgbClr val="000000"/>
                     </a:solidFill>
@@ -9935,7 +9945,7 @@
               </a:ln>
               <a:extLst>
                 <a:ext uri="{91240B29-F687-4f45-9708-019B960494DF}">
-                  <a14:hiddenLine xmlns:a14="http://schemas.microsoft.com/office/drawing/2010/main" xmlns="" w="9525">
+                  <a14:hiddenLine xmlns="" xmlns:a14="http://schemas.microsoft.com/office/drawing/2010/main" w="9525">
                     <a:solidFill>
                       <a:srgbClr val="000000"/>
                     </a:solidFill>
@@ -9997,7 +10007,7 @@
               </a:ln>
               <a:extLst>
                 <a:ext uri="{91240B29-F687-4f45-9708-019B960494DF}">
-                  <a14:hiddenLine xmlns:a14="http://schemas.microsoft.com/office/drawing/2010/main" xmlns="" w="9525">
+                  <a14:hiddenLine xmlns="" xmlns:a14="http://schemas.microsoft.com/office/drawing/2010/main" w="9525">
                     <a:solidFill>
                       <a:srgbClr val="000000"/>
                     </a:solidFill>
@@ -10059,7 +10069,7 @@
               </a:ln>
               <a:extLst>
                 <a:ext uri="{91240B29-F687-4f45-9708-019B960494DF}">
-                  <a14:hiddenLine xmlns:a14="http://schemas.microsoft.com/office/drawing/2010/main" xmlns="" w="9525">
+                  <a14:hiddenLine xmlns="" xmlns:a14="http://schemas.microsoft.com/office/drawing/2010/main" w="9525">
                     <a:solidFill>
                       <a:srgbClr val="000000"/>
                     </a:solidFill>
@@ -10149,7 +10159,7 @@
               </a:ln>
               <a:extLst>
                 <a:ext uri="{91240B29-F687-4f45-9708-019B960494DF}">
-                  <a14:hiddenLine xmlns:a14="http://schemas.microsoft.com/office/drawing/2010/main" xmlns="" w="9525">
+                  <a14:hiddenLine xmlns="" xmlns:a14="http://schemas.microsoft.com/office/drawing/2010/main" w="9525">
                     <a:solidFill>
                       <a:srgbClr val="000000"/>
                     </a:solidFill>
@@ -10183,7 +10193,7 @@
               </a:ln>
               <a:extLst>
                 <a:ext uri="{91240B29-F687-4f45-9708-019B960494DF}">
-                  <a14:hiddenLine xmlns:a14="http://schemas.microsoft.com/office/drawing/2010/main" xmlns="" w="9525">
+                  <a14:hiddenLine xmlns="" xmlns:a14="http://schemas.microsoft.com/office/drawing/2010/main" w="9525">
                     <a:solidFill>
                       <a:srgbClr val="000000"/>
                     </a:solidFill>
@@ -10248,7 +10258,7 @@
               </a:ln>
               <a:extLst>
                 <a:ext uri="{91240B29-F687-4f45-9708-019B960494DF}">
-                  <a14:hiddenLine xmlns:a14="http://schemas.microsoft.com/office/drawing/2010/main" xmlns="" w="9525">
+                  <a14:hiddenLine xmlns="" xmlns:a14="http://schemas.microsoft.com/office/drawing/2010/main" w="9525">
                     <a:solidFill>
                       <a:srgbClr val="000000"/>
                     </a:solidFill>
@@ -10338,7 +10348,7 @@
               </a:ln>
               <a:extLst>
                 <a:ext uri="{91240B29-F687-4f45-9708-019B960494DF}">
-                  <a14:hiddenLine xmlns:a14="http://schemas.microsoft.com/office/drawing/2010/main" xmlns="" w="9525">
+                  <a14:hiddenLine xmlns="" xmlns:a14="http://schemas.microsoft.com/office/drawing/2010/main" w="9525">
                     <a:solidFill>
                       <a:srgbClr val="000000"/>
                     </a:solidFill>
@@ -10400,7 +10410,7 @@
               </a:ln>
               <a:extLst>
                 <a:ext uri="{91240B29-F687-4f45-9708-019B960494DF}">
-                  <a14:hiddenLine xmlns:a14="http://schemas.microsoft.com/office/drawing/2010/main" xmlns="" w="9525">
+                  <a14:hiddenLine xmlns="" xmlns:a14="http://schemas.microsoft.com/office/drawing/2010/main" w="9525">
                     <a:solidFill>
                       <a:srgbClr val="000000"/>
                     </a:solidFill>
@@ -10490,7 +10500,7 @@
               </a:ln>
               <a:extLst>
                 <a:ext uri="{91240B29-F687-4f45-9708-019B960494DF}">
-                  <a14:hiddenLine xmlns:a14="http://schemas.microsoft.com/office/drawing/2010/main" xmlns="" w="9525">
+                  <a14:hiddenLine xmlns="" xmlns:a14="http://schemas.microsoft.com/office/drawing/2010/main" w="9525">
                     <a:solidFill>
                       <a:srgbClr val="000000"/>
                     </a:solidFill>
@@ -10555,7 +10565,7 @@
               </a:ln>
               <a:extLst>
                 <a:ext uri="{91240B29-F687-4f45-9708-019B960494DF}">
-                  <a14:hiddenLine xmlns:a14="http://schemas.microsoft.com/office/drawing/2010/main" xmlns="" w="9525">
+                  <a14:hiddenLine xmlns="" xmlns:a14="http://schemas.microsoft.com/office/drawing/2010/main" w="9525">
                     <a:solidFill>
                       <a:srgbClr val="000000"/>
                     </a:solidFill>
@@ -10617,7 +10627,7 @@
               </a:ln>
               <a:extLst>
                 <a:ext uri="{91240B29-F687-4f45-9708-019B960494DF}">
-                  <a14:hiddenLine xmlns:a14="http://schemas.microsoft.com/office/drawing/2010/main" xmlns="" w="9525">
+                  <a14:hiddenLine xmlns="" xmlns:a14="http://schemas.microsoft.com/office/drawing/2010/main" w="9525">
                     <a:solidFill>
                       <a:srgbClr val="000000"/>
                     </a:solidFill>
@@ -10707,7 +10717,7 @@
               </a:ln>
               <a:extLst>
                 <a:ext uri="{91240B29-F687-4f45-9708-019B960494DF}">
-                  <a14:hiddenLine xmlns:a14="http://schemas.microsoft.com/office/drawing/2010/main" xmlns="" w="9525">
+                  <a14:hiddenLine xmlns="" xmlns:a14="http://schemas.microsoft.com/office/drawing/2010/main" w="9525">
                     <a:solidFill>
                       <a:srgbClr val="000000"/>
                     </a:solidFill>
@@ -10797,7 +10807,7 @@
               </a:ln>
               <a:extLst>
                 <a:ext uri="{91240B29-F687-4f45-9708-019B960494DF}">
-                  <a14:hiddenLine xmlns:a14="http://schemas.microsoft.com/office/drawing/2010/main" xmlns="" w="9525">
+                  <a14:hiddenLine xmlns="" xmlns:a14="http://schemas.microsoft.com/office/drawing/2010/main" w="9525">
                     <a:solidFill>
                       <a:srgbClr val="000000"/>
                     </a:solidFill>
@@ -10862,7 +10872,7 @@
               </a:ln>
               <a:extLst>
                 <a:ext uri="{91240B29-F687-4f45-9708-019B960494DF}">
-                  <a14:hiddenLine xmlns:a14="http://schemas.microsoft.com/office/drawing/2010/main" xmlns="" w="9525">
+                  <a14:hiddenLine xmlns="" xmlns:a14="http://schemas.microsoft.com/office/drawing/2010/main" w="9525">
                     <a:solidFill>
                       <a:srgbClr val="000000"/>
                     </a:solidFill>
@@ -10982,7 +10992,7 @@
               </a:ln>
               <a:extLst>
                 <a:ext uri="{91240B29-F687-4f45-9708-019B960494DF}">
-                  <a14:hiddenLine xmlns:a14="http://schemas.microsoft.com/office/drawing/2010/main" xmlns="" w="9525">
+                  <a14:hiddenLine xmlns="" xmlns:a14="http://schemas.microsoft.com/office/drawing/2010/main" w="9525">
                     <a:solidFill>
                       <a:srgbClr val="000000"/>
                     </a:solidFill>
@@ -11080,7 +11090,7 @@
               </a:ln>
               <a:extLst>
                 <a:ext uri="{91240B29-F687-4f45-9708-019B960494DF}">
-                  <a14:hiddenLine xmlns:a14="http://schemas.microsoft.com/office/drawing/2010/main" xmlns="" w="9525">
+                  <a14:hiddenLine xmlns="" xmlns:a14="http://schemas.microsoft.com/office/drawing/2010/main" w="9525">
                     <a:solidFill>
                       <a:srgbClr val="000000"/>
                     </a:solidFill>
@@ -11195,7 +11205,7 @@
               </a:ln>
               <a:extLst>
                 <a:ext uri="{91240B29-F687-4f45-9708-019B960494DF}">
-                  <a14:hiddenLine xmlns:a14="http://schemas.microsoft.com/office/drawing/2010/main" xmlns="" w="9525">
+                  <a14:hiddenLine xmlns="" xmlns:a14="http://schemas.microsoft.com/office/drawing/2010/main" w="9525">
                     <a:solidFill>
                       <a:srgbClr val="000000"/>
                     </a:solidFill>
@@ -11285,7 +11295,7 @@
               </a:ln>
               <a:extLst>
                 <a:ext uri="{91240B29-F687-4f45-9708-019B960494DF}">
-                  <a14:hiddenLine xmlns:a14="http://schemas.microsoft.com/office/drawing/2010/main" xmlns="" w="9525">
+                  <a14:hiddenLine xmlns="" xmlns:a14="http://schemas.microsoft.com/office/drawing/2010/main" w="9525">
                     <a:solidFill>
                       <a:srgbClr val="000000"/>
                     </a:solidFill>
@@ -11350,7 +11360,7 @@
               </a:ln>
               <a:extLst>
                 <a:ext uri="{91240B29-F687-4f45-9708-019B960494DF}">
-                  <a14:hiddenLine xmlns:a14="http://schemas.microsoft.com/office/drawing/2010/main" xmlns="" w="9525">
+                  <a14:hiddenLine xmlns="" xmlns:a14="http://schemas.microsoft.com/office/drawing/2010/main" w="9525">
                     <a:solidFill>
                       <a:srgbClr val="000000"/>
                     </a:solidFill>
@@ -11440,7 +11450,7 @@
               </a:ln>
               <a:extLst>
                 <a:ext uri="{91240B29-F687-4f45-9708-019B960494DF}">
-                  <a14:hiddenLine xmlns:a14="http://schemas.microsoft.com/office/drawing/2010/main" xmlns="" w="9525">
+                  <a14:hiddenLine xmlns="" xmlns:a14="http://schemas.microsoft.com/office/drawing/2010/main" w="9525">
                     <a:solidFill>
                       <a:srgbClr val="000000"/>
                     </a:solidFill>
@@ -11508,7 +11518,7 @@
               </a:ln>
               <a:extLst>
                 <a:ext uri="{91240B29-F687-4f45-9708-019B960494DF}">
-                  <a14:hiddenLine xmlns:a14="http://schemas.microsoft.com/office/drawing/2010/main" xmlns="" w="9525">
+                  <a14:hiddenLine xmlns="" xmlns:a14="http://schemas.microsoft.com/office/drawing/2010/main" w="9525">
                     <a:solidFill>
                       <a:srgbClr val="000000"/>
                     </a:solidFill>
@@ -11598,7 +11608,7 @@
               </a:ln>
               <a:extLst>
                 <a:ext uri="{91240B29-F687-4f45-9708-019B960494DF}">
-                  <a14:hiddenLine xmlns:a14="http://schemas.microsoft.com/office/drawing/2010/main" xmlns="" w="9525">
+                  <a14:hiddenLine xmlns="" xmlns:a14="http://schemas.microsoft.com/office/drawing/2010/main" w="9525">
                     <a:solidFill>
                       <a:srgbClr val="000000"/>
                     </a:solidFill>
@@ -11666,7 +11676,7 @@
               </a:ln>
               <a:extLst>
                 <a:ext uri="{91240B29-F687-4f45-9708-019B960494DF}">
-                  <a14:hiddenLine xmlns:a14="http://schemas.microsoft.com/office/drawing/2010/main" xmlns="" w="9525">
+                  <a14:hiddenLine xmlns="" xmlns:a14="http://schemas.microsoft.com/office/drawing/2010/main" w="9525">
                     <a:solidFill>
                       <a:srgbClr val="000000"/>
                     </a:solidFill>
@@ -11756,7 +11766,7 @@
               </a:ln>
               <a:extLst>
                 <a:ext uri="{91240B29-F687-4f45-9708-019B960494DF}">
-                  <a14:hiddenLine xmlns:a14="http://schemas.microsoft.com/office/drawing/2010/main" xmlns="" w="9525">
+                  <a14:hiddenLine xmlns="" xmlns:a14="http://schemas.microsoft.com/office/drawing/2010/main" w="9525">
                     <a:solidFill>
                       <a:srgbClr val="000000"/>
                     </a:solidFill>
@@ -11790,7 +11800,7 @@
               </a:ln>
               <a:extLst>
                 <a:ext uri="{91240B29-F687-4f45-9708-019B960494DF}">
-                  <a14:hiddenLine xmlns:a14="http://schemas.microsoft.com/office/drawing/2010/main" xmlns="" w="9525">
+                  <a14:hiddenLine xmlns="" xmlns:a14="http://schemas.microsoft.com/office/drawing/2010/main" w="9525">
                     <a:solidFill>
                       <a:srgbClr val="000000"/>
                     </a:solidFill>
@@ -12442,6 +12452,114 @@
 </p:sld>
 </file>
 
+<file path=ppt/slides/slide10.xml><?xml version="1.0" encoding="utf-8"?>
+<p:sld xmlns:a="http://schemas.openxmlformats.org/drawingml/2006/main" xmlns:r="http://schemas.openxmlformats.org/officeDocument/2006/relationships" xmlns:p="http://schemas.openxmlformats.org/presentationml/2006/main">
+  <p:cSld>
+    <p:spTree>
+      <p:nvGrpSpPr>
+        <p:cNvPr id="1" name=""/>
+        <p:cNvGrpSpPr/>
+        <p:nvPr/>
+      </p:nvGrpSpPr>
+      <p:grpSpPr>
+        <a:xfrm>
+          <a:off x="0" y="0"/>
+          <a:ext cx="0" cy="0"/>
+          <a:chOff x="0" y="0"/>
+          <a:chExt cx="0" cy="0"/>
+        </a:xfrm>
+      </p:grpSpPr>
+      <p:sp>
+        <p:nvSpPr>
+          <p:cNvPr id="2" name="Title 1">
+            <a:extLst>
+              <a:ext uri="{FF2B5EF4-FFF2-40B4-BE49-F238E27FC236}">
+                <a16:creationId xmlns:a16="http://schemas.microsoft.com/office/drawing/2014/main" id="{A8189972-1D65-46EB-A407-33FE1C96AA38}"/>
+              </a:ext>
+            </a:extLst>
+          </p:cNvPr>
+          <p:cNvSpPr>
+            <a:spLocks noGrp="1"/>
+          </p:cNvSpPr>
+          <p:nvPr>
+            <p:ph type="title"/>
+          </p:nvPr>
+        </p:nvSpPr>
+        <p:spPr/>
+        <p:txBody>
+          <a:bodyPr/>
+          <a:lstStyle/>
+          <a:p>
+            <a:r>
+              <a:rPr lang="en-US" dirty="0"/>
+              <a:t>Clean up</a:t>
+            </a:r>
+          </a:p>
+        </p:txBody>
+      </p:sp>
+      <p:sp>
+        <p:nvSpPr>
+          <p:cNvPr id="3" name="Content Placeholder 2">
+            <a:extLst>
+              <a:ext uri="{FF2B5EF4-FFF2-40B4-BE49-F238E27FC236}">
+                <a16:creationId xmlns:a16="http://schemas.microsoft.com/office/drawing/2014/main" id="{26E7E5DC-18A7-4942-83F1-4AB2EBE4DA88}"/>
+              </a:ext>
+            </a:extLst>
+          </p:cNvPr>
+          <p:cNvSpPr>
+            <a:spLocks noGrp="1"/>
+          </p:cNvSpPr>
+          <p:nvPr>
+            <p:ph sz="half" idx="1"/>
+          </p:nvPr>
+        </p:nvSpPr>
+        <p:spPr/>
+        <p:txBody>
+          <a:bodyPr/>
+          <a:lstStyle/>
+          <a:p>
+            <a:endParaRPr lang="en-US"/>
+          </a:p>
+        </p:txBody>
+      </p:sp>
+      <p:sp>
+        <p:nvSpPr>
+          <p:cNvPr id="4" name="Content Placeholder 3">
+            <a:extLst>
+              <a:ext uri="{FF2B5EF4-FFF2-40B4-BE49-F238E27FC236}">
+                <a16:creationId xmlns:a16="http://schemas.microsoft.com/office/drawing/2014/main" id="{41408F6E-7A57-457A-80FF-E351E083D0C5}"/>
+              </a:ext>
+            </a:extLst>
+          </p:cNvPr>
+          <p:cNvSpPr>
+            <a:spLocks noGrp="1"/>
+          </p:cNvSpPr>
+          <p:nvPr>
+            <p:ph sz="half" idx="2"/>
+          </p:nvPr>
+        </p:nvSpPr>
+        <p:spPr/>
+        <p:txBody>
+          <a:bodyPr/>
+          <a:lstStyle/>
+          <a:p>
+            <a:endParaRPr lang="en-US"/>
+          </a:p>
+        </p:txBody>
+      </p:sp>
+    </p:spTree>
+    <p:extLst>
+      <p:ext uri="{BB962C8B-B14F-4D97-AF65-F5344CB8AC3E}">
+        <p14:creationId xmlns:p14="http://schemas.microsoft.com/office/powerpoint/2010/main" val="2954277170"/>
+      </p:ext>
+    </p:extLst>
+  </p:cSld>
+  <p:clrMapOvr>
+    <a:masterClrMapping/>
+  </p:clrMapOvr>
+</p:sld>
+</file>
+
 <file path=ppt/slides/slide2.xml><?xml version="1.0" encoding="utf-8"?>
 <p:sld xmlns:a="http://schemas.openxmlformats.org/drawingml/2006/main" xmlns:r="http://schemas.openxmlformats.org/officeDocument/2006/relationships" xmlns:p="http://schemas.openxmlformats.org/presentationml/2006/main">
   <p:cSld>
@@ -12464,7 +12582,7 @@
           <p:cNvPr id="2" name="Title 1">
             <a:extLst>
               <a:ext uri="{FF2B5EF4-FFF2-40B4-BE49-F238E27FC236}">
-                <a16:creationId xmlns:a16="http://schemas.microsoft.com/office/drawing/2014/main" id="{0E62FE22-81C4-4B15-824C-CCAF8C8AFB0F}"/>
+                <a16:creationId xmlns:a16="http://schemas.microsoft.com/office/drawing/2014/main" id="{9D9C6B62-56BC-4C8E-B49A-D3549A098141}"/>
               </a:ext>
             </a:extLst>
           </p:cNvPr>
@@ -12481,85 +12599,79 @@
           <a:lstStyle/>
           <a:p>
             <a:r>
+              <a:rPr lang="en-US" dirty="0" err="1"/>
+              <a:t>Euroasian</a:t>
+            </a:r>
+            <a:r>
               <a:rPr lang="en-US" dirty="0"/>
-              <a:t>Main hypothesis:</a:t>
+              <a:t> and N. American tectonic plates</a:t>
             </a:r>
           </a:p>
         </p:txBody>
       </p:sp>
-      <p:sp>
-        <p:nvSpPr>
-          <p:cNvPr id="3" name="Content Placeholder 2">
+      <p:pic>
+        <p:nvPicPr>
+          <p:cNvPr id="5" name="Content Placeholder 4" descr="A close up of a large rock&#10;&#10;Description automatically generated">
             <a:extLst>
               <a:ext uri="{FF2B5EF4-FFF2-40B4-BE49-F238E27FC236}">
-                <a16:creationId xmlns:a16="http://schemas.microsoft.com/office/drawing/2014/main" id="{803DC114-0FB1-45C4-A6EF-DF4023ABC2AB}"/>
+                <a16:creationId xmlns:a16="http://schemas.microsoft.com/office/drawing/2014/main" id="{0BD9A244-C9E7-4335-8435-AB6A643B2FDF}"/>
               </a:ext>
             </a:extLst>
           </p:cNvPr>
-          <p:cNvSpPr>
-            <a:spLocks noGrp="1"/>
-          </p:cNvSpPr>
+          <p:cNvPicPr>
+            <a:picLocks noGrp="1" noChangeAspect="1"/>
+          </p:cNvPicPr>
           <p:nvPr>
             <p:ph idx="1"/>
           </p:nvPr>
-        </p:nvSpPr>
-        <p:spPr/>
-        <p:txBody>
-          <a:bodyPr/>
-          <a:lstStyle/>
-          <a:p>
-            <a:r>
-              <a:rPr lang="en-US" dirty="0"/>
-              <a:t>Is there a specific earthquake severity that impacts the following areas:</a:t>
-            </a:r>
-          </a:p>
-          <a:p>
-            <a:pPr lvl="1"/>
-            <a:r>
-              <a:rPr lang="en-US" dirty="0"/>
-              <a:t>Economic impact</a:t>
-            </a:r>
-          </a:p>
-          <a:p>
-            <a:pPr lvl="1"/>
-            <a:r>
-              <a:rPr lang="en-US" dirty="0"/>
-              <a:t>CO</a:t>
-            </a:r>
-            <a:r>
-              <a:rPr lang="en-US" baseline="-25000" dirty="0"/>
-              <a:t>2</a:t>
-            </a:r>
-            <a:r>
-              <a:rPr lang="en-US" dirty="0"/>
-              <a:t> </a:t>
-            </a:r>
-            <a:r>
-              <a:rPr lang="en-US" dirty="0" err="1"/>
-              <a:t>Emmissions</a:t>
-            </a:r>
-            <a:endParaRPr lang="en-US" dirty="0"/>
-          </a:p>
-          <a:p>
-            <a:pPr lvl="1"/>
-            <a:r>
-              <a:rPr lang="en-US" dirty="0"/>
-              <a:t>Life expectancy</a:t>
-            </a:r>
-          </a:p>
-          <a:p>
-            <a:pPr lvl="1"/>
-            <a:r>
-              <a:rPr lang="en-US" dirty="0"/>
-              <a:t>Population</a:t>
-            </a:r>
-          </a:p>
-        </p:txBody>
-      </p:sp>
+        </p:nvPicPr>
+        <p:blipFill>
+          <a:blip r:embed="rId2"/>
+          <a:stretch>
+            <a:fillRect/>
+          </a:stretch>
+        </p:blipFill>
+        <p:spPr>
+          <a:xfrm>
+            <a:off x="6313623" y="1812165"/>
+            <a:ext cx="2656284" cy="3541712"/>
+          </a:xfrm>
+        </p:spPr>
+      </p:pic>
+      <p:pic>
+        <p:nvPicPr>
+          <p:cNvPr id="7" name="Picture 6" descr="A picture containing outdoor, building, beach, water&#10;&#10;Description automatically generated">
+            <a:extLst>
+              <a:ext uri="{FF2B5EF4-FFF2-40B4-BE49-F238E27FC236}">
+                <a16:creationId xmlns:a16="http://schemas.microsoft.com/office/drawing/2014/main" id="{0333C3C4-686B-4518-9686-B186DBCD91B7}"/>
+              </a:ext>
+            </a:extLst>
+          </p:cNvPr>
+          <p:cNvPicPr>
+            <a:picLocks noChangeAspect="1"/>
+          </p:cNvPicPr>
+          <p:nvPr/>
+        </p:nvPicPr>
+        <p:blipFill>
+          <a:blip r:embed="rId3"/>
+          <a:stretch>
+            <a:fillRect/>
+          </a:stretch>
+        </p:blipFill>
+        <p:spPr>
+          <a:xfrm>
+            <a:off x="1950703" y="1812165"/>
+            <a:ext cx="3927676" cy="2945757"/>
+          </a:xfrm>
+          <a:prstGeom prst="rect">
+            <a:avLst/>
+          </a:prstGeom>
+        </p:spPr>
+      </p:pic>
     </p:spTree>
     <p:extLst>
       <p:ext uri="{BB962C8B-B14F-4D97-AF65-F5344CB8AC3E}">
-        <p14:creationId xmlns:p14="http://schemas.microsoft.com/office/powerpoint/2010/main" val="84233359"/>
+        <p14:creationId xmlns:p14="http://schemas.microsoft.com/office/powerpoint/2010/main" val="1763723692"/>
       </p:ext>
     </p:extLst>
   </p:cSld>
@@ -12786,6 +12898,427 @@
           <p:cNvPr id="2" name="Title 1">
             <a:extLst>
               <a:ext uri="{FF2B5EF4-FFF2-40B4-BE49-F238E27FC236}">
+                <a16:creationId xmlns:a16="http://schemas.microsoft.com/office/drawing/2014/main" id="{0E62FE22-81C4-4B15-824C-CCAF8C8AFB0F}"/>
+              </a:ext>
+            </a:extLst>
+          </p:cNvPr>
+          <p:cNvSpPr>
+            <a:spLocks noGrp="1"/>
+          </p:cNvSpPr>
+          <p:nvPr>
+            <p:ph type="title"/>
+          </p:nvPr>
+        </p:nvSpPr>
+        <p:spPr>
+          <a:xfrm>
+            <a:off x="1283179" y="3269321"/>
+            <a:ext cx="9905998" cy="1133065"/>
+          </a:xfrm>
+        </p:spPr>
+        <p:txBody>
+          <a:bodyPr/>
+          <a:lstStyle/>
+          <a:p>
+            <a:r>
+              <a:rPr lang="en-US" dirty="0"/>
+              <a:t>Alternative hypothesis:</a:t>
+            </a:r>
+          </a:p>
+        </p:txBody>
+      </p:sp>
+      <p:sp>
+        <p:nvSpPr>
+          <p:cNvPr id="3" name="Content Placeholder 2">
+            <a:extLst>
+              <a:ext uri="{FF2B5EF4-FFF2-40B4-BE49-F238E27FC236}">
+                <a16:creationId xmlns:a16="http://schemas.microsoft.com/office/drawing/2014/main" id="{803DC114-0FB1-45C4-A6EF-DF4023ABC2AB}"/>
+              </a:ext>
+            </a:extLst>
+          </p:cNvPr>
+          <p:cNvSpPr>
+            <a:spLocks noGrp="1"/>
+          </p:cNvSpPr>
+          <p:nvPr>
+            <p:ph idx="1"/>
+          </p:nvPr>
+        </p:nvSpPr>
+        <p:spPr>
+          <a:xfrm>
+            <a:off x="1283179" y="4074889"/>
+            <a:ext cx="10458709" cy="1971639"/>
+          </a:xfrm>
+        </p:spPr>
+        <p:txBody>
+          <a:bodyPr>
+            <a:normAutofit fontScale="92500" lnSpcReduction="20000"/>
+          </a:bodyPr>
+          <a:lstStyle/>
+          <a:p>
+            <a:pPr marL="0" indent="0">
+              <a:buNone/>
+            </a:pPr>
+            <a:r>
+              <a:rPr lang="en-US" dirty="0"/>
+              <a:t>Earthquakes of magnitude 6.1or higher have greater than 3% impact on the following economic areas:</a:t>
+            </a:r>
+          </a:p>
+          <a:p>
+            <a:pPr lvl="1"/>
+            <a:r>
+              <a:rPr lang="en-US" dirty="0"/>
+              <a:t>Gross Domestic Product</a:t>
+            </a:r>
+          </a:p>
+          <a:p>
+            <a:pPr lvl="1"/>
+            <a:r>
+              <a:rPr lang="en-US" dirty="0"/>
+              <a:t>Trade</a:t>
+            </a:r>
+          </a:p>
+          <a:p>
+            <a:pPr lvl="1"/>
+            <a:r>
+              <a:rPr lang="en-US" dirty="0"/>
+              <a:t>Manufactures exports</a:t>
+            </a:r>
+          </a:p>
+          <a:p>
+            <a:pPr marL="457200" lvl="1" indent="0">
+              <a:buNone/>
+            </a:pPr>
+            <a:endParaRPr lang="en-US" dirty="0"/>
+          </a:p>
+        </p:txBody>
+      </p:sp>
+      <p:sp>
+        <p:nvSpPr>
+          <p:cNvPr id="4" name="Title 1">
+            <a:extLst>
+              <a:ext uri="{FF2B5EF4-FFF2-40B4-BE49-F238E27FC236}">
+                <a16:creationId xmlns:a16="http://schemas.microsoft.com/office/drawing/2014/main" id="{8FF6E97B-5CA4-45B9-BF72-D381EEF22D53}"/>
+              </a:ext>
+            </a:extLst>
+          </p:cNvPr>
+          <p:cNvSpPr txBox="1">
+            <a:spLocks/>
+          </p:cNvSpPr>
+          <p:nvPr/>
+        </p:nvSpPr>
+        <p:spPr>
+          <a:xfrm>
+            <a:off x="1417767" y="521917"/>
+            <a:ext cx="9905998" cy="1478570"/>
+          </a:xfrm>
+          <a:prstGeom prst="rect">
+            <a:avLst/>
+          </a:prstGeom>
+        </p:spPr>
+        <p:txBody>
+          <a:bodyPr vert="horz" lIns="91440" tIns="45720" rIns="91440" bIns="45720" rtlCol="0" anchor="ctr">
+            <a:normAutofit/>
+          </a:bodyPr>
+          <a:lstStyle>
+            <a:lvl1pPr algn="l" defTabSz="914400" rtl="0" eaLnBrk="1" latinLnBrk="0" hangingPunct="1">
+              <a:lnSpc>
+                <a:spcPct val="90000"/>
+              </a:lnSpc>
+              <a:spcBef>
+                <a:spcPct val="0"/>
+              </a:spcBef>
+              <a:buNone/>
+              <a:defRPr sz="3600" kern="1200" cap="all" baseline="0">
+                <a:solidFill>
+                  <a:schemeClr val="tx1"/>
+                </a:solidFill>
+                <a:latin typeface="+mj-lt"/>
+                <a:ea typeface="+mj-ea"/>
+                <a:cs typeface="+mj-cs"/>
+              </a:defRPr>
+            </a:lvl1pPr>
+          </a:lstStyle>
+          <a:p>
+            <a:r>
+              <a:rPr lang="en-US" dirty="0"/>
+              <a:t>Null hypothesis:</a:t>
+            </a:r>
+          </a:p>
+        </p:txBody>
+      </p:sp>
+      <p:sp>
+        <p:nvSpPr>
+          <p:cNvPr id="5" name="Content Placeholder 2">
+            <a:extLst>
+              <a:ext uri="{FF2B5EF4-FFF2-40B4-BE49-F238E27FC236}">
+                <a16:creationId xmlns:a16="http://schemas.microsoft.com/office/drawing/2014/main" id="{26DAC622-064E-409E-AA5D-9754D2139031}"/>
+              </a:ext>
+            </a:extLst>
+          </p:cNvPr>
+          <p:cNvSpPr txBox="1">
+            <a:spLocks/>
+          </p:cNvSpPr>
+          <p:nvPr/>
+        </p:nvSpPr>
+        <p:spPr>
+          <a:xfrm>
+            <a:off x="1283180" y="1567042"/>
+            <a:ext cx="10458709" cy="1819243"/>
+          </a:xfrm>
+          <a:prstGeom prst="rect">
+            <a:avLst/>
+          </a:prstGeom>
+        </p:spPr>
+        <p:txBody>
+          <a:bodyPr vert="horz" lIns="91440" tIns="45720" rIns="91440" bIns="45720" rtlCol="0">
+            <a:normAutofit fontScale="85000" lnSpcReduction="10000"/>
+          </a:bodyPr>
+          <a:lstStyle>
+            <a:lvl1pPr marL="228600" indent="-228600" algn="l" defTabSz="914400" rtl="0" eaLnBrk="1" latinLnBrk="0" hangingPunct="1">
+              <a:lnSpc>
+                <a:spcPct val="120000"/>
+              </a:lnSpc>
+              <a:spcBef>
+                <a:spcPts val="1000"/>
+              </a:spcBef>
+              <a:buSzPct val="125000"/>
+              <a:buFont typeface="Arial" panose="020B0604020202020204" pitchFamily="34" charset="0"/>
+              <a:buChar char="•"/>
+              <a:defRPr sz="2400" kern="1200">
+                <a:solidFill>
+                  <a:schemeClr val="tx1"/>
+                </a:solidFill>
+                <a:latin typeface="+mn-lt"/>
+                <a:ea typeface="+mn-ea"/>
+                <a:cs typeface="+mn-cs"/>
+              </a:defRPr>
+            </a:lvl1pPr>
+            <a:lvl2pPr marL="685800" indent="-228600" algn="l" defTabSz="914400" rtl="0" eaLnBrk="1" latinLnBrk="0" hangingPunct="1">
+              <a:lnSpc>
+                <a:spcPct val="120000"/>
+              </a:lnSpc>
+              <a:spcBef>
+                <a:spcPts val="500"/>
+              </a:spcBef>
+              <a:buSzPct val="125000"/>
+              <a:buFont typeface="Arial" panose="020B0604020202020204" pitchFamily="34" charset="0"/>
+              <a:buChar char="•"/>
+              <a:defRPr sz="2000" kern="1200">
+                <a:solidFill>
+                  <a:schemeClr val="tx1"/>
+                </a:solidFill>
+                <a:latin typeface="+mn-lt"/>
+                <a:ea typeface="+mn-ea"/>
+                <a:cs typeface="+mn-cs"/>
+              </a:defRPr>
+            </a:lvl2pPr>
+            <a:lvl3pPr marL="1143000" indent="-228600" algn="l" defTabSz="914400" rtl="0" eaLnBrk="1" latinLnBrk="0" hangingPunct="1">
+              <a:lnSpc>
+                <a:spcPct val="120000"/>
+              </a:lnSpc>
+              <a:spcBef>
+                <a:spcPts val="500"/>
+              </a:spcBef>
+              <a:buSzPct val="125000"/>
+              <a:buFont typeface="Arial" panose="020B0604020202020204" pitchFamily="34" charset="0"/>
+              <a:buChar char="•"/>
+              <a:defRPr sz="1800" kern="1200">
+                <a:solidFill>
+                  <a:schemeClr val="tx1"/>
+                </a:solidFill>
+                <a:latin typeface="+mn-lt"/>
+                <a:ea typeface="+mn-ea"/>
+                <a:cs typeface="+mn-cs"/>
+              </a:defRPr>
+            </a:lvl3pPr>
+            <a:lvl4pPr marL="1600200" indent="-228600" algn="l" defTabSz="914400" rtl="0" eaLnBrk="1" latinLnBrk="0" hangingPunct="1">
+              <a:lnSpc>
+                <a:spcPct val="120000"/>
+              </a:lnSpc>
+              <a:spcBef>
+                <a:spcPts val="500"/>
+              </a:spcBef>
+              <a:buSzPct val="125000"/>
+              <a:buFont typeface="Arial" panose="020B0604020202020204" pitchFamily="34" charset="0"/>
+              <a:buChar char="•"/>
+              <a:defRPr sz="1600" kern="1200">
+                <a:solidFill>
+                  <a:schemeClr val="tx1"/>
+                </a:solidFill>
+                <a:latin typeface="+mn-lt"/>
+                <a:ea typeface="+mn-ea"/>
+                <a:cs typeface="+mn-cs"/>
+              </a:defRPr>
+            </a:lvl4pPr>
+            <a:lvl5pPr marL="2057400" indent="-228600" algn="l" defTabSz="914400" rtl="0" eaLnBrk="1" latinLnBrk="0" hangingPunct="1">
+              <a:lnSpc>
+                <a:spcPct val="120000"/>
+              </a:lnSpc>
+              <a:spcBef>
+                <a:spcPts val="500"/>
+              </a:spcBef>
+              <a:buSzPct val="125000"/>
+              <a:buFont typeface="Arial" panose="020B0604020202020204" pitchFamily="34" charset="0"/>
+              <a:buChar char="•"/>
+              <a:defRPr sz="1600" kern="1200">
+                <a:solidFill>
+                  <a:schemeClr val="tx1"/>
+                </a:solidFill>
+                <a:latin typeface="+mn-lt"/>
+                <a:ea typeface="+mn-ea"/>
+                <a:cs typeface="+mn-cs"/>
+              </a:defRPr>
+            </a:lvl5pPr>
+            <a:lvl6pPr marL="2514600" indent="-228600" algn="l" defTabSz="914400" rtl="0" eaLnBrk="1" latinLnBrk="0" hangingPunct="1">
+              <a:lnSpc>
+                <a:spcPct val="120000"/>
+              </a:lnSpc>
+              <a:spcBef>
+                <a:spcPts val="500"/>
+              </a:spcBef>
+              <a:buSzPct val="125000"/>
+              <a:buFont typeface="Arial" panose="020B0604020202020204" pitchFamily="34" charset="0"/>
+              <a:buChar char="•"/>
+              <a:defRPr sz="1400" kern="1200">
+                <a:solidFill>
+                  <a:schemeClr val="tx1"/>
+                </a:solidFill>
+                <a:latin typeface="+mn-lt"/>
+                <a:ea typeface="+mn-ea"/>
+                <a:cs typeface="+mn-cs"/>
+              </a:defRPr>
+            </a:lvl6pPr>
+            <a:lvl7pPr marL="2971800" indent="-228600" algn="l" defTabSz="914400" rtl="0" eaLnBrk="1" latinLnBrk="0" hangingPunct="1">
+              <a:lnSpc>
+                <a:spcPct val="120000"/>
+              </a:lnSpc>
+              <a:spcBef>
+                <a:spcPts val="500"/>
+              </a:spcBef>
+              <a:buSzPct val="125000"/>
+              <a:buFont typeface="Arial" panose="020B0604020202020204" pitchFamily="34" charset="0"/>
+              <a:buChar char="•"/>
+              <a:defRPr sz="1400" kern="1200">
+                <a:solidFill>
+                  <a:schemeClr val="tx1"/>
+                </a:solidFill>
+                <a:latin typeface="+mn-lt"/>
+                <a:ea typeface="+mn-ea"/>
+                <a:cs typeface="+mn-cs"/>
+              </a:defRPr>
+            </a:lvl7pPr>
+            <a:lvl8pPr marL="3429000" indent="-228600" algn="l" defTabSz="914400" rtl="0" eaLnBrk="1" latinLnBrk="0" hangingPunct="1">
+              <a:lnSpc>
+                <a:spcPct val="120000"/>
+              </a:lnSpc>
+              <a:spcBef>
+                <a:spcPts val="500"/>
+              </a:spcBef>
+              <a:buSzPct val="125000"/>
+              <a:buFont typeface="Arial" panose="020B0604020202020204" pitchFamily="34" charset="0"/>
+              <a:buChar char="•"/>
+              <a:defRPr sz="1400" kern="1200">
+                <a:solidFill>
+                  <a:schemeClr val="tx1"/>
+                </a:solidFill>
+                <a:latin typeface="+mn-lt"/>
+                <a:ea typeface="+mn-ea"/>
+                <a:cs typeface="+mn-cs"/>
+              </a:defRPr>
+            </a:lvl8pPr>
+            <a:lvl9pPr marL="3886200" indent="-228600" algn="l" defTabSz="914400" rtl="0" eaLnBrk="1" latinLnBrk="0" hangingPunct="1">
+              <a:lnSpc>
+                <a:spcPct val="120000"/>
+              </a:lnSpc>
+              <a:spcBef>
+                <a:spcPts val="500"/>
+              </a:spcBef>
+              <a:buSzPct val="125000"/>
+              <a:buFont typeface="Arial" panose="020B0604020202020204" pitchFamily="34" charset="0"/>
+              <a:buChar char="•"/>
+              <a:defRPr sz="1400" kern="1200">
+                <a:solidFill>
+                  <a:schemeClr val="tx1"/>
+                </a:solidFill>
+                <a:latin typeface="+mn-lt"/>
+                <a:ea typeface="+mn-ea"/>
+                <a:cs typeface="+mn-cs"/>
+              </a:defRPr>
+            </a:lvl9pPr>
+          </a:lstStyle>
+          <a:p>
+            <a:pPr marL="0" indent="0">
+              <a:buNone/>
+            </a:pPr>
+            <a:r>
+              <a:rPr lang="en-US" dirty="0"/>
+              <a:t>If earthquakes are not related to economic outcomes, then earthquakes over 6.1 magnitude would not have an effect on:</a:t>
+            </a:r>
+          </a:p>
+          <a:p>
+            <a:pPr lvl="1"/>
+            <a:r>
+              <a:rPr lang="en-US" dirty="0"/>
+              <a:t>Gross Domestic Product</a:t>
+            </a:r>
+          </a:p>
+          <a:p>
+            <a:pPr lvl="1"/>
+            <a:r>
+              <a:rPr lang="en-US" dirty="0"/>
+              <a:t>Trade</a:t>
+            </a:r>
+          </a:p>
+          <a:p>
+            <a:pPr lvl="1"/>
+            <a:r>
+              <a:rPr lang="en-US" dirty="0"/>
+              <a:t>Manufactures exports</a:t>
+            </a:r>
+          </a:p>
+          <a:p>
+            <a:pPr marL="457200" lvl="1" indent="0">
+              <a:buFont typeface="Arial" panose="020B0604020202020204" pitchFamily="34" charset="0"/>
+              <a:buNone/>
+            </a:pPr>
+            <a:endParaRPr lang="en-US" dirty="0"/>
+          </a:p>
+        </p:txBody>
+      </p:sp>
+    </p:spTree>
+    <p:extLst>
+      <p:ext uri="{BB962C8B-B14F-4D97-AF65-F5344CB8AC3E}">
+        <p14:creationId xmlns:p14="http://schemas.microsoft.com/office/powerpoint/2010/main" val="84233359"/>
+      </p:ext>
+    </p:extLst>
+  </p:cSld>
+  <p:clrMapOvr>
+    <a:masterClrMapping/>
+  </p:clrMapOvr>
+</p:sld>
+</file>
+
+<file path=ppt/slides/slide5.xml><?xml version="1.0" encoding="utf-8"?>
+<p:sld xmlns:a="http://schemas.openxmlformats.org/drawingml/2006/main" xmlns:r="http://schemas.openxmlformats.org/officeDocument/2006/relationships" xmlns:p="http://schemas.openxmlformats.org/presentationml/2006/main">
+  <p:cSld>
+    <p:spTree>
+      <p:nvGrpSpPr>
+        <p:cNvPr id="1" name=""/>
+        <p:cNvGrpSpPr/>
+        <p:nvPr/>
+      </p:nvGrpSpPr>
+      <p:grpSpPr>
+        <a:xfrm>
+          <a:off x="0" y="0"/>
+          <a:ext cx="0" cy="0"/>
+          <a:chOff x="0" y="0"/>
+          <a:chExt cx="0" cy="0"/>
+        </a:xfrm>
+      </p:grpSpPr>
+      <p:sp>
+        <p:nvSpPr>
+          <p:cNvPr id="2" name="Title 1">
+            <a:extLst>
+              <a:ext uri="{FF2B5EF4-FFF2-40B4-BE49-F238E27FC236}">
                 <a16:creationId xmlns:a16="http://schemas.microsoft.com/office/drawing/2014/main" id="{3C07F05E-FDEE-4AB6-8634-BD793A8DCC28}"/>
               </a:ext>
             </a:extLst>
@@ -12858,7 +13391,7 @@
 </p:sld>
 </file>
 
-<file path=ppt/slides/slide5.xml><?xml version="1.0" encoding="utf-8"?>
+<file path=ppt/slides/slide6.xml><?xml version="1.0" encoding="utf-8"?>
 <p:sld xmlns:a="http://schemas.openxmlformats.org/drawingml/2006/main" xmlns:r="http://schemas.openxmlformats.org/officeDocument/2006/relationships" xmlns:p="http://schemas.openxmlformats.org/presentationml/2006/main">
   <p:cSld>
     <p:spTree>
@@ -12929,7 +13462,7 @@
         </p:blipFill>
         <p:spPr>
           <a:xfrm>
-            <a:off x="1371600" y="2097088"/>
+            <a:off x="1570219" y="1969496"/>
             <a:ext cx="4093240" cy="3251089"/>
           </a:xfrm>
           <a:prstGeom prst="rect">
@@ -12959,7 +13492,7 @@
         </p:blipFill>
         <p:spPr>
           <a:xfrm>
-            <a:off x="5530700" y="2097088"/>
+            <a:off x="5913474" y="1969496"/>
             <a:ext cx="4578999" cy="3251089"/>
           </a:xfrm>
           <a:prstGeom prst="rect">
@@ -12971,6 +13504,368 @@
     <p:extLst>
       <p:ext uri="{BB962C8B-B14F-4D97-AF65-F5344CB8AC3E}">
         <p14:creationId xmlns:p14="http://schemas.microsoft.com/office/powerpoint/2010/main" val="4145574329"/>
+      </p:ext>
+    </p:extLst>
+  </p:cSld>
+  <p:clrMapOvr>
+    <a:masterClrMapping/>
+  </p:clrMapOvr>
+</p:sld>
+</file>
+
+<file path=ppt/slides/slide7.xml><?xml version="1.0" encoding="utf-8"?>
+<p:sld xmlns:a="http://schemas.openxmlformats.org/drawingml/2006/main" xmlns:r="http://schemas.openxmlformats.org/officeDocument/2006/relationships" xmlns:p="http://schemas.openxmlformats.org/presentationml/2006/main">
+  <p:cSld>
+    <p:spTree>
+      <p:nvGrpSpPr>
+        <p:cNvPr id="1" name=""/>
+        <p:cNvGrpSpPr/>
+        <p:nvPr/>
+      </p:nvGrpSpPr>
+      <p:grpSpPr>
+        <a:xfrm>
+          <a:off x="0" y="0"/>
+          <a:ext cx="0" cy="0"/>
+          <a:chOff x="0" y="0"/>
+          <a:chExt cx="0" cy="0"/>
+        </a:xfrm>
+      </p:grpSpPr>
+      <p:sp>
+        <p:nvSpPr>
+          <p:cNvPr id="2" name="Title 1">
+            <a:extLst>
+              <a:ext uri="{FF2B5EF4-FFF2-40B4-BE49-F238E27FC236}">
+                <a16:creationId xmlns:a16="http://schemas.microsoft.com/office/drawing/2014/main" id="{4C424987-7F65-4A44-BF9E-C0C1427E7628}"/>
+              </a:ext>
+            </a:extLst>
+          </p:cNvPr>
+          <p:cNvSpPr>
+            <a:spLocks noGrp="1"/>
+          </p:cNvSpPr>
+          <p:nvPr>
+            <p:ph type="title"/>
+          </p:nvPr>
+        </p:nvSpPr>
+        <p:spPr/>
+        <p:txBody>
+          <a:bodyPr/>
+          <a:lstStyle/>
+          <a:p>
+            <a:r>
+              <a:rPr lang="en-US" dirty="0"/>
+              <a:t>Economic background</a:t>
+            </a:r>
+          </a:p>
+        </p:txBody>
+      </p:sp>
+      <p:sp>
+        <p:nvSpPr>
+          <p:cNvPr id="3" name="Content Placeholder 2">
+            <a:extLst>
+              <a:ext uri="{FF2B5EF4-FFF2-40B4-BE49-F238E27FC236}">
+                <a16:creationId xmlns:a16="http://schemas.microsoft.com/office/drawing/2014/main" id="{D6345469-9342-4555-8DF6-D6E48F8FE5C9}"/>
+              </a:ext>
+            </a:extLst>
+          </p:cNvPr>
+          <p:cNvSpPr>
+            <a:spLocks noGrp="1"/>
+          </p:cNvSpPr>
+          <p:nvPr>
+            <p:ph sz="half" idx="1"/>
+          </p:nvPr>
+        </p:nvSpPr>
+        <p:spPr/>
+        <p:txBody>
+          <a:bodyPr/>
+          <a:lstStyle/>
+          <a:p>
+            <a:r>
+              <a:rPr lang="en-US" dirty="0"/>
+              <a:t>Averages since 1960</a:t>
+            </a:r>
+          </a:p>
+          <a:p>
+            <a:r>
+              <a:rPr lang="en-US" dirty="0"/>
+              <a:t>Overview of the economy, main three points</a:t>
+            </a:r>
+          </a:p>
+          <a:p>
+            <a:r>
+              <a:rPr lang="en-US" dirty="0"/>
+              <a:t>Mean and </a:t>
+            </a:r>
+            <a:r>
+              <a:rPr lang="en-US" dirty="0" err="1"/>
+              <a:t>st</a:t>
+            </a:r>
+            <a:r>
+              <a:rPr lang="en-US" dirty="0"/>
+              <a:t> dev</a:t>
+            </a:r>
+          </a:p>
+        </p:txBody>
+      </p:sp>
+      <p:sp>
+        <p:nvSpPr>
+          <p:cNvPr id="4" name="Content Placeholder 3">
+            <a:extLst>
+              <a:ext uri="{FF2B5EF4-FFF2-40B4-BE49-F238E27FC236}">
+                <a16:creationId xmlns:a16="http://schemas.microsoft.com/office/drawing/2014/main" id="{D185B1F0-5906-411A-9D72-A6F8608D2D1D}"/>
+              </a:ext>
+            </a:extLst>
+          </p:cNvPr>
+          <p:cNvSpPr>
+            <a:spLocks noGrp="1"/>
+          </p:cNvSpPr>
+          <p:nvPr>
+            <p:ph sz="half" idx="2"/>
+          </p:nvPr>
+        </p:nvSpPr>
+        <p:spPr/>
+        <p:txBody>
+          <a:bodyPr/>
+          <a:lstStyle/>
+          <a:p>
+            <a:endParaRPr lang="en-US" dirty="0"/>
+          </a:p>
+        </p:txBody>
+      </p:sp>
+    </p:spTree>
+    <p:extLst>
+      <p:ext uri="{BB962C8B-B14F-4D97-AF65-F5344CB8AC3E}">
+        <p14:creationId xmlns:p14="http://schemas.microsoft.com/office/powerpoint/2010/main" val="818776946"/>
+      </p:ext>
+    </p:extLst>
+  </p:cSld>
+  <p:clrMapOvr>
+    <a:masterClrMapping/>
+  </p:clrMapOvr>
+</p:sld>
+</file>
+
+<file path=ppt/slides/slide8.xml><?xml version="1.0" encoding="utf-8"?>
+<p:sld xmlns:a="http://schemas.openxmlformats.org/drawingml/2006/main" xmlns:r="http://schemas.openxmlformats.org/officeDocument/2006/relationships" xmlns:p="http://schemas.openxmlformats.org/presentationml/2006/main">
+  <p:cSld>
+    <p:spTree>
+      <p:nvGrpSpPr>
+        <p:cNvPr id="1" name=""/>
+        <p:cNvGrpSpPr/>
+        <p:nvPr/>
+      </p:nvGrpSpPr>
+      <p:grpSpPr>
+        <a:xfrm>
+          <a:off x="0" y="0"/>
+          <a:ext cx="0" cy="0"/>
+          <a:chOff x="0" y="0"/>
+          <a:chExt cx="0" cy="0"/>
+        </a:xfrm>
+      </p:grpSpPr>
+      <p:sp>
+        <p:nvSpPr>
+          <p:cNvPr id="2" name="Title 1">
+            <a:extLst>
+              <a:ext uri="{FF2B5EF4-FFF2-40B4-BE49-F238E27FC236}">
+                <a16:creationId xmlns:a16="http://schemas.microsoft.com/office/drawing/2014/main" id="{E4DAB7A2-7106-4021-A661-55692EAA03A6}"/>
+              </a:ext>
+            </a:extLst>
+          </p:cNvPr>
+          <p:cNvSpPr>
+            <a:spLocks noGrp="1"/>
+          </p:cNvSpPr>
+          <p:nvPr>
+            <p:ph type="title"/>
+          </p:nvPr>
+        </p:nvSpPr>
+        <p:spPr/>
+        <p:txBody>
+          <a:bodyPr/>
+          <a:lstStyle/>
+          <a:p>
+            <a:r>
+              <a:rPr lang="en-US" dirty="0"/>
+              <a:t>Plots of each distinct category</a:t>
+            </a:r>
+          </a:p>
+        </p:txBody>
+      </p:sp>
+      <p:sp>
+        <p:nvSpPr>
+          <p:cNvPr id="3" name="Content Placeholder 2">
+            <a:extLst>
+              <a:ext uri="{FF2B5EF4-FFF2-40B4-BE49-F238E27FC236}">
+                <a16:creationId xmlns:a16="http://schemas.microsoft.com/office/drawing/2014/main" id="{40590DBD-5801-4570-8F56-D19FB751F7D9}"/>
+              </a:ext>
+            </a:extLst>
+          </p:cNvPr>
+          <p:cNvSpPr>
+            <a:spLocks noGrp="1"/>
+          </p:cNvSpPr>
+          <p:nvPr>
+            <p:ph sz="half" idx="1"/>
+          </p:nvPr>
+        </p:nvSpPr>
+        <p:spPr/>
+        <p:txBody>
+          <a:bodyPr/>
+          <a:lstStyle/>
+          <a:p>
+            <a:pPr marL="0" indent="0">
+              <a:buNone/>
+            </a:pPr>
+            <a:r>
+              <a:rPr lang="en-US" dirty="0"/>
+              <a:t>Most meaningful plots only</a:t>
+            </a:r>
+          </a:p>
+        </p:txBody>
+      </p:sp>
+      <p:sp>
+        <p:nvSpPr>
+          <p:cNvPr id="4" name="Content Placeholder 3">
+            <a:extLst>
+              <a:ext uri="{FF2B5EF4-FFF2-40B4-BE49-F238E27FC236}">
+                <a16:creationId xmlns:a16="http://schemas.microsoft.com/office/drawing/2014/main" id="{5BBC9774-AD5C-4FCE-B500-592BD521CDDA}"/>
+              </a:ext>
+            </a:extLst>
+          </p:cNvPr>
+          <p:cNvSpPr>
+            <a:spLocks noGrp="1"/>
+          </p:cNvSpPr>
+          <p:nvPr>
+            <p:ph sz="half" idx="2"/>
+          </p:nvPr>
+        </p:nvSpPr>
+        <p:spPr/>
+        <p:txBody>
+          <a:bodyPr/>
+          <a:lstStyle/>
+          <a:p>
+            <a:endParaRPr lang="en-US"/>
+          </a:p>
+        </p:txBody>
+      </p:sp>
+    </p:spTree>
+    <p:extLst>
+      <p:ext uri="{BB962C8B-B14F-4D97-AF65-F5344CB8AC3E}">
+        <p14:creationId xmlns:p14="http://schemas.microsoft.com/office/powerpoint/2010/main" val="2322195755"/>
+      </p:ext>
+    </p:extLst>
+  </p:cSld>
+  <p:clrMapOvr>
+    <a:masterClrMapping/>
+  </p:clrMapOvr>
+</p:sld>
+</file>
+
+<file path=ppt/slides/slide9.xml><?xml version="1.0" encoding="utf-8"?>
+<p:sld xmlns:a="http://schemas.openxmlformats.org/drawingml/2006/main" xmlns:r="http://schemas.openxmlformats.org/officeDocument/2006/relationships" xmlns:p="http://schemas.openxmlformats.org/presentationml/2006/main">
+  <p:cSld>
+    <p:spTree>
+      <p:nvGrpSpPr>
+        <p:cNvPr id="1" name=""/>
+        <p:cNvGrpSpPr/>
+        <p:nvPr/>
+      </p:nvGrpSpPr>
+      <p:grpSpPr>
+        <a:xfrm>
+          <a:off x="0" y="0"/>
+          <a:ext cx="0" cy="0"/>
+          <a:chOff x="0" y="0"/>
+          <a:chExt cx="0" cy="0"/>
+        </a:xfrm>
+      </p:grpSpPr>
+      <p:sp>
+        <p:nvSpPr>
+          <p:cNvPr id="2" name="Title 1">
+            <a:extLst>
+              <a:ext uri="{FF2B5EF4-FFF2-40B4-BE49-F238E27FC236}">
+                <a16:creationId xmlns:a16="http://schemas.microsoft.com/office/drawing/2014/main" id="{C769AE17-EA03-4EA3-B1C8-5020376C6DBA}"/>
+              </a:ext>
+            </a:extLst>
+          </p:cNvPr>
+          <p:cNvSpPr>
+            <a:spLocks noGrp="1"/>
+          </p:cNvSpPr>
+          <p:nvPr>
+            <p:ph type="title"/>
+          </p:nvPr>
+        </p:nvSpPr>
+        <p:spPr/>
+        <p:txBody>
+          <a:bodyPr/>
+          <a:lstStyle/>
+          <a:p>
+            <a:r>
+              <a:rPr lang="en-US" dirty="0"/>
+              <a:t>Conclusions</a:t>
+            </a:r>
+          </a:p>
+        </p:txBody>
+      </p:sp>
+      <p:sp>
+        <p:nvSpPr>
+          <p:cNvPr id="3" name="Content Placeholder 2">
+            <a:extLst>
+              <a:ext uri="{FF2B5EF4-FFF2-40B4-BE49-F238E27FC236}">
+                <a16:creationId xmlns:a16="http://schemas.microsoft.com/office/drawing/2014/main" id="{F53E5E8E-E208-43D9-8D6C-A6AE09D000D2}"/>
+              </a:ext>
+            </a:extLst>
+          </p:cNvPr>
+          <p:cNvSpPr>
+            <a:spLocks noGrp="1"/>
+          </p:cNvSpPr>
+          <p:nvPr>
+            <p:ph sz="half" idx="1"/>
+          </p:nvPr>
+        </p:nvSpPr>
+        <p:spPr/>
+        <p:txBody>
+          <a:bodyPr/>
+          <a:lstStyle/>
+          <a:p>
+            <a:r>
+              <a:rPr lang="en-US" dirty="0"/>
+              <a:t>Implications of findings and what they mean.</a:t>
+            </a:r>
+          </a:p>
+          <a:p>
+            <a:r>
+              <a:rPr lang="en-US" dirty="0"/>
+              <a:t>ANOVA and t-test</a:t>
+            </a:r>
+          </a:p>
+        </p:txBody>
+      </p:sp>
+      <p:sp>
+        <p:nvSpPr>
+          <p:cNvPr id="4" name="Content Placeholder 3">
+            <a:extLst>
+              <a:ext uri="{FF2B5EF4-FFF2-40B4-BE49-F238E27FC236}">
+                <a16:creationId xmlns:a16="http://schemas.microsoft.com/office/drawing/2014/main" id="{5100C0EA-1719-414E-9848-04F30AF84F96}"/>
+              </a:ext>
+            </a:extLst>
+          </p:cNvPr>
+          <p:cNvSpPr>
+            <a:spLocks noGrp="1"/>
+          </p:cNvSpPr>
+          <p:nvPr>
+            <p:ph sz="half" idx="2"/>
+          </p:nvPr>
+        </p:nvSpPr>
+        <p:spPr/>
+        <p:txBody>
+          <a:bodyPr/>
+          <a:lstStyle/>
+          <a:p>
+            <a:endParaRPr lang="en-US"/>
+          </a:p>
+        </p:txBody>
+      </p:sp>
+    </p:spTree>
+    <p:extLst>
+      <p:ext uri="{BB962C8B-B14F-4D97-AF65-F5344CB8AC3E}">
+        <p14:creationId xmlns:p14="http://schemas.microsoft.com/office/powerpoint/2010/main" val="3076883286"/>
       </p:ext>
     </p:extLst>
   </p:cSld>

</xml_diff>

<commit_message>
upload summary and PP
</commit_message>
<xml_diff>
--- a/Iceland_presentation.pptx
+++ b/Iceland_presentation.pptx
@@ -2,26 +2,27 @@
 <file path=ppt/presentation.xml><?xml version="1.0" encoding="utf-8"?>
 <p:presentation xmlns:a="http://schemas.openxmlformats.org/drawingml/2006/main" xmlns:r="http://schemas.openxmlformats.org/officeDocument/2006/relationships" xmlns:p="http://schemas.openxmlformats.org/presentationml/2006/main" autoCompressPictures="0">
   <p:sldMasterIdLst>
-    <p:sldMasterId id="2147483648" r:id="rId1"/>
+    <p:sldMasterId id="2147483648" r:id="rId4"/>
   </p:sldMasterIdLst>
+  <p:notesMasterIdLst>
+    <p:notesMasterId r:id="rId20"/>
+  </p:notesMasterIdLst>
   <p:sldIdLst>
-    <p:sldId id="256" r:id="rId2"/>
-    <p:sldId id="261" r:id="rId3"/>
-    <p:sldId id="258" r:id="rId4"/>
-    <p:sldId id="257" r:id="rId5"/>
-    <p:sldId id="274" r:id="rId6"/>
-    <p:sldId id="259" r:id="rId7"/>
-    <p:sldId id="260" r:id="rId8"/>
-    <p:sldId id="262" r:id="rId9"/>
-    <p:sldId id="267" r:id="rId10"/>
-    <p:sldId id="266" r:id="rId11"/>
-    <p:sldId id="269" r:id="rId12"/>
-    <p:sldId id="273" r:id="rId13"/>
-    <p:sldId id="272" r:id="rId14"/>
-    <p:sldId id="271" r:id="rId15"/>
-    <p:sldId id="270" r:id="rId16"/>
-    <p:sldId id="264" r:id="rId17"/>
-    <p:sldId id="265" r:id="rId18"/>
+    <p:sldId id="256" r:id="rId5"/>
+    <p:sldId id="261" r:id="rId6"/>
+    <p:sldId id="257" r:id="rId7"/>
+    <p:sldId id="274" r:id="rId8"/>
+    <p:sldId id="265" r:id="rId9"/>
+    <p:sldId id="260" r:id="rId10"/>
+    <p:sldId id="262" r:id="rId11"/>
+    <p:sldId id="267" r:id="rId12"/>
+    <p:sldId id="266" r:id="rId13"/>
+    <p:sldId id="269" r:id="rId14"/>
+    <p:sldId id="273" r:id="rId15"/>
+    <p:sldId id="272" r:id="rId16"/>
+    <p:sldId id="271" r:id="rId17"/>
+    <p:sldId id="270" r:id="rId18"/>
+    <p:sldId id="264" r:id="rId19"/>
   </p:sldIdLst>
   <p:sldSz cx="12192000" cy="6858000"/>
   <p:notesSz cx="6858000" cy="9144000"/>
@@ -126,6 +127,613 @@
     </p:ext>
   </p:extLst>
 </p:presentation>
+</file>
+
+<file path=ppt/revisionInfo.xml><?xml version="1.0" encoding="utf-8"?>
+<p1510:revInfo xmlns:a="http://schemas.openxmlformats.org/drawingml/2006/main" xmlns:r="http://schemas.openxmlformats.org/officeDocument/2006/relationships" xmlns:p1510="http://schemas.microsoft.com/office/powerpoint/2015/10/main">
+  <p1510:revLst>
+    <p1510:client id="{8FCBF4A6-726D-4F74-86DC-A1C01383F19E}" v="155" dt="2020-03-11T22:07:53.536"/>
+  </p1510:revLst>
+</p1510:revInfo>
+</file>
+
+<file path=ppt/changesInfos/changesInfo1.xml><?xml version="1.0" encoding="utf-8"?>
+<pc:chgInfo xmlns:a="http://schemas.openxmlformats.org/drawingml/2006/main" xmlns:r="http://schemas.openxmlformats.org/officeDocument/2006/relationships" xmlns:ac="http://schemas.microsoft.com/office/drawing/2013/main/command" xmlns:pc="http://schemas.microsoft.com/office/powerpoint/2013/main/command">
+  <pc:docChgLst>
+    <pc:chgData name="Kenneth Knisley" userId="05a3edc7-46e3-4d88-aedd-0b541b967259" providerId="ADAL" clId="{8FCBF4A6-726D-4F74-86DC-A1C01383F19E}"/>
+    <pc:docChg chg="modSld">
+      <pc:chgData name="Kenneth Knisley" userId="05a3edc7-46e3-4d88-aedd-0b541b967259" providerId="ADAL" clId="{8FCBF4A6-726D-4F74-86DC-A1C01383F19E}" dt="2020-03-11T22:07:53.536" v="35" actId="20577"/>
+      <pc:docMkLst>
+        <pc:docMk/>
+      </pc:docMkLst>
+      <pc:sldChg chg="modSp">
+        <pc:chgData name="Kenneth Knisley" userId="05a3edc7-46e3-4d88-aedd-0b541b967259" providerId="ADAL" clId="{8FCBF4A6-726D-4F74-86DC-A1C01383F19E}" dt="2020-03-11T22:07:53.536" v="35" actId="20577"/>
+        <pc:sldMkLst>
+          <pc:docMk/>
+          <pc:sldMk cId="84233359" sldId="257"/>
+        </pc:sldMkLst>
+        <pc:spChg chg="mod">
+          <ac:chgData name="Kenneth Knisley" userId="05a3edc7-46e3-4d88-aedd-0b541b967259" providerId="ADAL" clId="{8FCBF4A6-726D-4F74-86DC-A1C01383F19E}" dt="2020-03-11T22:07:53.536" v="35" actId="20577"/>
+          <ac:spMkLst>
+            <pc:docMk/>
+            <pc:sldMk cId="84233359" sldId="257"/>
+            <ac:spMk id="3" creationId="{803DC114-0FB1-45C4-A6EF-DF4023ABC2AB}"/>
+          </ac:spMkLst>
+        </pc:spChg>
+      </pc:sldChg>
+    </pc:docChg>
+  </pc:docChgLst>
+  <pc:docChgLst>
+    <pc:chgData name="Kenneth Knisley" userId="05a3edc7-46e3-4d88-aedd-0b541b967259" providerId="ADAL" clId="{55EC3494-469D-4573-A61F-DE06D46CD0BF}"/>
+    <pc:docChg chg="modSld sldOrd">
+      <pc:chgData name="Kenneth Knisley" userId="05a3edc7-46e3-4d88-aedd-0b541b967259" providerId="ADAL" clId="{55EC3494-469D-4573-A61F-DE06D46CD0BF}" dt="2020-03-11T18:51:49.266" v="118" actId="1076"/>
+      <pc:docMkLst>
+        <pc:docMk/>
+      </pc:docMkLst>
+      <pc:sldChg chg="delSp modSp modAnim">
+        <pc:chgData name="Kenneth Knisley" userId="05a3edc7-46e3-4d88-aedd-0b541b967259" providerId="ADAL" clId="{55EC3494-469D-4573-A61F-DE06D46CD0BF}" dt="2020-03-11T18:04:54.886" v="61" actId="20577"/>
+        <pc:sldMkLst>
+          <pc:docMk/>
+          <pc:sldMk cId="84233359" sldId="257"/>
+        </pc:sldMkLst>
+        <pc:spChg chg="mod">
+          <ac:chgData name="Kenneth Knisley" userId="05a3edc7-46e3-4d88-aedd-0b541b967259" providerId="ADAL" clId="{55EC3494-469D-4573-A61F-DE06D46CD0BF}" dt="2020-03-11T18:04:54.886" v="61" actId="20577"/>
+          <ac:spMkLst>
+            <pc:docMk/>
+            <pc:sldMk cId="84233359" sldId="257"/>
+            <ac:spMk id="2" creationId="{0E62FE22-81C4-4B15-824C-CCAF8C8AFB0F}"/>
+          </ac:spMkLst>
+        </pc:spChg>
+        <pc:spChg chg="mod">
+          <ac:chgData name="Kenneth Knisley" userId="05a3edc7-46e3-4d88-aedd-0b541b967259" providerId="ADAL" clId="{55EC3494-469D-4573-A61F-DE06D46CD0BF}" dt="2020-03-11T18:04:48.644" v="60" actId="1076"/>
+          <ac:spMkLst>
+            <pc:docMk/>
+            <pc:sldMk cId="84233359" sldId="257"/>
+            <ac:spMk id="3" creationId="{803DC114-0FB1-45C4-A6EF-DF4023ABC2AB}"/>
+          </ac:spMkLst>
+        </pc:spChg>
+        <pc:spChg chg="del">
+          <ac:chgData name="Kenneth Knisley" userId="05a3edc7-46e3-4d88-aedd-0b541b967259" providerId="ADAL" clId="{55EC3494-469D-4573-A61F-DE06D46CD0BF}" dt="2020-03-11T18:04:38.122" v="59" actId="478"/>
+          <ac:spMkLst>
+            <pc:docMk/>
+            <pc:sldMk cId="84233359" sldId="257"/>
+            <ac:spMk id="4" creationId="{8FF6E97B-5CA4-45B9-BF72-D381EEF22D53}"/>
+          </ac:spMkLst>
+        </pc:spChg>
+        <pc:spChg chg="mod">
+          <ac:chgData name="Kenneth Knisley" userId="05a3edc7-46e3-4d88-aedd-0b541b967259" providerId="ADAL" clId="{55EC3494-469D-4573-A61F-DE06D46CD0BF}" dt="2020-03-11T18:04:32.115" v="58" actId="20577"/>
+          <ac:spMkLst>
+            <pc:docMk/>
+            <pc:sldMk cId="84233359" sldId="257"/>
+            <ac:spMk id="5" creationId="{26DAC622-064E-409E-AA5D-9754D2139031}"/>
+          </ac:spMkLst>
+        </pc:spChg>
+      </pc:sldChg>
+      <pc:sldChg chg="addSp delSp modSp">
+        <pc:chgData name="Kenneth Knisley" userId="05a3edc7-46e3-4d88-aedd-0b541b967259" providerId="ADAL" clId="{55EC3494-469D-4573-A61F-DE06D46CD0BF}" dt="2020-03-11T18:51:49.266" v="118" actId="1076"/>
+        <pc:sldMkLst>
+          <pc:docMk/>
+          <pc:sldMk cId="3076883286" sldId="264"/>
+        </pc:sldMkLst>
+        <pc:spChg chg="mod">
+          <ac:chgData name="Kenneth Knisley" userId="05a3edc7-46e3-4d88-aedd-0b541b967259" providerId="ADAL" clId="{55EC3494-469D-4573-A61F-DE06D46CD0BF}" dt="2020-03-11T18:25:09.131" v="113" actId="14100"/>
+          <ac:spMkLst>
+            <pc:docMk/>
+            <pc:sldMk cId="3076883286" sldId="264"/>
+            <ac:spMk id="3" creationId="{F53E5E8E-E208-43D9-8D6C-A6AE09D000D2}"/>
+          </ac:spMkLst>
+        </pc:spChg>
+        <pc:spChg chg="del">
+          <ac:chgData name="Kenneth Knisley" userId="05a3edc7-46e3-4d88-aedd-0b541b967259" providerId="ADAL" clId="{55EC3494-469D-4573-A61F-DE06D46CD0BF}" dt="2020-03-11T18:25:03.759" v="112" actId="478"/>
+          <ac:spMkLst>
+            <pc:docMk/>
+            <pc:sldMk cId="3076883286" sldId="264"/>
+            <ac:spMk id="4" creationId="{5100C0EA-1719-414E-9848-04F30AF84F96}"/>
+          </ac:spMkLst>
+        </pc:spChg>
+        <pc:picChg chg="add del mod">
+          <ac:chgData name="Kenneth Knisley" userId="05a3edc7-46e3-4d88-aedd-0b541b967259" providerId="ADAL" clId="{55EC3494-469D-4573-A61F-DE06D46CD0BF}" dt="2020-03-11T18:51:45.609" v="116" actId="478"/>
+          <ac:picMkLst>
+            <pc:docMk/>
+            <pc:sldMk cId="3076883286" sldId="264"/>
+            <ac:picMk id="5" creationId="{F70B55EA-2642-47F2-9D6B-1150303FDBC1}"/>
+          </ac:picMkLst>
+        </pc:picChg>
+        <pc:picChg chg="add mod">
+          <ac:chgData name="Kenneth Knisley" userId="05a3edc7-46e3-4d88-aedd-0b541b967259" providerId="ADAL" clId="{55EC3494-469D-4573-A61F-DE06D46CD0BF}" dt="2020-03-11T18:51:49.266" v="118" actId="1076"/>
+          <ac:picMkLst>
+            <pc:docMk/>
+            <pc:sldMk cId="3076883286" sldId="264"/>
+            <ac:picMk id="6" creationId="{FDF9368D-81C1-4B1A-B41B-F695CEBFDD56}"/>
+          </ac:picMkLst>
+        </pc:picChg>
+      </pc:sldChg>
+      <pc:sldChg chg="addSp delSp modSp ord">
+        <pc:chgData name="Kenneth Knisley" userId="05a3edc7-46e3-4d88-aedd-0b541b967259" providerId="ADAL" clId="{55EC3494-469D-4573-A61F-DE06D46CD0BF}" dt="2020-03-11T17:55:47.836" v="10" actId="1076"/>
+        <pc:sldMkLst>
+          <pc:docMk/>
+          <pc:sldMk cId="2954277170" sldId="265"/>
+        </pc:sldMkLst>
+        <pc:spChg chg="del">
+          <ac:chgData name="Kenneth Knisley" userId="05a3edc7-46e3-4d88-aedd-0b541b967259" providerId="ADAL" clId="{55EC3494-469D-4573-A61F-DE06D46CD0BF}" dt="2020-03-11T17:55:05.498" v="1"/>
+          <ac:spMkLst>
+            <pc:docMk/>
+            <pc:sldMk cId="2954277170" sldId="265"/>
+            <ac:spMk id="3" creationId="{26E7E5DC-18A7-4942-83F1-4AB2EBE4DA88}"/>
+          </ac:spMkLst>
+        </pc:spChg>
+        <pc:spChg chg="del">
+          <ac:chgData name="Kenneth Knisley" userId="05a3edc7-46e3-4d88-aedd-0b541b967259" providerId="ADAL" clId="{55EC3494-469D-4573-A61F-DE06D46CD0BF}" dt="2020-03-11T17:55:28.151" v="4"/>
+          <ac:spMkLst>
+            <pc:docMk/>
+            <pc:sldMk cId="2954277170" sldId="265"/>
+            <ac:spMk id="4" creationId="{41408F6E-7A57-457A-80FF-E351E083D0C5}"/>
+          </ac:spMkLst>
+        </pc:spChg>
+        <pc:picChg chg="add mod">
+          <ac:chgData name="Kenneth Knisley" userId="05a3edc7-46e3-4d88-aedd-0b541b967259" providerId="ADAL" clId="{55EC3494-469D-4573-A61F-DE06D46CD0BF}" dt="2020-03-11T17:55:19.228" v="3" actId="14100"/>
+          <ac:picMkLst>
+            <pc:docMk/>
+            <pc:sldMk cId="2954277170" sldId="265"/>
+            <ac:picMk id="5" creationId="{B9C63D75-BA69-4001-8F88-A9BE82897031}"/>
+          </ac:picMkLst>
+        </pc:picChg>
+        <pc:picChg chg="add mod">
+          <ac:chgData name="Kenneth Knisley" userId="05a3edc7-46e3-4d88-aedd-0b541b967259" providerId="ADAL" clId="{55EC3494-469D-4573-A61F-DE06D46CD0BF}" dt="2020-03-11T17:55:36.216" v="7" actId="1076"/>
+          <ac:picMkLst>
+            <pc:docMk/>
+            <pc:sldMk cId="2954277170" sldId="265"/>
+            <ac:picMk id="6" creationId="{B236EB1B-2422-4A9D-89D6-74463B4E9C1A}"/>
+          </ac:picMkLst>
+        </pc:picChg>
+        <pc:picChg chg="add mod">
+          <ac:chgData name="Kenneth Knisley" userId="05a3edc7-46e3-4d88-aedd-0b541b967259" providerId="ADAL" clId="{55EC3494-469D-4573-A61F-DE06D46CD0BF}" dt="2020-03-11T17:55:47.836" v="10" actId="1076"/>
+          <ac:picMkLst>
+            <pc:docMk/>
+            <pc:sldMk cId="2954277170" sldId="265"/>
+            <ac:picMk id="7" creationId="{5FFACAD8-A7CC-4969-A7E8-4183319FC60E}"/>
+          </ac:picMkLst>
+        </pc:picChg>
+      </pc:sldChg>
+    </pc:docChg>
+  </pc:docChgLst>
+</pc:chgInfo>
+</file>
+
+<file path=ppt/notesMasters/notesMaster1.xml><?xml version="1.0" encoding="utf-8"?>
+<p:notesMaster xmlns:a="http://schemas.openxmlformats.org/drawingml/2006/main" xmlns:r="http://schemas.openxmlformats.org/officeDocument/2006/relationships" xmlns:p="http://schemas.openxmlformats.org/presentationml/2006/main">
+  <p:cSld>
+    <p:bg>
+      <p:bgRef idx="1001">
+        <a:schemeClr val="bg1"/>
+      </p:bgRef>
+    </p:bg>
+    <p:spTree>
+      <p:nvGrpSpPr>
+        <p:cNvPr id="1" name=""/>
+        <p:cNvGrpSpPr/>
+        <p:nvPr/>
+      </p:nvGrpSpPr>
+      <p:grpSpPr>
+        <a:xfrm>
+          <a:off x="0" y="0"/>
+          <a:ext cx="0" cy="0"/>
+          <a:chOff x="0" y="0"/>
+          <a:chExt cx="0" cy="0"/>
+        </a:xfrm>
+      </p:grpSpPr>
+      <p:sp>
+        <p:nvSpPr>
+          <p:cNvPr id="2" name="Header Placeholder 1"/>
+          <p:cNvSpPr>
+            <a:spLocks noGrp="1"/>
+          </p:cNvSpPr>
+          <p:nvPr>
+            <p:ph type="hdr" sz="quarter"/>
+          </p:nvPr>
+        </p:nvSpPr>
+        <p:spPr>
+          <a:xfrm>
+            <a:off x="0" y="0"/>
+            <a:ext cx="2971800" cy="458788"/>
+          </a:xfrm>
+          <a:prstGeom prst="rect">
+            <a:avLst/>
+          </a:prstGeom>
+        </p:spPr>
+        <p:txBody>
+          <a:bodyPr vert="horz" lIns="91440" tIns="45720" rIns="91440" bIns="45720" rtlCol="0"/>
+          <a:lstStyle>
+            <a:lvl1pPr algn="l">
+              <a:defRPr sz="1200"/>
+            </a:lvl1pPr>
+          </a:lstStyle>
+          <a:p>
+            <a:endParaRPr lang="en-US"/>
+          </a:p>
+        </p:txBody>
+      </p:sp>
+      <p:sp>
+        <p:nvSpPr>
+          <p:cNvPr id="3" name="Date Placeholder 2"/>
+          <p:cNvSpPr>
+            <a:spLocks noGrp="1"/>
+          </p:cNvSpPr>
+          <p:nvPr>
+            <p:ph type="dt" idx="1"/>
+          </p:nvPr>
+        </p:nvSpPr>
+        <p:spPr>
+          <a:xfrm>
+            <a:off x="3884613" y="0"/>
+            <a:ext cx="2971800" cy="458788"/>
+          </a:xfrm>
+          <a:prstGeom prst="rect">
+            <a:avLst/>
+          </a:prstGeom>
+        </p:spPr>
+        <p:txBody>
+          <a:bodyPr vert="horz" lIns="91440" tIns="45720" rIns="91440" bIns="45720" rtlCol="0"/>
+          <a:lstStyle>
+            <a:lvl1pPr algn="r">
+              <a:defRPr sz="1200"/>
+            </a:lvl1pPr>
+          </a:lstStyle>
+          <a:p>
+            <a:fld id="{4E75B1A3-21C4-4BD5-A3B9-B88DD0E11A98}" type="datetimeFigureOut">
+              <a:rPr lang="en-US" smtClean="0"/>
+              <a:t>3/11/2020</a:t>
+            </a:fld>
+            <a:endParaRPr lang="en-US"/>
+          </a:p>
+        </p:txBody>
+      </p:sp>
+      <p:sp>
+        <p:nvSpPr>
+          <p:cNvPr id="4" name="Slide Image Placeholder 3"/>
+          <p:cNvSpPr>
+            <a:spLocks noGrp="1" noRot="1" noChangeAspect="1"/>
+          </p:cNvSpPr>
+          <p:nvPr>
+            <p:ph type="sldImg" idx="2"/>
+          </p:nvPr>
+        </p:nvSpPr>
+        <p:spPr>
+          <a:xfrm>
+            <a:off x="685800" y="1143000"/>
+            <a:ext cx="5486400" cy="3086100"/>
+          </a:xfrm>
+          <a:prstGeom prst="rect">
+            <a:avLst/>
+          </a:prstGeom>
+          <a:noFill/>
+          <a:ln w="12700">
+            <a:solidFill>
+              <a:prstClr val="black"/>
+            </a:solidFill>
+          </a:ln>
+        </p:spPr>
+        <p:txBody>
+          <a:bodyPr vert="horz" lIns="91440" tIns="45720" rIns="91440" bIns="45720" rtlCol="0" anchor="ctr"/>
+          <a:lstStyle/>
+          <a:p>
+            <a:endParaRPr lang="en-US"/>
+          </a:p>
+        </p:txBody>
+      </p:sp>
+      <p:sp>
+        <p:nvSpPr>
+          <p:cNvPr id="5" name="Notes Placeholder 4"/>
+          <p:cNvSpPr>
+            <a:spLocks noGrp="1"/>
+          </p:cNvSpPr>
+          <p:nvPr>
+            <p:ph type="body" sz="quarter" idx="3"/>
+          </p:nvPr>
+        </p:nvSpPr>
+        <p:spPr>
+          <a:xfrm>
+            <a:off x="685800" y="4400550"/>
+            <a:ext cx="5486400" cy="3600450"/>
+          </a:xfrm>
+          <a:prstGeom prst="rect">
+            <a:avLst/>
+          </a:prstGeom>
+        </p:spPr>
+        <p:txBody>
+          <a:bodyPr vert="horz" lIns="91440" tIns="45720" rIns="91440" bIns="45720" rtlCol="0"/>
+          <a:lstStyle/>
+          <a:p>
+            <a:pPr lvl="0"/>
+            <a:r>
+              <a:rPr lang="en-US"/>
+              <a:t>Click to edit Master text styles</a:t>
+            </a:r>
+          </a:p>
+          <a:p>
+            <a:pPr lvl="1"/>
+            <a:r>
+              <a:rPr lang="en-US"/>
+              <a:t>Second level</a:t>
+            </a:r>
+          </a:p>
+          <a:p>
+            <a:pPr lvl="2"/>
+            <a:r>
+              <a:rPr lang="en-US"/>
+              <a:t>Third level</a:t>
+            </a:r>
+          </a:p>
+          <a:p>
+            <a:pPr lvl="3"/>
+            <a:r>
+              <a:rPr lang="en-US"/>
+              <a:t>Fourth level</a:t>
+            </a:r>
+          </a:p>
+          <a:p>
+            <a:pPr lvl="4"/>
+            <a:r>
+              <a:rPr lang="en-US"/>
+              <a:t>Fifth level</a:t>
+            </a:r>
+          </a:p>
+        </p:txBody>
+      </p:sp>
+      <p:sp>
+        <p:nvSpPr>
+          <p:cNvPr id="6" name="Footer Placeholder 5"/>
+          <p:cNvSpPr>
+            <a:spLocks noGrp="1"/>
+          </p:cNvSpPr>
+          <p:nvPr>
+            <p:ph type="ftr" sz="quarter" idx="4"/>
+          </p:nvPr>
+        </p:nvSpPr>
+        <p:spPr>
+          <a:xfrm>
+            <a:off x="0" y="8685213"/>
+            <a:ext cx="2971800" cy="458787"/>
+          </a:xfrm>
+          <a:prstGeom prst="rect">
+            <a:avLst/>
+          </a:prstGeom>
+        </p:spPr>
+        <p:txBody>
+          <a:bodyPr vert="horz" lIns="91440" tIns="45720" rIns="91440" bIns="45720" rtlCol="0" anchor="b"/>
+          <a:lstStyle>
+            <a:lvl1pPr algn="l">
+              <a:defRPr sz="1200"/>
+            </a:lvl1pPr>
+          </a:lstStyle>
+          <a:p>
+            <a:endParaRPr lang="en-US"/>
+          </a:p>
+        </p:txBody>
+      </p:sp>
+      <p:sp>
+        <p:nvSpPr>
+          <p:cNvPr id="7" name="Slide Number Placeholder 6"/>
+          <p:cNvSpPr>
+            <a:spLocks noGrp="1"/>
+          </p:cNvSpPr>
+          <p:nvPr>
+            <p:ph type="sldNum" sz="quarter" idx="5"/>
+          </p:nvPr>
+        </p:nvSpPr>
+        <p:spPr>
+          <a:xfrm>
+            <a:off x="3884613" y="8685213"/>
+            <a:ext cx="2971800" cy="458787"/>
+          </a:xfrm>
+          <a:prstGeom prst="rect">
+            <a:avLst/>
+          </a:prstGeom>
+        </p:spPr>
+        <p:txBody>
+          <a:bodyPr vert="horz" lIns="91440" tIns="45720" rIns="91440" bIns="45720" rtlCol="0" anchor="b"/>
+          <a:lstStyle>
+            <a:lvl1pPr algn="r">
+              <a:defRPr sz="1200"/>
+            </a:lvl1pPr>
+          </a:lstStyle>
+          <a:p>
+            <a:fld id="{7A785311-C7F2-4571-B382-4F93EC405EA1}" type="slidenum">
+              <a:rPr lang="en-US" smtClean="0"/>
+              <a:t>‹#›</a:t>
+            </a:fld>
+            <a:endParaRPr lang="en-US"/>
+          </a:p>
+        </p:txBody>
+      </p:sp>
+    </p:spTree>
+    <p:extLst>
+      <p:ext uri="{BB962C8B-B14F-4D97-AF65-F5344CB8AC3E}">
+        <p14:creationId xmlns:p14="http://schemas.microsoft.com/office/powerpoint/2010/main" val="3586450725"/>
+      </p:ext>
+    </p:extLst>
+  </p:cSld>
+  <p:clrMap bg1="lt1" tx1="dk1" bg2="lt2" tx2="dk2" accent1="accent1" accent2="accent2" accent3="accent3" accent4="accent4" accent5="accent5" accent6="accent6" hlink="hlink" folHlink="folHlink"/>
+  <p:notesStyle>
+    <a:lvl1pPr marL="0" algn="l" defTabSz="914400" rtl="0" eaLnBrk="1" latinLnBrk="0" hangingPunct="1">
+      <a:defRPr sz="1200" kern="1200">
+        <a:solidFill>
+          <a:schemeClr val="tx1"/>
+        </a:solidFill>
+        <a:latin typeface="+mn-lt"/>
+        <a:ea typeface="+mn-ea"/>
+        <a:cs typeface="+mn-cs"/>
+      </a:defRPr>
+    </a:lvl1pPr>
+    <a:lvl2pPr marL="457200" algn="l" defTabSz="914400" rtl="0" eaLnBrk="1" latinLnBrk="0" hangingPunct="1">
+      <a:defRPr sz="1200" kern="1200">
+        <a:solidFill>
+          <a:schemeClr val="tx1"/>
+        </a:solidFill>
+        <a:latin typeface="+mn-lt"/>
+        <a:ea typeface="+mn-ea"/>
+        <a:cs typeface="+mn-cs"/>
+      </a:defRPr>
+    </a:lvl2pPr>
+    <a:lvl3pPr marL="914400" algn="l" defTabSz="914400" rtl="0" eaLnBrk="1" latinLnBrk="0" hangingPunct="1">
+      <a:defRPr sz="1200" kern="1200">
+        <a:solidFill>
+          <a:schemeClr val="tx1"/>
+        </a:solidFill>
+        <a:latin typeface="+mn-lt"/>
+        <a:ea typeface="+mn-ea"/>
+        <a:cs typeface="+mn-cs"/>
+      </a:defRPr>
+    </a:lvl3pPr>
+    <a:lvl4pPr marL="1371600" algn="l" defTabSz="914400" rtl="0" eaLnBrk="1" latinLnBrk="0" hangingPunct="1">
+      <a:defRPr sz="1200" kern="1200">
+        <a:solidFill>
+          <a:schemeClr val="tx1"/>
+        </a:solidFill>
+        <a:latin typeface="+mn-lt"/>
+        <a:ea typeface="+mn-ea"/>
+        <a:cs typeface="+mn-cs"/>
+      </a:defRPr>
+    </a:lvl4pPr>
+    <a:lvl5pPr marL="1828800" algn="l" defTabSz="914400" rtl="0" eaLnBrk="1" latinLnBrk="0" hangingPunct="1">
+      <a:defRPr sz="1200" kern="1200">
+        <a:solidFill>
+          <a:schemeClr val="tx1"/>
+        </a:solidFill>
+        <a:latin typeface="+mn-lt"/>
+        <a:ea typeface="+mn-ea"/>
+        <a:cs typeface="+mn-cs"/>
+      </a:defRPr>
+    </a:lvl5pPr>
+    <a:lvl6pPr marL="2286000" algn="l" defTabSz="914400" rtl="0" eaLnBrk="1" latinLnBrk="0" hangingPunct="1">
+      <a:defRPr sz="1200" kern="1200">
+        <a:solidFill>
+          <a:schemeClr val="tx1"/>
+        </a:solidFill>
+        <a:latin typeface="+mn-lt"/>
+        <a:ea typeface="+mn-ea"/>
+        <a:cs typeface="+mn-cs"/>
+      </a:defRPr>
+    </a:lvl6pPr>
+    <a:lvl7pPr marL="2743200" algn="l" defTabSz="914400" rtl="0" eaLnBrk="1" latinLnBrk="0" hangingPunct="1">
+      <a:defRPr sz="1200" kern="1200">
+        <a:solidFill>
+          <a:schemeClr val="tx1"/>
+        </a:solidFill>
+        <a:latin typeface="+mn-lt"/>
+        <a:ea typeface="+mn-ea"/>
+        <a:cs typeface="+mn-cs"/>
+      </a:defRPr>
+    </a:lvl7pPr>
+    <a:lvl8pPr marL="3200400" algn="l" defTabSz="914400" rtl="0" eaLnBrk="1" latinLnBrk="0" hangingPunct="1">
+      <a:defRPr sz="1200" kern="1200">
+        <a:solidFill>
+          <a:schemeClr val="tx1"/>
+        </a:solidFill>
+        <a:latin typeface="+mn-lt"/>
+        <a:ea typeface="+mn-ea"/>
+        <a:cs typeface="+mn-cs"/>
+      </a:defRPr>
+    </a:lvl8pPr>
+    <a:lvl9pPr marL="3657600" algn="l" defTabSz="914400" rtl="0" eaLnBrk="1" latinLnBrk="0" hangingPunct="1">
+      <a:defRPr sz="1200" kern="1200">
+        <a:solidFill>
+          <a:schemeClr val="tx1"/>
+        </a:solidFill>
+        <a:latin typeface="+mn-lt"/>
+        <a:ea typeface="+mn-ea"/>
+        <a:cs typeface="+mn-cs"/>
+      </a:defRPr>
+    </a:lvl9pPr>
+  </p:notesStyle>
+</p:notesMaster>
+</file>
+
+<file path=ppt/notesSlides/notesSlide1.xml><?xml version="1.0" encoding="utf-8"?>
+<p:notes xmlns:a="http://schemas.openxmlformats.org/drawingml/2006/main" xmlns:r="http://schemas.openxmlformats.org/officeDocument/2006/relationships" xmlns:p="http://schemas.openxmlformats.org/presentationml/2006/main">
+  <p:cSld>
+    <p:spTree>
+      <p:nvGrpSpPr>
+        <p:cNvPr id="1" name=""/>
+        <p:cNvGrpSpPr/>
+        <p:nvPr/>
+      </p:nvGrpSpPr>
+      <p:grpSpPr>
+        <a:xfrm>
+          <a:off x="0" y="0"/>
+          <a:ext cx="0" cy="0"/>
+          <a:chOff x="0" y="0"/>
+          <a:chExt cx="0" cy="0"/>
+        </a:xfrm>
+      </p:grpSpPr>
+      <p:sp>
+        <p:nvSpPr>
+          <p:cNvPr id="2" name="Slide Image Placeholder 1"/>
+          <p:cNvSpPr>
+            <a:spLocks noGrp="1" noRot="1" noChangeAspect="1"/>
+          </p:cNvSpPr>
+          <p:nvPr>
+            <p:ph type="sldImg"/>
+          </p:nvPr>
+        </p:nvSpPr>
+        <p:spPr/>
+      </p:sp>
+      <p:sp>
+        <p:nvSpPr>
+          <p:cNvPr id="3" name="Notes Placeholder 2"/>
+          <p:cNvSpPr>
+            <a:spLocks noGrp="1"/>
+          </p:cNvSpPr>
+          <p:nvPr>
+            <p:ph type="body" idx="1"/>
+          </p:nvPr>
+        </p:nvSpPr>
+        <p:spPr/>
+        <p:txBody>
+          <a:bodyPr/>
+          <a:lstStyle/>
+          <a:p>
+            <a:r>
+              <a:rPr lang="en-US" dirty="0"/>
+              <a:t>https://www.usgs.gov/faqs/which-country-has-most-earthquakes?qt-news_science_products=0#qt-news_science_products</a:t>
+            </a:r>
+          </a:p>
+        </p:txBody>
+      </p:sp>
+      <p:sp>
+        <p:nvSpPr>
+          <p:cNvPr id="4" name="Slide Number Placeholder 3"/>
+          <p:cNvSpPr>
+            <a:spLocks noGrp="1"/>
+          </p:cNvSpPr>
+          <p:nvPr>
+            <p:ph type="sldNum" sz="quarter" idx="5"/>
+          </p:nvPr>
+        </p:nvSpPr>
+        <p:spPr/>
+        <p:txBody>
+          <a:bodyPr/>
+          <a:lstStyle/>
+          <a:p>
+            <a:fld id="{7A785311-C7F2-4571-B382-4F93EC405EA1}" type="slidenum">
+              <a:rPr lang="en-US" smtClean="0"/>
+              <a:t>1</a:t>
+            </a:fld>
+            <a:endParaRPr lang="en-US"/>
+          </a:p>
+        </p:txBody>
+      </p:sp>
+    </p:spTree>
+    <p:extLst>
+      <p:ext uri="{BB962C8B-B14F-4D97-AF65-F5344CB8AC3E}">
+        <p14:creationId xmlns:p14="http://schemas.microsoft.com/office/powerpoint/2010/main" val="2397212494"/>
+      </p:ext>
+    </p:extLst>
+  </p:cSld>
+  <p:clrMapOvr>
+    <a:masterClrMapping/>
+  </p:clrMapOvr>
+</p:notes>
 </file>
 
 <file path=ppt/slideLayouts/slideLayout1.xml><?xml version="1.0" encoding="utf-8"?>
@@ -4404,7 +5012,7 @@
           <a:p>
             <a:fld id="{48A87A34-81AB-432B-8DAE-1953F412C126}" type="datetimeFigureOut">
               <a:rPr lang="en-US" dirty="0"/>
-              <a:t>3/9/2020</a:t>
+              <a:t>3/11/2020</a:t>
             </a:fld>
             <a:endParaRPr lang="en-US" dirty="0"/>
           </a:p>
@@ -4666,7 +5274,7 @@
           <a:p>
             <a:fld id="{48A87A34-81AB-432B-8DAE-1953F412C126}" type="datetimeFigureOut">
               <a:rPr lang="en-US" dirty="0"/>
-              <a:t>3/9/2020</a:t>
+              <a:t>3/11/2020</a:t>
             </a:fld>
             <a:endParaRPr lang="en-US" dirty="0"/>
           </a:p>
@@ -4857,7 +5465,7 @@
           <a:p>
             <a:fld id="{48A87A34-81AB-432B-8DAE-1953F412C126}" type="datetimeFigureOut">
               <a:rPr lang="en-US" dirty="0"/>
-              <a:t>3/9/2020</a:t>
+              <a:t>3/11/2020</a:t>
             </a:fld>
             <a:endParaRPr lang="en-US" dirty="0"/>
           </a:p>
@@ -5115,7 +5723,7 @@
           <a:p>
             <a:fld id="{48A87A34-81AB-432B-8DAE-1953F412C126}" type="datetimeFigureOut">
               <a:rPr lang="en-US" dirty="0"/>
-              <a:t>3/9/2020</a:t>
+              <a:t>3/11/2020</a:t>
             </a:fld>
             <a:endParaRPr lang="en-US" dirty="0"/>
           </a:p>
@@ -5544,7 +6152,7 @@
           <a:p>
             <a:fld id="{48A87A34-81AB-432B-8DAE-1953F412C126}" type="datetimeFigureOut">
               <a:rPr lang="en-US" dirty="0"/>
-              <a:t>3/9/2020</a:t>
+              <a:t>3/11/2020</a:t>
             </a:fld>
             <a:endParaRPr lang="en-US" dirty="0"/>
           </a:p>
@@ -6085,7 +6693,7 @@
           <a:p>
             <a:fld id="{48A87A34-81AB-432B-8DAE-1953F412C126}" type="datetimeFigureOut">
               <a:rPr lang="en-US" dirty="0"/>
-              <a:t>3/9/2020</a:t>
+              <a:t>3/11/2020</a:t>
             </a:fld>
             <a:endParaRPr lang="en-US" dirty="0"/>
           </a:p>
@@ -6800,7 +7408,7 @@
           <a:p>
             <a:fld id="{48A87A34-81AB-432B-8DAE-1953F412C126}" type="datetimeFigureOut">
               <a:rPr lang="en-US" dirty="0"/>
-              <a:t>3/9/2020</a:t>
+              <a:t>3/11/2020</a:t>
             </a:fld>
             <a:endParaRPr lang="en-US" dirty="0"/>
           </a:p>
@@ -6965,7 +7573,7 @@
           <a:p>
             <a:fld id="{48A87A34-81AB-432B-8DAE-1953F412C126}" type="datetimeFigureOut">
               <a:rPr lang="en-US" dirty="0"/>
-              <a:t>3/9/2020</a:t>
+              <a:t>3/11/2020</a:t>
             </a:fld>
             <a:endParaRPr lang="en-US" dirty="0"/>
           </a:p>
@@ -7140,7 +7748,7 @@
           <a:p>
             <a:fld id="{48A87A34-81AB-432B-8DAE-1953F412C126}" type="datetimeFigureOut">
               <a:rPr lang="en-US" dirty="0"/>
-              <a:t>3/9/2020</a:t>
+              <a:t>3/11/2020</a:t>
             </a:fld>
             <a:endParaRPr lang="en-US" dirty="0"/>
           </a:p>
@@ -7305,7 +7913,7 @@
           <a:p>
             <a:fld id="{48A87A34-81AB-432B-8DAE-1953F412C126}" type="datetimeFigureOut">
               <a:rPr lang="en-US" dirty="0"/>
-              <a:t>3/9/2020</a:t>
+              <a:t>3/11/2020</a:t>
             </a:fld>
             <a:endParaRPr lang="en-US" dirty="0"/>
           </a:p>
@@ -7550,7 +8158,7 @@
           <a:p>
             <a:fld id="{48A87A34-81AB-432B-8DAE-1953F412C126}" type="datetimeFigureOut">
               <a:rPr lang="en-US" dirty="0"/>
-              <a:t>3/9/2020</a:t>
+              <a:t>3/11/2020</a:t>
             </a:fld>
             <a:endParaRPr lang="en-US" dirty="0"/>
           </a:p>
@@ -7777,7 +8385,7 @@
           <a:p>
             <a:fld id="{48A87A34-81AB-432B-8DAE-1953F412C126}" type="datetimeFigureOut">
               <a:rPr lang="en-US" dirty="0"/>
-              <a:t>3/9/2020</a:t>
+              <a:t>3/11/2020</a:t>
             </a:fld>
             <a:endParaRPr lang="en-US" dirty="0"/>
           </a:p>
@@ -8153,7 +8761,7 @@
           <a:p>
             <a:fld id="{48A87A34-81AB-432B-8DAE-1953F412C126}" type="datetimeFigureOut">
               <a:rPr lang="en-US" dirty="0"/>
-              <a:t>3/9/2020</a:t>
+              <a:t>3/11/2020</a:t>
             </a:fld>
             <a:endParaRPr lang="en-US" dirty="0"/>
           </a:p>
@@ -8266,7 +8874,7 @@
           <a:p>
             <a:fld id="{48A87A34-81AB-432B-8DAE-1953F412C126}" type="datetimeFigureOut">
               <a:rPr lang="en-US" dirty="0"/>
-              <a:t>3/9/2020</a:t>
+              <a:t>3/11/2020</a:t>
             </a:fld>
             <a:endParaRPr lang="en-US" dirty="0"/>
           </a:p>
@@ -8356,7 +8964,7 @@
           <a:p>
             <a:fld id="{48A87A34-81AB-432B-8DAE-1953F412C126}" type="datetimeFigureOut">
               <a:rPr lang="en-US" dirty="0"/>
-              <a:t>3/9/2020</a:t>
+              <a:t>3/11/2020</a:t>
             </a:fld>
             <a:endParaRPr lang="en-US" dirty="0"/>
           </a:p>
@@ -8600,7 +9208,7 @@
           <a:p>
             <a:fld id="{48A87A34-81AB-432B-8DAE-1953F412C126}" type="datetimeFigureOut">
               <a:rPr lang="en-US" dirty="0"/>
-              <a:t>3/9/2020</a:t>
+              <a:t>3/11/2020</a:t>
             </a:fld>
             <a:endParaRPr lang="en-US" dirty="0"/>
           </a:p>
@@ -8875,7 +9483,7 @@
           <a:p>
             <a:fld id="{48A87A34-81AB-432B-8DAE-1953F412C126}" type="datetimeFigureOut">
               <a:rPr lang="en-US" dirty="0"/>
-              <a:t>3/9/2020</a:t>
+              <a:t>3/11/2020</a:t>
             </a:fld>
             <a:endParaRPr lang="en-US" dirty="0"/>
           </a:p>
@@ -11948,7 +12556,7 @@
             <a:fld id="{48A87A34-81AB-432B-8DAE-1953F412C126}" type="datetimeFigureOut">
               <a:rPr lang="en-US" dirty="0"/>
               <a:pPr/>
-              <a:t>3/9/2020</a:t>
+              <a:t>3/11/2020</a:t>
             </a:fld>
             <a:endParaRPr lang="en-US" dirty="0"/>
           </a:p>
@@ -12499,65 +13107,6 @@
       </p:grpSpPr>
       <p:pic>
         <p:nvPicPr>
-          <p:cNvPr id="7" name="Content Placeholder 7" descr="A close up of a map&#10;&#10;Description automatically generated">
-            <a:extLst>
-              <a:ext uri="{FF2B5EF4-FFF2-40B4-BE49-F238E27FC236}">
-                <a16:creationId xmlns:a16="http://schemas.microsoft.com/office/drawing/2014/main" id="{8E9A1705-3191-40CF-A2EC-2D952FBA4C43}"/>
-              </a:ext>
-            </a:extLst>
-          </p:cNvPr>
-          <p:cNvPicPr>
-            <a:picLocks noGrp="1" noChangeAspect="1"/>
-          </p:cNvPicPr>
-          <p:nvPr>
-            <p:ph sz="half" idx="2"/>
-          </p:nvPr>
-        </p:nvPicPr>
-        <p:blipFill>
-          <a:blip r:embed="rId2"/>
-          <a:stretch>
-            <a:fillRect/>
-          </a:stretch>
-        </p:blipFill>
-        <p:spPr>
-          <a:xfrm>
-            <a:off x="1459681" y="338121"/>
-            <a:ext cx="9272638" cy="6181757"/>
-          </a:xfrm>
-        </p:spPr>
-      </p:pic>
-    </p:spTree>
-    <p:extLst>
-      <p:ext uri="{BB962C8B-B14F-4D97-AF65-F5344CB8AC3E}">
-        <p14:creationId xmlns:p14="http://schemas.microsoft.com/office/powerpoint/2010/main" val="2529801168"/>
-      </p:ext>
-    </p:extLst>
-  </p:cSld>
-  <p:clrMapOvr>
-    <a:masterClrMapping/>
-  </p:clrMapOvr>
-</p:sld>
-</file>
-
-<file path=ppt/slides/slide11.xml><?xml version="1.0" encoding="utf-8"?>
-<p:sld xmlns:a="http://schemas.openxmlformats.org/drawingml/2006/main" xmlns:r="http://schemas.openxmlformats.org/officeDocument/2006/relationships" xmlns:p="http://schemas.openxmlformats.org/presentationml/2006/main">
-  <p:cSld>
-    <p:spTree>
-      <p:nvGrpSpPr>
-        <p:cNvPr id="1" name=""/>
-        <p:cNvGrpSpPr/>
-        <p:nvPr/>
-      </p:nvGrpSpPr>
-      <p:grpSpPr>
-        <a:xfrm>
-          <a:off x="0" y="0"/>
-          <a:ext cx="0" cy="0"/>
-          <a:chOff x="0" y="0"/>
-          <a:chExt cx="0" cy="0"/>
-        </a:xfrm>
-      </p:grpSpPr>
-      <p:pic>
-        <p:nvPicPr>
           <p:cNvPr id="6" name="Content Placeholder 5" descr="A close up of a map&#10;&#10;Description automatically generated">
             <a:extLst>
               <a:ext uri="{FF2B5EF4-FFF2-40B4-BE49-F238E27FC236}">
@@ -12580,8 +13129,8 @@
         </p:blipFill>
         <p:spPr>
           <a:xfrm>
-            <a:off x="1373177" y="176743"/>
-            <a:ext cx="9527071" cy="6351379"/>
+            <a:off x="1752600" y="533400"/>
+            <a:ext cx="8686800" cy="5791199"/>
           </a:xfrm>
         </p:spPr>
       </p:pic>
@@ -12598,7 +13147,7 @@
 </p:sld>
 </file>
 
-<file path=ppt/slides/slide12.xml><?xml version="1.0" encoding="utf-8"?>
+<file path=ppt/slides/slide11.xml><?xml version="1.0" encoding="utf-8"?>
 <p:sld xmlns:a="http://schemas.openxmlformats.org/drawingml/2006/main" xmlns:r="http://schemas.openxmlformats.org/officeDocument/2006/relationships" xmlns:p="http://schemas.openxmlformats.org/presentationml/2006/main">
   <p:cSld>
     <p:spTree>
@@ -12637,8 +13186,8 @@
         </p:blipFill>
         <p:spPr>
           <a:xfrm>
-            <a:off x="1305108" y="235072"/>
-            <a:ext cx="9581783" cy="6387855"/>
+            <a:off x="1752600" y="533400"/>
+            <a:ext cx="8686800" cy="5791200"/>
           </a:xfrm>
           <a:prstGeom prst="rect">
             <a:avLst/>
@@ -12658,7 +13207,7 @@
 </p:sld>
 </file>
 
-<file path=ppt/slides/slide13.xml><?xml version="1.0" encoding="utf-8"?>
+<file path=ppt/slides/slide12.xml><?xml version="1.0" encoding="utf-8"?>
 <p:sld xmlns:a="http://schemas.openxmlformats.org/drawingml/2006/main" xmlns:r="http://schemas.openxmlformats.org/officeDocument/2006/relationships" xmlns:p="http://schemas.openxmlformats.org/presentationml/2006/main">
   <p:cSld>
     <p:spTree>
@@ -12697,8 +13246,8 @@
         </p:blipFill>
         <p:spPr>
           <a:xfrm>
-            <a:off x="1318210" y="243807"/>
-            <a:ext cx="9555580" cy="6370386"/>
+            <a:off x="1752600" y="533400"/>
+            <a:ext cx="8686800" cy="5791199"/>
           </a:xfrm>
           <a:prstGeom prst="rect">
             <a:avLst/>
@@ -12718,7 +13267,7 @@
 </p:sld>
 </file>
 
-<file path=ppt/slides/slide14.xml><?xml version="1.0" encoding="utf-8"?>
+<file path=ppt/slides/slide13.xml><?xml version="1.0" encoding="utf-8"?>
 <p:sld xmlns:a="http://schemas.openxmlformats.org/drawingml/2006/main" xmlns:r="http://schemas.openxmlformats.org/officeDocument/2006/relationships" xmlns:p="http://schemas.openxmlformats.org/presentationml/2006/main">
   <p:cSld>
     <p:spTree>
@@ -12757,8 +13306,8 @@
         </p:blipFill>
         <p:spPr>
           <a:xfrm>
-            <a:off x="1446550" y="470046"/>
-            <a:ext cx="9145250" cy="6096833"/>
+            <a:off x="1752600" y="533400"/>
+            <a:ext cx="8686800" cy="5791200"/>
           </a:xfrm>
           <a:prstGeom prst="rect">
             <a:avLst/>
@@ -12778,7 +13327,7 @@
 </p:sld>
 </file>
 
-<file path=ppt/slides/slide15.xml><?xml version="1.0" encoding="utf-8"?>
+<file path=ppt/slides/slide14.xml><?xml version="1.0" encoding="utf-8"?>
 <p:sld xmlns:a="http://schemas.openxmlformats.org/drawingml/2006/main" xmlns:r="http://schemas.openxmlformats.org/officeDocument/2006/relationships" xmlns:p="http://schemas.openxmlformats.org/presentationml/2006/main">
   <p:cSld>
     <p:spTree>
@@ -12817,8 +13366,8 @@
         </p:blipFill>
         <p:spPr>
           <a:xfrm>
-            <a:off x="1462389" y="339926"/>
-            <a:ext cx="9267221" cy="6178147"/>
+            <a:off x="1752600" y="533400"/>
+            <a:ext cx="8686800" cy="5791200"/>
           </a:xfrm>
           <a:prstGeom prst="rect">
             <a:avLst/>
@@ -12838,7 +13387,7 @@
 </p:sld>
 </file>
 
-<file path=ppt/slides/slide16.xml><?xml version="1.0" encoding="utf-8"?>
+<file path=ppt/slides/slide15.xml><?xml version="1.0" encoding="utf-8"?>
 <p:sld xmlns:a="http://schemas.openxmlformats.org/drawingml/2006/main" xmlns:r="http://schemas.openxmlformats.org/officeDocument/2006/relationships" xmlns:p="http://schemas.openxmlformats.org/presentationml/2006/main">
   <p:cSld>
     <p:spTree>
@@ -12899,161 +13448,60 @@
             <p:ph sz="half" idx="1"/>
           </p:nvPr>
         </p:nvSpPr>
-        <p:spPr/>
+        <p:spPr>
+          <a:xfrm>
+            <a:off x="1141410" y="2249486"/>
+            <a:ext cx="10054910" cy="3541714"/>
+          </a:xfrm>
+        </p:spPr>
         <p:txBody>
           <a:bodyPr/>
           <a:lstStyle/>
           <a:p>
             <a:r>
               <a:rPr lang="en-US" dirty="0"/>
-              <a:t>Implications of findings and what they mean.</a:t>
+              <a:t>We reject the null hypothesis (type 1 error)</a:t>
             </a:r>
           </a:p>
           <a:p>
-            <a:r>
-              <a:rPr lang="en-US" dirty="0"/>
-              <a:t>t-test</a:t>
-            </a:r>
+            <a:endParaRPr lang="en-US" dirty="0"/>
           </a:p>
         </p:txBody>
       </p:sp>
-      <p:sp>
-        <p:nvSpPr>
-          <p:cNvPr id="4" name="Content Placeholder 3">
+      <p:pic>
+        <p:nvPicPr>
+          <p:cNvPr id="6" name="Picture 5">
             <a:extLst>
               <a:ext uri="{FF2B5EF4-FFF2-40B4-BE49-F238E27FC236}">
-                <a16:creationId xmlns:a16="http://schemas.microsoft.com/office/drawing/2014/main" id="{5100C0EA-1719-414E-9848-04F30AF84F96}"/>
+                <a16:creationId xmlns:a16="http://schemas.microsoft.com/office/drawing/2014/main" id="{FDF9368D-81C1-4B1A-B41B-F695CEBFDD56}"/>
               </a:ext>
             </a:extLst>
           </p:cNvPr>
-          <p:cNvSpPr>
-            <a:spLocks noGrp="1"/>
-          </p:cNvSpPr>
-          <p:nvPr>
-            <p:ph sz="half" idx="2"/>
-          </p:nvPr>
-        </p:nvSpPr>
-        <p:spPr/>
-        <p:txBody>
-          <a:bodyPr/>
-          <a:lstStyle/>
-          <a:p>
-            <a:endParaRPr lang="en-US"/>
-          </a:p>
-        </p:txBody>
-      </p:sp>
+          <p:cNvPicPr>
+            <a:picLocks noChangeAspect="1"/>
+          </p:cNvPicPr>
+          <p:nvPr/>
+        </p:nvPicPr>
+        <p:blipFill>
+          <a:blip r:embed="rId2"/>
+          <a:stretch>
+            <a:fillRect/>
+          </a:stretch>
+        </p:blipFill>
+        <p:spPr>
+          <a:xfrm>
+            <a:off x="2716484" y="3429000"/>
+            <a:ext cx="6904762" cy="1495238"/>
+          </a:xfrm>
+          <a:prstGeom prst="rect">
+            <a:avLst/>
+          </a:prstGeom>
+        </p:spPr>
+      </p:pic>
     </p:spTree>
     <p:extLst>
       <p:ext uri="{BB962C8B-B14F-4D97-AF65-F5344CB8AC3E}">
         <p14:creationId xmlns:p14="http://schemas.microsoft.com/office/powerpoint/2010/main" val="3076883286"/>
-      </p:ext>
-    </p:extLst>
-  </p:cSld>
-  <p:clrMapOvr>
-    <a:masterClrMapping/>
-  </p:clrMapOvr>
-</p:sld>
-</file>
-
-<file path=ppt/slides/slide17.xml><?xml version="1.0" encoding="utf-8"?>
-<p:sld xmlns:a="http://schemas.openxmlformats.org/drawingml/2006/main" xmlns:r="http://schemas.openxmlformats.org/officeDocument/2006/relationships" xmlns:p="http://schemas.openxmlformats.org/presentationml/2006/main">
-  <p:cSld>
-    <p:spTree>
-      <p:nvGrpSpPr>
-        <p:cNvPr id="1" name=""/>
-        <p:cNvGrpSpPr/>
-        <p:nvPr/>
-      </p:nvGrpSpPr>
-      <p:grpSpPr>
-        <a:xfrm>
-          <a:off x="0" y="0"/>
-          <a:ext cx="0" cy="0"/>
-          <a:chOff x="0" y="0"/>
-          <a:chExt cx="0" cy="0"/>
-        </a:xfrm>
-      </p:grpSpPr>
-      <p:sp>
-        <p:nvSpPr>
-          <p:cNvPr id="2" name="Title 1">
-            <a:extLst>
-              <a:ext uri="{FF2B5EF4-FFF2-40B4-BE49-F238E27FC236}">
-                <a16:creationId xmlns:a16="http://schemas.microsoft.com/office/drawing/2014/main" id="{A8189972-1D65-46EB-A407-33FE1C96AA38}"/>
-              </a:ext>
-            </a:extLst>
-          </p:cNvPr>
-          <p:cNvSpPr>
-            <a:spLocks noGrp="1"/>
-          </p:cNvSpPr>
-          <p:nvPr>
-            <p:ph type="title"/>
-          </p:nvPr>
-        </p:nvSpPr>
-        <p:spPr/>
-        <p:txBody>
-          <a:bodyPr/>
-          <a:lstStyle/>
-          <a:p>
-            <a:r>
-              <a:rPr lang="en-US" dirty="0"/>
-              <a:t>Clean up</a:t>
-            </a:r>
-          </a:p>
-        </p:txBody>
-      </p:sp>
-      <p:sp>
-        <p:nvSpPr>
-          <p:cNvPr id="3" name="Content Placeholder 2">
-            <a:extLst>
-              <a:ext uri="{FF2B5EF4-FFF2-40B4-BE49-F238E27FC236}">
-                <a16:creationId xmlns:a16="http://schemas.microsoft.com/office/drawing/2014/main" id="{26E7E5DC-18A7-4942-83F1-4AB2EBE4DA88}"/>
-              </a:ext>
-            </a:extLst>
-          </p:cNvPr>
-          <p:cNvSpPr>
-            <a:spLocks noGrp="1"/>
-          </p:cNvSpPr>
-          <p:nvPr>
-            <p:ph sz="half" idx="1"/>
-          </p:nvPr>
-        </p:nvSpPr>
-        <p:spPr/>
-        <p:txBody>
-          <a:bodyPr/>
-          <a:lstStyle/>
-          <a:p>
-            <a:endParaRPr lang="en-US"/>
-          </a:p>
-        </p:txBody>
-      </p:sp>
-      <p:sp>
-        <p:nvSpPr>
-          <p:cNvPr id="4" name="Content Placeholder 3">
-            <a:extLst>
-              <a:ext uri="{FF2B5EF4-FFF2-40B4-BE49-F238E27FC236}">
-                <a16:creationId xmlns:a16="http://schemas.microsoft.com/office/drawing/2014/main" id="{41408F6E-7A57-457A-80FF-E351E083D0C5}"/>
-              </a:ext>
-            </a:extLst>
-          </p:cNvPr>
-          <p:cNvSpPr>
-            <a:spLocks noGrp="1"/>
-          </p:cNvSpPr>
-          <p:nvPr>
-            <p:ph sz="half" idx="2"/>
-          </p:nvPr>
-        </p:nvSpPr>
-        <p:spPr/>
-        <p:txBody>
-          <a:bodyPr/>
-          <a:lstStyle/>
-          <a:p>
-            <a:endParaRPr lang="en-US" dirty="0"/>
-          </a:p>
-        </p:txBody>
-      </p:sp>
-    </p:spTree>
-    <p:extLst>
-      <p:ext uri="{BB962C8B-B14F-4D97-AF65-F5344CB8AC3E}">
-        <p14:creationId xmlns:p14="http://schemas.microsoft.com/office/powerpoint/2010/main" val="2954277170"/>
       </p:ext>
     </p:extLst>
   </p:cSld>
@@ -13136,7 +13584,7 @@
         </p:blipFill>
         <p:spPr>
           <a:xfrm>
-            <a:off x="5350694" y="3589475"/>
+            <a:off x="5310054" y="2746195"/>
             <a:ext cx="2451394" cy="3268525"/>
           </a:xfrm>
         </p:spPr>
@@ -13163,7 +13611,7 @@
         </p:blipFill>
         <p:spPr>
           <a:xfrm>
-            <a:off x="8098971" y="1808819"/>
+            <a:off x="8002413" y="2264755"/>
             <a:ext cx="3927676" cy="2945757"/>
           </a:xfrm>
           <a:prstGeom prst="rect">
@@ -13185,8 +13633,8 @@
         </p:nvSpPr>
         <p:spPr>
           <a:xfrm>
-            <a:off x="1141413" y="1650483"/>
-            <a:ext cx="6957558" cy="1938992"/>
+            <a:off x="1141412" y="1650483"/>
+            <a:ext cx="10146963" cy="4893647"/>
           </a:xfrm>
           <a:prstGeom prst="rect">
             <a:avLst/>
@@ -13217,13 +13665,119 @@
               <a:rPr lang="en-US" sz="2400" dirty="0"/>
               <a:t>Why so many? </a:t>
             </a:r>
-            <a:br>
-              <a:rPr lang="en-US" sz="2400" dirty="0"/>
-            </a:br>
+          </a:p>
+          <a:p>
             <a:r>
               <a:rPr lang="en-US" sz="2400" dirty="0"/>
-              <a:t>Iceland is located on top of the Atlantic ridge, where the Eurasian and N. American tectonic plates meet.</a:t>
+              <a:t>	Iceland is located on top of </a:t>
             </a:r>
+          </a:p>
+          <a:p>
+            <a:r>
+              <a:rPr lang="en-US" sz="2400" dirty="0"/>
+              <a:t>	the	Atlantic ridge, where the </a:t>
+            </a:r>
+          </a:p>
+          <a:p>
+            <a:r>
+              <a:rPr lang="en-US" sz="2400" dirty="0"/>
+              <a:t>	Eurasian and N. American </a:t>
+            </a:r>
+          </a:p>
+          <a:p>
+            <a:r>
+              <a:rPr lang="en-US" sz="2400" dirty="0"/>
+              <a:t>	tectonic plates meet.</a:t>
+            </a:r>
+          </a:p>
+          <a:p>
+            <a:pPr marL="342900" indent="-342900">
+              <a:buFont typeface="Arial" panose="020B0604020202020204" pitchFamily="34" charset="0"/>
+              <a:buChar char="•"/>
+            </a:pPr>
+            <a:r>
+              <a:rPr lang="en-US" sz="2400" dirty="0"/>
+              <a:t>The two plates are separating</a:t>
+            </a:r>
+          </a:p>
+          <a:p>
+            <a:r>
+              <a:rPr lang="en-US" sz="2400" dirty="0"/>
+              <a:t>	at about an inch per year.</a:t>
+            </a:r>
+          </a:p>
+          <a:p>
+            <a:pPr marL="342900" indent="-342900">
+              <a:buFont typeface="Arial" panose="020B0604020202020204" pitchFamily="34" charset="0"/>
+              <a:buChar char="•"/>
+            </a:pPr>
+            <a:r>
+              <a:rPr lang="en-US" sz="2400" dirty="0"/>
+              <a:t>Don’t get too scared, it will</a:t>
+            </a:r>
+          </a:p>
+          <a:p>
+            <a:r>
+              <a:rPr lang="en-US" sz="2400" dirty="0"/>
+              <a:t>	take about one thousand </a:t>
+            </a:r>
+          </a:p>
+          <a:p>
+            <a:r>
+              <a:rPr lang="en-US" sz="2400" dirty="0"/>
+              <a:t>	years for them to reach 0.15 </a:t>
+            </a:r>
+          </a:p>
+          <a:p>
+            <a:r>
+              <a:rPr lang="en-US" sz="2400" dirty="0"/>
+              <a:t>	miles apart!</a:t>
+            </a:r>
+          </a:p>
+          <a:p>
+            <a:endParaRPr lang="en-US" sz="2400" dirty="0"/>
+          </a:p>
+        </p:txBody>
+      </p:sp>
+      <p:sp>
+        <p:nvSpPr>
+          <p:cNvPr id="6" name="TextBox 5">
+            <a:extLst>
+              <a:ext uri="{FF2B5EF4-FFF2-40B4-BE49-F238E27FC236}">
+                <a16:creationId xmlns:a16="http://schemas.microsoft.com/office/drawing/2014/main" id="{AB373F71-56AA-4ED6-A23D-89EA9F6868DE}"/>
+              </a:ext>
+            </a:extLst>
+          </p:cNvPr>
+          <p:cNvSpPr txBox="1"/>
+          <p:nvPr/>
+        </p:nvSpPr>
+        <p:spPr>
+          <a:xfrm>
+            <a:off x="2452575" y="6550223"/>
+            <a:ext cx="8346558" cy="307777"/>
+          </a:xfrm>
+          <a:prstGeom prst="rect">
+            <a:avLst/>
+          </a:prstGeom>
+          <a:noFill/>
+        </p:spPr>
+        <p:txBody>
+          <a:bodyPr wrap="square" rtlCol="0">
+            <a:spAutoFit/>
+          </a:bodyPr>
+          <a:lstStyle/>
+          <a:p>
+            <a:r>
+              <a:rPr lang="en-US" sz="1400" dirty="0"/>
+              <a:t>Source: </a:t>
+            </a:r>
+            <a:r>
+              <a:rPr lang="en-US" sz="1400" dirty="0">
+                <a:hlinkClick r:id="rId4"/>
+              </a:rPr>
+              <a:t>https://icelandmag.is/article/why-constant-earthquakes-iceland-slowly-being-torn-apart</a:t>
+            </a:r>
+            <a:endParaRPr lang="en-US" sz="1400" dirty="0"/>
           </a:p>
         </p:txBody>
       </p:sp>
@@ -13481,417 +14035,6 @@
           <p:cNvPr id="2" name="Title 1">
             <a:extLst>
               <a:ext uri="{FF2B5EF4-FFF2-40B4-BE49-F238E27FC236}">
-                <a16:creationId xmlns:a16="http://schemas.microsoft.com/office/drawing/2014/main" id="{ADF76860-6E7A-400E-965F-EF3D2A91A5FF}"/>
-              </a:ext>
-            </a:extLst>
-          </p:cNvPr>
-          <p:cNvSpPr>
-            <a:spLocks noGrp="1"/>
-          </p:cNvSpPr>
-          <p:nvPr>
-            <p:ph type="title"/>
-          </p:nvPr>
-        </p:nvSpPr>
-        <p:spPr>
-          <a:xfrm>
-            <a:off x="893135" y="808073"/>
-            <a:ext cx="9905998" cy="1218129"/>
-          </a:xfrm>
-        </p:spPr>
-        <p:txBody>
-          <a:bodyPr/>
-          <a:lstStyle/>
-          <a:p>
-            <a:r>
-              <a:rPr lang="en-US" dirty="0"/>
-              <a:t>So many earthquakes</a:t>
-            </a:r>
-          </a:p>
-        </p:txBody>
-      </p:sp>
-      <p:sp>
-        <p:nvSpPr>
-          <p:cNvPr id="3" name="Content Placeholder 2">
-            <a:extLst>
-              <a:ext uri="{FF2B5EF4-FFF2-40B4-BE49-F238E27FC236}">
-                <a16:creationId xmlns:a16="http://schemas.microsoft.com/office/drawing/2014/main" id="{DD83A1B8-ACD5-4749-B67C-56C92F754DA4}"/>
-              </a:ext>
-            </a:extLst>
-          </p:cNvPr>
-          <p:cNvSpPr>
-            <a:spLocks noGrp="1"/>
-          </p:cNvSpPr>
-          <p:nvPr>
-            <p:ph idx="1"/>
-          </p:nvPr>
-        </p:nvSpPr>
-        <p:spPr>
-          <a:xfrm>
-            <a:off x="893135" y="1807536"/>
-            <a:ext cx="5393365" cy="3541714"/>
-          </a:xfrm>
-        </p:spPr>
-        <p:txBody>
-          <a:bodyPr>
-            <a:normAutofit/>
-          </a:bodyPr>
-          <a:lstStyle/>
-          <a:p>
-            <a:r>
-              <a:rPr lang="en-US" dirty="0"/>
-              <a:t>The two plates are separating at about an inch per year.</a:t>
-            </a:r>
-          </a:p>
-          <a:p>
-            <a:r>
-              <a:rPr lang="en-US" dirty="0"/>
-              <a:t>Don’t get too scared, it will take about one thousand years for them to reach 0.15 miles apart!</a:t>
-            </a:r>
-          </a:p>
-        </p:txBody>
-      </p:sp>
-      <p:pic>
-        <p:nvPicPr>
-          <p:cNvPr id="4" name="Picture 3">
-            <a:extLst>
-              <a:ext uri="{FF2B5EF4-FFF2-40B4-BE49-F238E27FC236}">
-                <a16:creationId xmlns:a16="http://schemas.microsoft.com/office/drawing/2014/main" id="{63267709-BAFE-4AE3-95B0-1BD9F242E680}"/>
-              </a:ext>
-            </a:extLst>
-          </p:cNvPr>
-          <p:cNvPicPr>
-            <a:picLocks noChangeAspect="1"/>
-          </p:cNvPicPr>
-          <p:nvPr/>
-        </p:nvPicPr>
-        <p:blipFill>
-          <a:blip r:embed="rId2"/>
-          <a:stretch>
-            <a:fillRect/>
-          </a:stretch>
-        </p:blipFill>
-        <p:spPr>
-          <a:xfrm>
-            <a:off x="6222702" y="1922024"/>
-            <a:ext cx="4950124" cy="3033947"/>
-          </a:xfrm>
-          <a:prstGeom prst="rect">
-            <a:avLst/>
-          </a:prstGeom>
-        </p:spPr>
-      </p:pic>
-      <p:sp>
-        <p:nvSpPr>
-          <p:cNvPr id="5" name="TextBox 4">
-            <a:extLst>
-              <a:ext uri="{FF2B5EF4-FFF2-40B4-BE49-F238E27FC236}">
-                <a16:creationId xmlns:a16="http://schemas.microsoft.com/office/drawing/2014/main" id="{9E75A244-D017-4831-9487-8DE4F9FAFFF0}"/>
-              </a:ext>
-            </a:extLst>
-          </p:cNvPr>
-          <p:cNvSpPr txBox="1"/>
-          <p:nvPr/>
-        </p:nvSpPr>
-        <p:spPr>
-          <a:xfrm>
-            <a:off x="2452575" y="6550223"/>
-            <a:ext cx="8346558" cy="307777"/>
-          </a:xfrm>
-          <a:prstGeom prst="rect">
-            <a:avLst/>
-          </a:prstGeom>
-          <a:noFill/>
-        </p:spPr>
-        <p:txBody>
-          <a:bodyPr wrap="square" rtlCol="0">
-            <a:spAutoFit/>
-          </a:bodyPr>
-          <a:lstStyle/>
-          <a:p>
-            <a:r>
-              <a:rPr lang="en-US" sz="1400" dirty="0"/>
-              <a:t>Source: </a:t>
-            </a:r>
-            <a:r>
-              <a:rPr lang="en-US" sz="1400" dirty="0">
-                <a:hlinkClick r:id="rId3"/>
-              </a:rPr>
-              <a:t>https://icelandmag.is/article/why-constant-earthquakes-iceland-slowly-being-torn-apart</a:t>
-            </a:r>
-            <a:endParaRPr lang="en-US" sz="1400" dirty="0"/>
-          </a:p>
-        </p:txBody>
-      </p:sp>
-    </p:spTree>
-    <p:extLst>
-      <p:ext uri="{BB962C8B-B14F-4D97-AF65-F5344CB8AC3E}">
-        <p14:creationId xmlns:p14="http://schemas.microsoft.com/office/powerpoint/2010/main" val="4076094531"/>
-      </p:ext>
-    </p:extLst>
-  </p:cSld>
-  <p:clrMapOvr>
-    <a:masterClrMapping/>
-  </p:clrMapOvr>
-  <p:timing>
-    <p:tnLst>
-      <p:par>
-        <p:cTn id="1" dur="indefinite" restart="never" nodeType="tmRoot">
-          <p:childTnLst>
-            <p:seq concurrent="1" nextAc="seek">
-              <p:cTn id="2" dur="indefinite" nodeType="mainSeq">
-                <p:childTnLst>
-                  <p:par>
-                    <p:cTn id="3" fill="hold">
-                      <p:stCondLst>
-                        <p:cond delay="indefinite"/>
-                      </p:stCondLst>
-                      <p:childTnLst>
-                        <p:par>
-                          <p:cTn id="4" fill="hold">
-                            <p:stCondLst>
-                              <p:cond delay="0"/>
-                            </p:stCondLst>
-                            <p:childTnLst>
-                              <p:par>
-                                <p:cTn id="5" presetID="10" presetClass="entr" presetSubtype="0" fill="hold" grpId="0" nodeType="clickEffect">
-                                  <p:stCondLst>
-                                    <p:cond delay="0"/>
-                                  </p:stCondLst>
-                                  <p:childTnLst>
-                                    <p:set>
-                                      <p:cBhvr>
-                                        <p:cTn id="6" dur="1" fill="hold">
-                                          <p:stCondLst>
-                                            <p:cond delay="0"/>
-                                          </p:stCondLst>
-                                        </p:cTn>
-                                        <p:tgtEl>
-                                          <p:spTgt spid="2"/>
-                                        </p:tgtEl>
-                                        <p:attrNameLst>
-                                          <p:attrName>style.visibility</p:attrName>
-                                        </p:attrNameLst>
-                                      </p:cBhvr>
-                                      <p:to>
-                                        <p:strVal val="visible"/>
-                                      </p:to>
-                                    </p:set>
-                                    <p:animEffect transition="in" filter="fade">
-                                      <p:cBhvr>
-                                        <p:cTn id="7" dur="500"/>
-                                        <p:tgtEl>
-                                          <p:spTgt spid="2"/>
-                                        </p:tgtEl>
-                                      </p:cBhvr>
-                                    </p:animEffect>
-                                  </p:childTnLst>
-                                </p:cTn>
-                              </p:par>
-                            </p:childTnLst>
-                          </p:cTn>
-                        </p:par>
-                        <p:par>
-                          <p:cTn id="8" fill="hold">
-                            <p:stCondLst>
-                              <p:cond delay="500"/>
-                            </p:stCondLst>
-                            <p:childTnLst>
-                              <p:par>
-                                <p:cTn id="9" presetID="6" presetClass="entr" presetSubtype="16" fill="hold" nodeType="afterEffect">
-                                  <p:stCondLst>
-                                    <p:cond delay="0"/>
-                                  </p:stCondLst>
-                                  <p:childTnLst>
-                                    <p:set>
-                                      <p:cBhvr>
-                                        <p:cTn id="10" dur="1" fill="hold">
-                                          <p:stCondLst>
-                                            <p:cond delay="0"/>
-                                          </p:stCondLst>
-                                        </p:cTn>
-                                        <p:tgtEl>
-                                          <p:spTgt spid="4"/>
-                                        </p:tgtEl>
-                                        <p:attrNameLst>
-                                          <p:attrName>style.visibility</p:attrName>
-                                        </p:attrNameLst>
-                                      </p:cBhvr>
-                                      <p:to>
-                                        <p:strVal val="visible"/>
-                                      </p:to>
-                                    </p:set>
-                                    <p:animEffect transition="in" filter="circle(in)">
-                                      <p:cBhvr>
-                                        <p:cTn id="11" dur="2000"/>
-                                        <p:tgtEl>
-                                          <p:spTgt spid="4"/>
-                                        </p:tgtEl>
-                                      </p:cBhvr>
-                                    </p:animEffect>
-                                  </p:childTnLst>
-                                </p:cTn>
-                              </p:par>
-                            </p:childTnLst>
-                          </p:cTn>
-                        </p:par>
-                        <p:par>
-                          <p:cTn id="12" fill="hold">
-                            <p:stCondLst>
-                              <p:cond delay="2500"/>
-                            </p:stCondLst>
-                            <p:childTnLst>
-                              <p:par>
-                                <p:cTn id="13" presetID="10" presetClass="entr" presetSubtype="0" fill="hold" grpId="0" nodeType="afterEffect">
-                                  <p:stCondLst>
-                                    <p:cond delay="1000"/>
-                                  </p:stCondLst>
-                                  <p:childTnLst>
-                                    <p:set>
-                                      <p:cBhvr>
-                                        <p:cTn id="14" dur="1" fill="hold">
-                                          <p:stCondLst>
-                                            <p:cond delay="0"/>
-                                          </p:stCondLst>
-                                        </p:cTn>
-                                        <p:tgtEl>
-                                          <p:spTgt spid="3">
-                                            <p:txEl>
-                                              <p:pRg st="0" end="0"/>
-                                            </p:txEl>
-                                          </p:spTgt>
-                                        </p:tgtEl>
-                                        <p:attrNameLst>
-                                          <p:attrName>style.visibility</p:attrName>
-                                        </p:attrNameLst>
-                                      </p:cBhvr>
-                                      <p:to>
-                                        <p:strVal val="visible"/>
-                                      </p:to>
-                                    </p:set>
-                                    <p:animEffect transition="in" filter="fade">
-                                      <p:cBhvr>
-                                        <p:cTn id="15" dur="500"/>
-                                        <p:tgtEl>
-                                          <p:spTgt spid="3">
-                                            <p:txEl>
-                                              <p:pRg st="0" end="0"/>
-                                            </p:txEl>
-                                          </p:spTgt>
-                                        </p:tgtEl>
-                                      </p:cBhvr>
-                                    </p:animEffect>
-                                  </p:childTnLst>
-                                </p:cTn>
-                              </p:par>
-                            </p:childTnLst>
-                          </p:cTn>
-                        </p:par>
-                        <p:par>
-                          <p:cTn id="16" fill="hold">
-                            <p:stCondLst>
-                              <p:cond delay="4000"/>
-                            </p:stCondLst>
-                            <p:childTnLst>
-                              <p:par>
-                                <p:cTn id="17" presetID="10" presetClass="entr" presetSubtype="0" fill="hold" grpId="0" nodeType="afterEffect">
-                                  <p:stCondLst>
-                                    <p:cond delay="1000"/>
-                                  </p:stCondLst>
-                                  <p:childTnLst>
-                                    <p:set>
-                                      <p:cBhvr>
-                                        <p:cTn id="18" dur="1" fill="hold">
-                                          <p:stCondLst>
-                                            <p:cond delay="0"/>
-                                          </p:stCondLst>
-                                        </p:cTn>
-                                        <p:tgtEl>
-                                          <p:spTgt spid="3">
-                                            <p:txEl>
-                                              <p:pRg st="1" end="1"/>
-                                            </p:txEl>
-                                          </p:spTgt>
-                                        </p:tgtEl>
-                                        <p:attrNameLst>
-                                          <p:attrName>style.visibility</p:attrName>
-                                        </p:attrNameLst>
-                                      </p:cBhvr>
-                                      <p:to>
-                                        <p:strVal val="visible"/>
-                                      </p:to>
-                                    </p:set>
-                                    <p:animEffect transition="in" filter="fade">
-                                      <p:cBhvr>
-                                        <p:cTn id="19" dur="500"/>
-                                        <p:tgtEl>
-                                          <p:spTgt spid="3">
-                                            <p:txEl>
-                                              <p:pRg st="1" end="1"/>
-                                            </p:txEl>
-                                          </p:spTgt>
-                                        </p:tgtEl>
-                                      </p:cBhvr>
-                                    </p:animEffect>
-                                  </p:childTnLst>
-                                </p:cTn>
-                              </p:par>
-                            </p:childTnLst>
-                          </p:cTn>
-                        </p:par>
-                      </p:childTnLst>
-                    </p:cTn>
-                  </p:par>
-                </p:childTnLst>
-              </p:cTn>
-              <p:prevCondLst>
-                <p:cond evt="onPrev" delay="0">
-                  <p:tgtEl>
-                    <p:sldTgt/>
-                  </p:tgtEl>
-                </p:cond>
-              </p:prevCondLst>
-              <p:nextCondLst>
-                <p:cond evt="onNext" delay="0">
-                  <p:tgtEl>
-                    <p:sldTgt/>
-                  </p:tgtEl>
-                </p:cond>
-              </p:nextCondLst>
-            </p:seq>
-          </p:childTnLst>
-        </p:cTn>
-      </p:par>
-    </p:tnLst>
-    <p:bldLst>
-      <p:bldP spid="2" grpId="0"/>
-      <p:bldP spid="3" grpId="0" build="p"/>
-    </p:bldLst>
-  </p:timing>
-</p:sld>
-</file>
-
-<file path=ppt/slides/slide4.xml><?xml version="1.0" encoding="utf-8"?>
-<p:sld xmlns:a="http://schemas.openxmlformats.org/drawingml/2006/main" xmlns:r="http://schemas.openxmlformats.org/officeDocument/2006/relationships" xmlns:p="http://schemas.openxmlformats.org/presentationml/2006/main">
-  <p:cSld>
-    <p:spTree>
-      <p:nvGrpSpPr>
-        <p:cNvPr id="1" name=""/>
-        <p:cNvGrpSpPr/>
-        <p:nvPr/>
-      </p:nvGrpSpPr>
-      <p:grpSpPr>
-        <a:xfrm>
-          <a:off x="0" y="0"/>
-          <a:ext cx="0" cy="0"/>
-          <a:chOff x="0" y="0"/>
-          <a:chExt cx="0" cy="0"/>
-        </a:xfrm>
-      </p:grpSpPr>
-      <p:sp>
-        <p:nvSpPr>
-          <p:cNvPr id="2" name="Title 1">
-            <a:extLst>
-              <a:ext uri="{FF2B5EF4-FFF2-40B4-BE49-F238E27FC236}">
                 <a16:creationId xmlns:a16="http://schemas.microsoft.com/office/drawing/2014/main" id="{0E62FE22-81C4-4B15-824C-CCAF8C8AFB0F}"/>
               </a:ext>
             </a:extLst>
@@ -13905,7 +14048,7 @@
         </p:nvSpPr>
         <p:spPr>
           <a:xfrm>
-            <a:off x="1283179" y="3613706"/>
+            <a:off x="1283179" y="738426"/>
             <a:ext cx="9905998" cy="1133065"/>
           </a:xfrm>
         </p:spPr>
@@ -13915,7 +14058,7 @@
           <a:p>
             <a:r>
               <a:rPr lang="en-US" dirty="0"/>
-              <a:t>Alternative hypothesis:</a:t>
+              <a:t>hypothesis:</a:t>
             </a:r>
           </a:p>
         </p:txBody>
@@ -13938,7 +14081,7 @@
         </p:nvSpPr>
         <p:spPr>
           <a:xfrm>
-            <a:off x="1283180" y="4573654"/>
+            <a:off x="1283180" y="1698374"/>
             <a:ext cx="9625642" cy="1971639"/>
           </a:xfrm>
         </p:spPr>
@@ -13953,7 +14096,15 @@
             </a:pPr>
             <a:r>
               <a:rPr lang="en-US" sz="2000" dirty="0"/>
-              <a:t>Earthquakes of magnitude 6.1or higher have greater than 3.9% impact on the following economic areas:</a:t>
+              <a:t>Earthquakes of magnitude 6.1or higher reduce </a:t>
+            </a:r>
+            <a:r>
+              <a:rPr lang="en-US" sz="2000"/>
+              <a:t>the normal growth rate </a:t>
+            </a:r>
+            <a:r>
+              <a:rPr lang="en-US" sz="2000" dirty="0"/>
+              <a:t>of 3.9% on the following economic areas:</a:t>
             </a:r>
           </a:p>
           <a:p>
@@ -13982,60 +14133,6 @@
               <a:buNone/>
             </a:pPr>
             <a:endParaRPr lang="en-US" dirty="0"/>
-          </a:p>
-        </p:txBody>
-      </p:sp>
-      <p:sp>
-        <p:nvSpPr>
-          <p:cNvPr id="4" name="Title 1">
-            <a:extLst>
-              <a:ext uri="{FF2B5EF4-FFF2-40B4-BE49-F238E27FC236}">
-                <a16:creationId xmlns:a16="http://schemas.microsoft.com/office/drawing/2014/main" id="{8FF6E97B-5CA4-45B9-BF72-D381EEF22D53}"/>
-              </a:ext>
-            </a:extLst>
-          </p:cNvPr>
-          <p:cNvSpPr txBox="1">
-            <a:spLocks/>
-          </p:cNvSpPr>
-          <p:nvPr/>
-        </p:nvSpPr>
-        <p:spPr>
-          <a:xfrm>
-            <a:off x="1283179" y="483455"/>
-            <a:ext cx="9905998" cy="1478570"/>
-          </a:xfrm>
-          <a:prstGeom prst="rect">
-            <a:avLst/>
-          </a:prstGeom>
-        </p:spPr>
-        <p:txBody>
-          <a:bodyPr vert="horz" lIns="91440" tIns="45720" rIns="91440" bIns="45720" rtlCol="0" anchor="ctr">
-            <a:normAutofit/>
-          </a:bodyPr>
-          <a:lstStyle>
-            <a:lvl1pPr algn="l" defTabSz="914400" rtl="0" eaLnBrk="1" latinLnBrk="0" hangingPunct="1">
-              <a:lnSpc>
-                <a:spcPct val="90000"/>
-              </a:lnSpc>
-              <a:spcBef>
-                <a:spcPct val="0"/>
-              </a:spcBef>
-              <a:buNone/>
-              <a:defRPr sz="3600" kern="1200" cap="all" baseline="0">
-                <a:solidFill>
-                  <a:schemeClr val="tx1"/>
-                </a:solidFill>
-                <a:latin typeface="+mj-lt"/>
-                <a:ea typeface="+mj-ea"/>
-                <a:cs typeface="+mj-cs"/>
-              </a:defRPr>
-            </a:lvl1pPr>
-          </a:lstStyle>
-          <a:p>
-            <a:r>
-              <a:rPr lang="en-US" dirty="0"/>
-              <a:t>Null hypothesis:</a:t>
-            </a:r>
           </a:p>
         </p:txBody>
       </p:sp>
@@ -14240,36 +14337,6 @@
             </a:lvl9pPr>
           </a:lstStyle>
           <a:p>
-            <a:pPr marL="0" indent="0">
-              <a:buNone/>
-            </a:pPr>
-            <a:r>
-              <a:rPr lang="en-US" sz="2000" dirty="0"/>
-              <a:t>If earthquakes are not related to economic outcomes, then earthquakes over 6.1 magnitude would not have an effect on:</a:t>
-            </a:r>
-          </a:p>
-          <a:p>
-            <a:pPr lvl="1"/>
-            <a:r>
-              <a:rPr lang="en-US" dirty="0"/>
-              <a:t>Gross Domestic Product</a:t>
-            </a:r>
-          </a:p>
-          <a:p>
-            <a:pPr lvl="1"/>
-            <a:r>
-              <a:rPr lang="en-US" dirty="0"/>
-              <a:t>Trade</a:t>
-            </a:r>
-          </a:p>
-          <a:p>
-            <a:pPr lvl="1"/>
-            <a:r>
-              <a:rPr lang="en-US" dirty="0"/>
-              <a:t>Manufactures exports</a:t>
-            </a:r>
-          </a:p>
-          <a:p>
             <a:pPr marL="457200" lvl="1" indent="0">
               <a:buFont typeface="Arial" panose="020B0604020202020204" pitchFamily="34" charset="0"/>
               <a:buNone/>
@@ -14300,6 +14367,9 @@
                     <p:cTn id="3" fill="hold">
                       <p:stCondLst>
                         <p:cond delay="indefinite"/>
+                        <p:cond evt="onBegin" delay="0">
+                          <p:tn val="2"/>
+                        </p:cond>
                       </p:stCondLst>
                       <p:childTnLst>
                         <p:par>
@@ -14309,58 +14379,19 @@
                             </p:stCondLst>
                             <p:childTnLst>
                               <p:par>
-                                <p:cTn id="5" presetID="10" presetClass="entr" presetSubtype="0" fill="hold" grpId="0" nodeType="clickEffect">
+                                <p:cTn id="5" presetID="10" presetClass="entr" presetSubtype="0" fill="hold" grpId="0" nodeType="afterEffect" nodePh="1">
                                   <p:stCondLst>
-                                    <p:cond delay="0"/>
+                                    <p:cond delay="2000"/>
                                   </p:stCondLst>
+                                  <p:endCondLst>
+                                    <p:cond evt="begin" delay="0">
+                                      <p:tn val="5"/>
+                                    </p:cond>
+                                  </p:endCondLst>
                                   <p:childTnLst>
                                     <p:set>
                                       <p:cBhvr>
                                         <p:cTn id="6" dur="1" fill="hold">
-                                          <p:stCondLst>
-                                            <p:cond delay="0"/>
-                                          </p:stCondLst>
-                                        </p:cTn>
-                                        <p:tgtEl>
-                                          <p:spTgt spid="4"/>
-                                        </p:tgtEl>
-                                        <p:attrNameLst>
-                                          <p:attrName>style.visibility</p:attrName>
-                                        </p:attrNameLst>
-                                      </p:cBhvr>
-                                      <p:to>
-                                        <p:strVal val="visible"/>
-                                      </p:to>
-                                    </p:set>
-                                    <p:animEffect transition="in" filter="fade">
-                                      <p:cBhvr>
-                                        <p:cTn id="7" dur="500"/>
-                                        <p:tgtEl>
-                                          <p:spTgt spid="4"/>
-                                        </p:tgtEl>
-                                      </p:cBhvr>
-                                    </p:animEffect>
-                                  </p:childTnLst>
-                                </p:cTn>
-                              </p:par>
-                            </p:childTnLst>
-                          </p:cTn>
-                        </p:par>
-                        <p:par>
-                          <p:cTn id="8" fill="hold">
-                            <p:stCondLst>
-                              <p:cond delay="500"/>
-                            </p:stCondLst>
-                            <p:childTnLst>
-                              <p:par>
-                                <p:cTn id="9" presetID="10" presetClass="entr" presetSubtype="0" fill="hold" grpId="0" nodeType="afterEffect">
-                                  <p:stCondLst>
-                                    <p:cond delay="2000"/>
-                                  </p:stCondLst>
-                                  <p:childTnLst>
-                                    <p:set>
-                                      <p:cBhvr>
-                                        <p:cTn id="10" dur="1" fill="hold">
                                           <p:stCondLst>
                                             <p:cond delay="0"/>
                                           </p:stCondLst>
@@ -14378,7 +14409,7 @@
                                     </p:set>
                                     <p:animEffect transition="in" filter="fade">
                                       <p:cBhvr>
-                                        <p:cTn id="11" dur="500"/>
+                                        <p:cTn id="7" dur="500"/>
                                         <p:tgtEl>
                                           <p:spTgt spid="5"/>
                                         </p:tgtEl>
@@ -14394,26 +14425,26 @@
                     </p:cTn>
                   </p:par>
                   <p:par>
-                    <p:cTn id="12" fill="hold">
+                    <p:cTn id="8" fill="hold">
                       <p:stCondLst>
                         <p:cond delay="indefinite"/>
                       </p:stCondLst>
                       <p:childTnLst>
                         <p:par>
-                          <p:cTn id="13" fill="hold">
+                          <p:cTn id="9" fill="hold">
                             <p:stCondLst>
                               <p:cond delay="0"/>
                             </p:stCondLst>
                             <p:childTnLst>
                               <p:par>
-                                <p:cTn id="14" presetID="10" presetClass="entr" presetSubtype="0" fill="hold" grpId="0" nodeType="clickEffect">
+                                <p:cTn id="10" presetID="10" presetClass="entr" presetSubtype="0" fill="hold" grpId="0" nodeType="clickEffect">
                                   <p:stCondLst>
                                     <p:cond delay="0"/>
                                   </p:stCondLst>
                                   <p:childTnLst>
                                     <p:set>
                                       <p:cBhvr>
-                                        <p:cTn id="15" dur="1" fill="hold">
+                                        <p:cTn id="11" dur="1" fill="hold">
                                           <p:stCondLst>
                                             <p:cond delay="0"/>
                                           </p:stCondLst>
@@ -14431,7 +14462,7 @@
                                     </p:set>
                                     <p:animEffect transition="in" filter="fade">
                                       <p:cBhvr>
-                                        <p:cTn id="16" dur="500"/>
+                                        <p:cTn id="12" dur="500"/>
                                         <p:tgtEl>
                                           <p:spTgt spid="2"/>
                                         </p:tgtEl>
@@ -14444,20 +14475,20 @@
                           </p:cTn>
                         </p:par>
                         <p:par>
-                          <p:cTn id="17" fill="hold">
+                          <p:cTn id="13" fill="hold">
                             <p:stCondLst>
                               <p:cond delay="500"/>
                             </p:stCondLst>
                             <p:childTnLst>
                               <p:par>
-                                <p:cTn id="18" presetID="10" presetClass="entr" presetSubtype="0" fill="hold" grpId="0" nodeType="afterEffect">
+                                <p:cTn id="14" presetID="10" presetClass="entr" presetSubtype="0" fill="hold" grpId="0" nodeType="afterEffect">
                                   <p:stCondLst>
                                     <p:cond delay="0"/>
                                   </p:stCondLst>
                                   <p:childTnLst>
                                     <p:set>
                                       <p:cBhvr>
-                                        <p:cTn id="19" dur="1" fill="hold">
+                                        <p:cTn id="15" dur="1" fill="hold">
                                           <p:stCondLst>
                                             <p:cond delay="0"/>
                                           </p:stCondLst>
@@ -14479,7 +14510,7 @@
                                     </p:set>
                                     <p:animEffect transition="in" filter="fade">
                                       <p:cBhvr>
-                                        <p:cTn id="20" dur="500"/>
+                                        <p:cTn id="16" dur="500"/>
                                         <p:tgtEl>
                                           <p:spTgt spid="3">
                                             <p:txEl>
@@ -14496,20 +14527,20 @@
                           </p:cTn>
                         </p:par>
                         <p:par>
-                          <p:cTn id="21" fill="hold">
+                          <p:cTn id="17" fill="hold">
                             <p:stCondLst>
                               <p:cond delay="1000"/>
                             </p:stCondLst>
                             <p:childTnLst>
                               <p:par>
-                                <p:cTn id="22" presetID="10" presetClass="entr" presetSubtype="0" fill="hold" grpId="0" nodeType="afterEffect">
+                                <p:cTn id="18" presetID="10" presetClass="entr" presetSubtype="0" fill="hold" grpId="0" nodeType="afterEffect">
                                   <p:stCondLst>
                                     <p:cond delay="1000"/>
                                   </p:stCondLst>
                                   <p:childTnLst>
                                     <p:set>
                                       <p:cBhvr>
-                                        <p:cTn id="23" dur="1" fill="hold">
+                                        <p:cTn id="19" dur="1" fill="hold">
                                           <p:stCondLst>
                                             <p:cond delay="0"/>
                                           </p:stCondLst>
@@ -14531,7 +14562,7 @@
                                     </p:set>
                                     <p:animEffect transition="in" filter="fade">
                                       <p:cBhvr>
-                                        <p:cTn id="24" dur="500"/>
+                                        <p:cTn id="20" dur="500"/>
                                         <p:tgtEl>
                                           <p:spTgt spid="3">
                                             <p:txEl>
@@ -14548,20 +14579,20 @@
                           </p:cTn>
                         </p:par>
                         <p:par>
-                          <p:cTn id="25" fill="hold">
+                          <p:cTn id="21" fill="hold">
                             <p:stCondLst>
                               <p:cond delay="2500"/>
                             </p:stCondLst>
                             <p:childTnLst>
                               <p:par>
-                                <p:cTn id="26" presetID="10" presetClass="entr" presetSubtype="0" fill="hold" grpId="0" nodeType="afterEffect">
+                                <p:cTn id="22" presetID="10" presetClass="entr" presetSubtype="0" fill="hold" grpId="0" nodeType="afterEffect">
                                   <p:stCondLst>
                                     <p:cond delay="1000"/>
                                   </p:stCondLst>
                                   <p:childTnLst>
                                     <p:set>
                                       <p:cBhvr>
-                                        <p:cTn id="27" dur="1" fill="hold">
+                                        <p:cTn id="23" dur="1" fill="hold">
                                           <p:stCondLst>
                                             <p:cond delay="0"/>
                                           </p:stCondLst>
@@ -14583,7 +14614,7 @@
                                     </p:set>
                                     <p:animEffect transition="in" filter="fade">
                                       <p:cBhvr>
-                                        <p:cTn id="28" dur="500"/>
+                                        <p:cTn id="24" dur="500"/>
                                         <p:tgtEl>
                                           <p:spTgt spid="3">
                                             <p:txEl>
@@ -14600,20 +14631,20 @@
                           </p:cTn>
                         </p:par>
                         <p:par>
-                          <p:cTn id="29" fill="hold">
+                          <p:cTn id="25" fill="hold">
                             <p:stCondLst>
                               <p:cond delay="4000"/>
                             </p:stCondLst>
                             <p:childTnLst>
                               <p:par>
-                                <p:cTn id="30" presetID="10" presetClass="entr" presetSubtype="0" fill="hold" grpId="0" nodeType="afterEffect">
+                                <p:cTn id="26" presetID="10" presetClass="entr" presetSubtype="0" fill="hold" grpId="0" nodeType="afterEffect">
                                   <p:stCondLst>
                                     <p:cond delay="1000"/>
                                   </p:stCondLst>
                                   <p:childTnLst>
                                     <p:set>
                                       <p:cBhvr>
-                                        <p:cTn id="31" dur="1" fill="hold">
+                                        <p:cTn id="27" dur="1" fill="hold">
                                           <p:stCondLst>
                                             <p:cond delay="0"/>
                                           </p:stCondLst>
@@ -14635,7 +14666,7 @@
                                     </p:set>
                                     <p:animEffect transition="in" filter="fade">
                                       <p:cBhvr>
-                                        <p:cTn id="32" dur="500"/>
+                                        <p:cTn id="28" dur="500"/>
                                         <p:tgtEl>
                                           <p:spTgt spid="3">
                                             <p:txEl>
@@ -14678,14 +14709,13 @@
     <p:bldLst>
       <p:bldP spid="2" grpId="0"/>
       <p:bldP spid="3" grpId="0" uiExpand="1" build="p"/>
-      <p:bldP spid="4" grpId="0"/>
       <p:bldP spid="5" grpId="0"/>
     </p:bldLst>
   </p:timing>
 </p:sld>
 </file>
 
-<file path=ppt/slides/slide5.xml><?xml version="1.0" encoding="utf-8"?>
+<file path=ppt/slides/slide4.xml><?xml version="1.0" encoding="utf-8"?>
 <p:sld xmlns:a="http://schemas.openxmlformats.org/drawingml/2006/main" xmlns:r="http://schemas.openxmlformats.org/officeDocument/2006/relationships" xmlns:p="http://schemas.openxmlformats.org/presentationml/2006/main">
   <p:cSld>
     <p:spTree>
@@ -14788,7 +14818,7 @@
 </p:sld>
 </file>
 
-<file path=ppt/slides/slide6.xml><?xml version="1.0" encoding="utf-8"?>
+<file path=ppt/slides/slide5.xml><?xml version="1.0" encoding="utf-8"?>
 <p:sld xmlns:a="http://schemas.openxmlformats.org/drawingml/2006/main" xmlns:r="http://schemas.openxmlformats.org/officeDocument/2006/relationships" xmlns:p="http://schemas.openxmlformats.org/presentationml/2006/main">
   <p:cSld>
     <p:spTree>
@@ -14810,7 +14840,7 @@
           <p:cNvPr id="2" name="Title 1">
             <a:extLst>
               <a:ext uri="{FF2B5EF4-FFF2-40B4-BE49-F238E27FC236}">
-                <a16:creationId xmlns:a16="http://schemas.microsoft.com/office/drawing/2014/main" id="{3C07F05E-FDEE-4AB6-8634-BD793A8DCC28}"/>
+                <a16:creationId xmlns:a16="http://schemas.microsoft.com/office/drawing/2014/main" id="{A8189972-1D65-46EB-A407-33FE1C96AA38}"/>
               </a:ext>
             </a:extLst>
           </p:cNvPr>
@@ -14821,31 +14851,88 @@
             <p:ph type="title"/>
           </p:nvPr>
         </p:nvSpPr>
-        <p:spPr>
-          <a:xfrm>
-            <a:off x="1430965" y="4431210"/>
-            <a:ext cx="9905998" cy="1478570"/>
-          </a:xfrm>
-        </p:spPr>
+        <p:spPr/>
         <p:txBody>
-          <a:bodyPr>
-            <a:normAutofit/>
-          </a:bodyPr>
+          <a:bodyPr/>
           <a:lstStyle/>
           <a:p>
             <a:r>
-              <a:rPr lang="en-US" sz="2800" dirty="0"/>
-              <a:t>Iceland with overlay of earthquake severity heat map</a:t>
+              <a:rPr lang="en-US" dirty="0"/>
+              <a:t>Clean up</a:t>
             </a:r>
           </a:p>
         </p:txBody>
       </p:sp>
       <p:pic>
         <p:nvPicPr>
-          <p:cNvPr id="6" name="Picture 5">
+          <p:cNvPr id="5" name="Content Placeholder 4">
             <a:extLst>
               <a:ext uri="{FF2B5EF4-FFF2-40B4-BE49-F238E27FC236}">
-                <a16:creationId xmlns:a16="http://schemas.microsoft.com/office/drawing/2014/main" id="{A8FAD154-A3E8-4755-8856-4B9FD8DEE541}"/>
+                <a16:creationId xmlns:a16="http://schemas.microsoft.com/office/drawing/2014/main" id="{B9C63D75-BA69-4001-8F88-A9BE82897031}"/>
+              </a:ext>
+            </a:extLst>
+          </p:cNvPr>
+          <p:cNvPicPr>
+            <a:picLocks noGrp="1" noChangeAspect="1"/>
+          </p:cNvPicPr>
+          <p:nvPr>
+            <p:ph sz="half" idx="1"/>
+          </p:nvPr>
+        </p:nvPicPr>
+        <p:blipFill>
+          <a:blip r:embed="rId2"/>
+          <a:stretch>
+            <a:fillRect/>
+          </a:stretch>
+        </p:blipFill>
+        <p:spPr>
+          <a:xfrm>
+            <a:off x="701040" y="1696720"/>
+            <a:ext cx="5720182" cy="4679110"/>
+          </a:xfrm>
+          <a:prstGeom prst="rect">
+            <a:avLst/>
+          </a:prstGeom>
+        </p:spPr>
+      </p:pic>
+      <p:pic>
+        <p:nvPicPr>
+          <p:cNvPr id="6" name="Content Placeholder 5">
+            <a:extLst>
+              <a:ext uri="{FF2B5EF4-FFF2-40B4-BE49-F238E27FC236}">
+                <a16:creationId xmlns:a16="http://schemas.microsoft.com/office/drawing/2014/main" id="{B236EB1B-2422-4A9D-89D6-74463B4E9C1A}"/>
+              </a:ext>
+            </a:extLst>
+          </p:cNvPr>
+          <p:cNvPicPr>
+            <a:picLocks noGrp="1" noChangeAspect="1"/>
+          </p:cNvPicPr>
+          <p:nvPr>
+            <p:ph sz="half" idx="2"/>
+          </p:nvPr>
+        </p:nvPicPr>
+        <p:blipFill>
+          <a:blip r:embed="rId3"/>
+          <a:stretch>
+            <a:fillRect/>
+          </a:stretch>
+        </p:blipFill>
+        <p:spPr>
+          <a:xfrm>
+            <a:off x="4211320" y="482170"/>
+            <a:ext cx="7494244" cy="2729921"/>
+          </a:xfrm>
+          <a:prstGeom prst="rect">
+            <a:avLst/>
+          </a:prstGeom>
+        </p:spPr>
+      </p:pic>
+      <p:pic>
+        <p:nvPicPr>
+          <p:cNvPr id="7" name="Picture 6">
+            <a:extLst>
+              <a:ext uri="{FF2B5EF4-FFF2-40B4-BE49-F238E27FC236}">
+                <a16:creationId xmlns:a16="http://schemas.microsoft.com/office/drawing/2014/main" id="{5FFACAD8-A7CC-4969-A7E8-4183319FC60E}"/>
               </a:ext>
             </a:extLst>
           </p:cNvPr>
@@ -14854,15 +14941,16 @@
           </p:cNvPicPr>
           <p:nvPr/>
         </p:nvPicPr>
-        <p:blipFill rotWithShape="1">
-          <a:blip r:embed="rId2"/>
-          <a:srcRect r="6816"/>
-          <a:stretch/>
+        <p:blipFill>
+          <a:blip r:embed="rId4"/>
+          <a:stretch>
+            <a:fillRect/>
+          </a:stretch>
         </p:blipFill>
         <p:spPr>
           <a:xfrm>
-            <a:off x="1729120" y="1126034"/>
-            <a:ext cx="8733760" cy="3667125"/>
+            <a:off x="4211320" y="3348439"/>
+            <a:ext cx="5940888" cy="2844119"/>
           </a:xfrm>
           <a:prstGeom prst="rect">
             <a:avLst/>
@@ -14872,147 +14960,17 @@
     </p:spTree>
     <p:extLst>
       <p:ext uri="{BB962C8B-B14F-4D97-AF65-F5344CB8AC3E}">
-        <p14:creationId xmlns:p14="http://schemas.microsoft.com/office/powerpoint/2010/main" val="2968294226"/>
+        <p14:creationId xmlns:p14="http://schemas.microsoft.com/office/powerpoint/2010/main" val="2954277170"/>
       </p:ext>
     </p:extLst>
   </p:cSld>
   <p:clrMapOvr>
     <a:masterClrMapping/>
   </p:clrMapOvr>
-  <p:timing>
-    <p:tnLst>
-      <p:par>
-        <p:cTn id="1" dur="indefinite" restart="never" nodeType="tmRoot">
-          <p:childTnLst>
-            <p:seq concurrent="1" nextAc="seek">
-              <p:cTn id="2" dur="indefinite" nodeType="mainSeq">
-                <p:childTnLst>
-                  <p:par>
-                    <p:cTn id="3" fill="hold">
-                      <p:stCondLst>
-                        <p:cond delay="indefinite"/>
-                      </p:stCondLst>
-                      <p:childTnLst>
-                        <p:par>
-                          <p:cTn id="4" fill="hold">
-                            <p:stCondLst>
-                              <p:cond delay="0"/>
-                            </p:stCondLst>
-                            <p:childTnLst>
-                              <p:par>
-                                <p:cTn id="5" presetID="10" presetClass="entr" presetSubtype="0" fill="hold" nodeType="clickEffect">
-                                  <p:stCondLst>
-                                    <p:cond delay="0"/>
-                                  </p:stCondLst>
-                                  <p:childTnLst>
-                                    <p:set>
-                                      <p:cBhvr>
-                                        <p:cTn id="6" dur="1" fill="hold">
-                                          <p:stCondLst>
-                                            <p:cond delay="0"/>
-                                          </p:stCondLst>
-                                        </p:cTn>
-                                        <p:tgtEl>
-                                          <p:spTgt spid="6"/>
-                                        </p:tgtEl>
-                                        <p:attrNameLst>
-                                          <p:attrName>style.visibility</p:attrName>
-                                        </p:attrNameLst>
-                                      </p:cBhvr>
-                                      <p:to>
-                                        <p:strVal val="visible"/>
-                                      </p:to>
-                                    </p:set>
-                                    <p:animEffect transition="in" filter="fade">
-                                      <p:cBhvr>
-                                        <p:cTn id="7" dur="500"/>
-                                        <p:tgtEl>
-                                          <p:spTgt spid="6"/>
-                                        </p:tgtEl>
-                                      </p:cBhvr>
-                                    </p:animEffect>
-                                  </p:childTnLst>
-                                </p:cTn>
-                              </p:par>
-                            </p:childTnLst>
-                          </p:cTn>
-                        </p:par>
-                        <p:par>
-                          <p:cTn id="8" fill="hold">
-                            <p:stCondLst>
-                              <p:cond delay="500"/>
-                            </p:stCondLst>
-                            <p:childTnLst>
-                              <p:par>
-                                <p:cTn id="9" presetID="10" presetClass="entr" presetSubtype="0" fill="hold" grpId="0" nodeType="afterEffect">
-                                  <p:stCondLst>
-                                    <p:cond delay="1000"/>
-                                  </p:stCondLst>
-                                  <p:childTnLst>
-                                    <p:set>
-                                      <p:cBhvr>
-                                        <p:cTn id="10" dur="1" fill="hold">
-                                          <p:stCondLst>
-                                            <p:cond delay="0"/>
-                                          </p:stCondLst>
-                                        </p:cTn>
-                                        <p:tgtEl>
-                                          <p:spTgt spid="2"/>
-                                        </p:tgtEl>
-                                        <p:attrNameLst>
-                                          <p:attrName>style.visibility</p:attrName>
-                                        </p:attrNameLst>
-                                      </p:cBhvr>
-                                      <p:to>
-                                        <p:strVal val="visible"/>
-                                      </p:to>
-                                    </p:set>
-                                    <p:animEffect transition="in" filter="fade">
-                                      <p:cBhvr>
-                                        <p:cTn id="11" dur="500"/>
-                                        <p:tgtEl>
-                                          <p:spTgt spid="2"/>
-                                        </p:tgtEl>
-                                      </p:cBhvr>
-                                    </p:animEffect>
-                                  </p:childTnLst>
-                                </p:cTn>
-                              </p:par>
-                            </p:childTnLst>
-                          </p:cTn>
-                        </p:par>
-                      </p:childTnLst>
-                    </p:cTn>
-                  </p:par>
-                </p:childTnLst>
-              </p:cTn>
-              <p:prevCondLst>
-                <p:cond evt="onPrev" delay="0">
-                  <p:tgtEl>
-                    <p:sldTgt/>
-                  </p:tgtEl>
-                </p:cond>
-              </p:prevCondLst>
-              <p:nextCondLst>
-                <p:cond evt="onNext" delay="0">
-                  <p:tgtEl>
-                    <p:sldTgt/>
-                  </p:tgtEl>
-                </p:cond>
-              </p:nextCondLst>
-            </p:seq>
-          </p:childTnLst>
-        </p:cTn>
-      </p:par>
-    </p:tnLst>
-    <p:bldLst>
-      <p:bldP spid="2" grpId="0"/>
-    </p:bldLst>
-  </p:timing>
 </p:sld>
 </file>
 
-<file path=ppt/slides/slide7.xml><?xml version="1.0" encoding="utf-8"?>
+<file path=ppt/slides/slide6.xml><?xml version="1.0" encoding="utf-8"?>
 <p:sld xmlns:a="http://schemas.openxmlformats.org/drawingml/2006/main" xmlns:r="http://schemas.openxmlformats.org/officeDocument/2006/relationships" xmlns:p="http://schemas.openxmlformats.org/presentationml/2006/main">
   <p:cSld>
     <p:spTree>
@@ -15311,7 +15269,7 @@
 </p:sld>
 </file>
 
-<file path=ppt/slides/slide8.xml><?xml version="1.0" encoding="utf-8"?>
+<file path=ppt/slides/slide7.xml><?xml version="1.0" encoding="utf-8"?>
 <p:sld xmlns:a="http://schemas.openxmlformats.org/drawingml/2006/main" xmlns:r="http://schemas.openxmlformats.org/officeDocument/2006/relationships" xmlns:p="http://schemas.openxmlformats.org/presentationml/2006/main">
   <p:cSld>
     <p:spTree>
@@ -15773,7 +15731,7 @@
 </p:sld>
 </file>
 
-<file path=ppt/slides/slide9.xml><?xml version="1.0" encoding="utf-8"?>
+<file path=ppt/slides/slide8.xml><?xml version="1.0" encoding="utf-8"?>
 <p:sld xmlns:a="http://schemas.openxmlformats.org/drawingml/2006/main" xmlns:r="http://schemas.openxmlformats.org/officeDocument/2006/relationships" xmlns:p="http://schemas.openxmlformats.org/presentationml/2006/main">
   <p:cSld>
     <p:spTree>
@@ -15814,8 +15772,8 @@
         </p:blipFill>
         <p:spPr>
           <a:xfrm>
-            <a:off x="1751357" y="532572"/>
-            <a:ext cx="8689285" cy="5792855"/>
+            <a:off x="1638298" y="457200"/>
+            <a:ext cx="8915403" cy="5943600"/>
           </a:xfrm>
         </p:spPr>
       </p:pic>
@@ -15823,6 +15781,65 @@
     <p:extLst>
       <p:ext uri="{BB962C8B-B14F-4D97-AF65-F5344CB8AC3E}">
         <p14:creationId xmlns:p14="http://schemas.microsoft.com/office/powerpoint/2010/main" val="2819046451"/>
+      </p:ext>
+    </p:extLst>
+  </p:cSld>
+  <p:clrMapOvr>
+    <a:masterClrMapping/>
+  </p:clrMapOvr>
+</p:sld>
+</file>
+
+<file path=ppt/slides/slide9.xml><?xml version="1.0" encoding="utf-8"?>
+<p:sld xmlns:a="http://schemas.openxmlformats.org/drawingml/2006/main" xmlns:r="http://schemas.openxmlformats.org/officeDocument/2006/relationships" xmlns:p="http://schemas.openxmlformats.org/presentationml/2006/main">
+  <p:cSld>
+    <p:spTree>
+      <p:nvGrpSpPr>
+        <p:cNvPr id="1" name=""/>
+        <p:cNvGrpSpPr/>
+        <p:nvPr/>
+      </p:nvGrpSpPr>
+      <p:grpSpPr>
+        <a:xfrm>
+          <a:off x="0" y="0"/>
+          <a:ext cx="0" cy="0"/>
+          <a:chOff x="0" y="0"/>
+          <a:chExt cx="0" cy="0"/>
+        </a:xfrm>
+      </p:grpSpPr>
+      <p:pic>
+        <p:nvPicPr>
+          <p:cNvPr id="7" name="Content Placeholder 7" descr="A close up of a map&#10;&#10;Description automatically generated">
+            <a:extLst>
+              <a:ext uri="{FF2B5EF4-FFF2-40B4-BE49-F238E27FC236}">
+                <a16:creationId xmlns:a16="http://schemas.microsoft.com/office/drawing/2014/main" id="{8E9A1705-3191-40CF-A2EC-2D952FBA4C43}"/>
+              </a:ext>
+            </a:extLst>
+          </p:cNvPr>
+          <p:cNvPicPr>
+            <a:picLocks noGrp="1" noChangeAspect="1"/>
+          </p:cNvPicPr>
+          <p:nvPr>
+            <p:ph sz="half" idx="2"/>
+          </p:nvPr>
+        </p:nvPicPr>
+        <p:blipFill>
+          <a:blip r:embed="rId2"/>
+          <a:stretch>
+            <a:fillRect/>
+          </a:stretch>
+        </p:blipFill>
+        <p:spPr>
+          <a:xfrm>
+            <a:off x="1752600" y="533400"/>
+            <a:ext cx="8686800" cy="5791199"/>
+          </a:xfrm>
+        </p:spPr>
+      </p:pic>
+    </p:spTree>
+    <p:extLst>
+      <p:ext uri="{BB962C8B-B14F-4D97-AF65-F5344CB8AC3E}">
+        <p14:creationId xmlns:p14="http://schemas.microsoft.com/office/powerpoint/2010/main" val="2529801168"/>
       </p:ext>
     </p:extLst>
   </p:cSld>
@@ -16081,4 +16098,540 @@
     </a:ext>
   </a:extLst>
 </a:theme>
+</file>
+
+<file path=ppt/theme/theme2.xml><?xml version="1.0" encoding="utf-8"?>
+<a:theme xmlns:a="http://schemas.openxmlformats.org/drawingml/2006/main" name="Office Theme">
+  <a:themeElements>
+    <a:clrScheme name="Office">
+      <a:dk1>
+        <a:sysClr val="windowText" lastClr="000000"/>
+      </a:dk1>
+      <a:lt1>
+        <a:sysClr val="window" lastClr="FFFFFF"/>
+      </a:lt1>
+      <a:dk2>
+        <a:srgbClr val="44546A"/>
+      </a:dk2>
+      <a:lt2>
+        <a:srgbClr val="E7E6E6"/>
+      </a:lt2>
+      <a:accent1>
+        <a:srgbClr val="4472C4"/>
+      </a:accent1>
+      <a:accent2>
+        <a:srgbClr val="ED7D31"/>
+      </a:accent2>
+      <a:accent3>
+        <a:srgbClr val="A5A5A5"/>
+      </a:accent3>
+      <a:accent4>
+        <a:srgbClr val="FFC000"/>
+      </a:accent4>
+      <a:accent5>
+        <a:srgbClr val="5B9BD5"/>
+      </a:accent5>
+      <a:accent6>
+        <a:srgbClr val="70AD47"/>
+      </a:accent6>
+      <a:hlink>
+        <a:srgbClr val="0563C1"/>
+      </a:hlink>
+      <a:folHlink>
+        <a:srgbClr val="954F72"/>
+      </a:folHlink>
+    </a:clrScheme>
+    <a:fontScheme name="Office">
+      <a:majorFont>
+        <a:latin typeface="Calibri Light" panose="020F0302020204030204"/>
+        <a:ea typeface=""/>
+        <a:cs typeface=""/>
+        <a:font script="Jpan" typeface="游ゴシック Light"/>
+        <a:font script="Hang" typeface="맑은 고딕"/>
+        <a:font script="Hans" typeface="等线 Light"/>
+        <a:font script="Hant" typeface="新細明體"/>
+        <a:font script="Arab" typeface="Times New Roman"/>
+        <a:font script="Hebr" typeface="Times New Roman"/>
+        <a:font script="Thai" typeface="Angsana New"/>
+        <a:font script="Ethi" typeface="Nyala"/>
+        <a:font script="Beng" typeface="Vrinda"/>
+        <a:font script="Gujr" typeface="Shruti"/>
+        <a:font script="Khmr" typeface="MoolBoran"/>
+        <a:font script="Knda" typeface="Tunga"/>
+        <a:font script="Guru" typeface="Raavi"/>
+        <a:font script="Cans" typeface="Euphemia"/>
+        <a:font script="Cher" typeface="Plantagenet Cherokee"/>
+        <a:font script="Yiii" typeface="Microsoft Yi Baiti"/>
+        <a:font script="Tibt" typeface="Microsoft Himalaya"/>
+        <a:font script="Thaa" typeface="MV Boli"/>
+        <a:font script="Deva" typeface="Mangal"/>
+        <a:font script="Telu" typeface="Gautami"/>
+        <a:font script="Taml" typeface="Latha"/>
+        <a:font script="Syrc" typeface="Estrangelo Edessa"/>
+        <a:font script="Orya" typeface="Kalinga"/>
+        <a:font script="Mlym" typeface="Kartika"/>
+        <a:font script="Laoo" typeface="DokChampa"/>
+        <a:font script="Sinh" typeface="Iskoola Pota"/>
+        <a:font script="Mong" typeface="Mongolian Baiti"/>
+        <a:font script="Viet" typeface="Times New Roman"/>
+        <a:font script="Uigh" typeface="Microsoft Uighur"/>
+        <a:font script="Geor" typeface="Sylfaen"/>
+        <a:font script="Armn" typeface="Arial"/>
+        <a:font script="Bugi" typeface="Leelawadee UI"/>
+        <a:font script="Bopo" typeface="Microsoft JhengHei"/>
+        <a:font script="Java" typeface="Javanese Text"/>
+        <a:font script="Lisu" typeface="Segoe UI"/>
+        <a:font script="Mymr" typeface="Myanmar Text"/>
+        <a:font script="Nkoo" typeface="Ebrima"/>
+        <a:font script="Olck" typeface="Nirmala UI"/>
+        <a:font script="Osma" typeface="Ebrima"/>
+        <a:font script="Phag" typeface="Phagspa"/>
+        <a:font script="Syrn" typeface="Estrangelo Edessa"/>
+        <a:font script="Syrj" typeface="Estrangelo Edessa"/>
+        <a:font script="Syre" typeface="Estrangelo Edessa"/>
+        <a:font script="Sora" typeface="Nirmala UI"/>
+        <a:font script="Tale" typeface="Microsoft Tai Le"/>
+        <a:font script="Talu" typeface="Microsoft New Tai Lue"/>
+        <a:font script="Tfng" typeface="Ebrima"/>
+      </a:majorFont>
+      <a:minorFont>
+        <a:latin typeface="Calibri" panose="020F0502020204030204"/>
+        <a:ea typeface=""/>
+        <a:cs typeface=""/>
+        <a:font script="Jpan" typeface="游ゴシック"/>
+        <a:font script="Hang" typeface="맑은 고딕"/>
+        <a:font script="Hans" typeface="等线"/>
+        <a:font script="Hant" typeface="新細明體"/>
+        <a:font script="Arab" typeface="Arial"/>
+        <a:font script="Hebr" typeface="Arial"/>
+        <a:font script="Thai" typeface="Cordia New"/>
+        <a:font script="Ethi" typeface="Nyala"/>
+        <a:font script="Beng" typeface="Vrinda"/>
+        <a:font script="Gujr" typeface="Shruti"/>
+        <a:font script="Khmr" typeface="DaunPenh"/>
+        <a:font script="Knda" typeface="Tunga"/>
+        <a:font script="Guru" typeface="Raavi"/>
+        <a:font script="Cans" typeface="Euphemia"/>
+        <a:font script="Cher" typeface="Plantagenet Cherokee"/>
+        <a:font script="Yiii" typeface="Microsoft Yi Baiti"/>
+        <a:font script="Tibt" typeface="Microsoft Himalaya"/>
+        <a:font script="Thaa" typeface="MV Boli"/>
+        <a:font script="Deva" typeface="Mangal"/>
+        <a:font script="Telu" typeface="Gautami"/>
+        <a:font script="Taml" typeface="Latha"/>
+        <a:font script="Syrc" typeface="Estrangelo Edessa"/>
+        <a:font script="Orya" typeface="Kalinga"/>
+        <a:font script="Mlym" typeface="Kartika"/>
+        <a:font script="Laoo" typeface="DokChampa"/>
+        <a:font script="Sinh" typeface="Iskoola Pota"/>
+        <a:font script="Mong" typeface="Mongolian Baiti"/>
+        <a:font script="Viet" typeface="Arial"/>
+        <a:font script="Uigh" typeface="Microsoft Uighur"/>
+        <a:font script="Geor" typeface="Sylfaen"/>
+        <a:font script="Armn" typeface="Arial"/>
+        <a:font script="Bugi" typeface="Leelawadee UI"/>
+        <a:font script="Bopo" typeface="Microsoft JhengHei"/>
+        <a:font script="Java" typeface="Javanese Text"/>
+        <a:font script="Lisu" typeface="Segoe UI"/>
+        <a:font script="Mymr" typeface="Myanmar Text"/>
+        <a:font script="Nkoo" typeface="Ebrima"/>
+        <a:font script="Olck" typeface="Nirmala UI"/>
+        <a:font script="Osma" typeface="Ebrima"/>
+        <a:font script="Phag" typeface="Phagspa"/>
+        <a:font script="Syrn" typeface="Estrangelo Edessa"/>
+        <a:font script="Syrj" typeface="Estrangelo Edessa"/>
+        <a:font script="Syre" typeface="Estrangelo Edessa"/>
+        <a:font script="Sora" typeface="Nirmala UI"/>
+        <a:font script="Tale" typeface="Microsoft Tai Le"/>
+        <a:font script="Talu" typeface="Microsoft New Tai Lue"/>
+        <a:font script="Tfng" typeface="Ebrima"/>
+      </a:minorFont>
+    </a:fontScheme>
+    <a:fmtScheme name="Office">
+      <a:fillStyleLst>
+        <a:solidFill>
+          <a:schemeClr val="phClr"/>
+        </a:solidFill>
+        <a:gradFill rotWithShape="1">
+          <a:gsLst>
+            <a:gs pos="0">
+              <a:schemeClr val="phClr">
+                <a:lumMod val="110000"/>
+                <a:satMod val="105000"/>
+                <a:tint val="67000"/>
+              </a:schemeClr>
+            </a:gs>
+            <a:gs pos="50000">
+              <a:schemeClr val="phClr">
+                <a:lumMod val="105000"/>
+                <a:satMod val="103000"/>
+                <a:tint val="73000"/>
+              </a:schemeClr>
+            </a:gs>
+            <a:gs pos="100000">
+              <a:schemeClr val="phClr">
+                <a:lumMod val="105000"/>
+                <a:satMod val="109000"/>
+                <a:tint val="81000"/>
+              </a:schemeClr>
+            </a:gs>
+          </a:gsLst>
+          <a:lin ang="5400000" scaled="0"/>
+        </a:gradFill>
+        <a:gradFill rotWithShape="1">
+          <a:gsLst>
+            <a:gs pos="0">
+              <a:schemeClr val="phClr">
+                <a:satMod val="103000"/>
+                <a:lumMod val="102000"/>
+                <a:tint val="94000"/>
+              </a:schemeClr>
+            </a:gs>
+            <a:gs pos="50000">
+              <a:schemeClr val="phClr">
+                <a:satMod val="110000"/>
+                <a:lumMod val="100000"/>
+                <a:shade val="100000"/>
+              </a:schemeClr>
+            </a:gs>
+            <a:gs pos="100000">
+              <a:schemeClr val="phClr">
+                <a:lumMod val="99000"/>
+                <a:satMod val="120000"/>
+                <a:shade val="78000"/>
+              </a:schemeClr>
+            </a:gs>
+          </a:gsLst>
+          <a:lin ang="5400000" scaled="0"/>
+        </a:gradFill>
+      </a:fillStyleLst>
+      <a:lnStyleLst>
+        <a:ln w="6350" cap="flat" cmpd="sng" algn="ctr">
+          <a:solidFill>
+            <a:schemeClr val="phClr"/>
+          </a:solidFill>
+          <a:prstDash val="solid"/>
+          <a:miter lim="800000"/>
+        </a:ln>
+        <a:ln w="12700" cap="flat" cmpd="sng" algn="ctr">
+          <a:solidFill>
+            <a:schemeClr val="phClr"/>
+          </a:solidFill>
+          <a:prstDash val="solid"/>
+          <a:miter lim="800000"/>
+        </a:ln>
+        <a:ln w="19050" cap="flat" cmpd="sng" algn="ctr">
+          <a:solidFill>
+            <a:schemeClr val="phClr"/>
+          </a:solidFill>
+          <a:prstDash val="solid"/>
+          <a:miter lim="800000"/>
+        </a:ln>
+      </a:lnStyleLst>
+      <a:effectStyleLst>
+        <a:effectStyle>
+          <a:effectLst/>
+        </a:effectStyle>
+        <a:effectStyle>
+          <a:effectLst/>
+        </a:effectStyle>
+        <a:effectStyle>
+          <a:effectLst>
+            <a:outerShdw blurRad="57150" dist="19050" dir="5400000" algn="ctr" rotWithShape="0">
+              <a:srgbClr val="000000">
+                <a:alpha val="63000"/>
+              </a:srgbClr>
+            </a:outerShdw>
+          </a:effectLst>
+        </a:effectStyle>
+      </a:effectStyleLst>
+      <a:bgFillStyleLst>
+        <a:solidFill>
+          <a:schemeClr val="phClr"/>
+        </a:solidFill>
+        <a:solidFill>
+          <a:schemeClr val="phClr">
+            <a:tint val="95000"/>
+            <a:satMod val="170000"/>
+          </a:schemeClr>
+        </a:solidFill>
+        <a:gradFill rotWithShape="1">
+          <a:gsLst>
+            <a:gs pos="0">
+              <a:schemeClr val="phClr">
+                <a:tint val="93000"/>
+                <a:satMod val="150000"/>
+                <a:shade val="98000"/>
+                <a:lumMod val="102000"/>
+              </a:schemeClr>
+            </a:gs>
+            <a:gs pos="50000">
+              <a:schemeClr val="phClr">
+                <a:tint val="98000"/>
+                <a:satMod val="130000"/>
+                <a:shade val="90000"/>
+                <a:lumMod val="103000"/>
+              </a:schemeClr>
+            </a:gs>
+            <a:gs pos="100000">
+              <a:schemeClr val="phClr">
+                <a:shade val="63000"/>
+                <a:satMod val="120000"/>
+              </a:schemeClr>
+            </a:gs>
+          </a:gsLst>
+          <a:lin ang="5400000" scaled="0"/>
+        </a:gradFill>
+      </a:bgFillStyleLst>
+    </a:fmtScheme>
+  </a:themeElements>
+  <a:objectDefaults/>
+  <a:extraClrSchemeLst/>
+  <a:extLst>
+    <a:ext uri="{05A4C25C-085E-4340-85A3-A5531E510DB2}">
+      <thm15:themeFamily xmlns:thm15="http://schemas.microsoft.com/office/thememl/2012/main" name="Office Theme" id="{62F939B6-93AF-4DB8-9C6B-D6C7DFDC589F}" vid="{4A3C46E8-61CC-4603-A589-7422A47A8E4A}"/>
+    </a:ext>
+  </a:extLst>
+</a:theme>
+</file>
+
+<file path=customXml/item1.xml><?xml version="1.0" encoding="utf-8"?>
+<p:properties xmlns:p="http://schemas.microsoft.com/office/2006/metadata/properties" xmlns:xsi="http://www.w3.org/2001/XMLSchema-instance" xmlns:pc="http://schemas.microsoft.com/office/infopath/2007/PartnerControls">
+  <documentManagement/>
+</p:properties>
+</file>
+
+<file path=customXml/item2.xml><?xml version="1.0" encoding="utf-8"?>
+<?mso-contentType ?>
+<FormTemplates xmlns="http://schemas.microsoft.com/sharepoint/v3/contenttype/forms">
+  <Display>DocumentLibraryForm</Display>
+  <Edit>DocumentLibraryForm</Edit>
+  <New>DocumentLibraryForm</New>
+</FormTemplates>
+</file>
+
+<file path=customXml/item3.xml><?xml version="1.0" encoding="utf-8"?>
+<ct:contentTypeSchema xmlns:ct="http://schemas.microsoft.com/office/2006/metadata/contentType" xmlns:ma="http://schemas.microsoft.com/office/2006/metadata/properties/metaAttributes" ct:_="" ma:_="" ma:contentTypeName="Document" ma:contentTypeID="0x0101000D367A26A3A9FB46979047D8E7015C4A" ma:contentTypeVersion="10" ma:contentTypeDescription="Create a new document." ma:contentTypeScope="" ma:versionID="c397597226638140e4af44b18f66294f">
+  <xsd:schema xmlns:xsd="http://www.w3.org/2001/XMLSchema" xmlns:xs="http://www.w3.org/2001/XMLSchema" xmlns:p="http://schemas.microsoft.com/office/2006/metadata/properties" xmlns:ns3="50dc16db-6b20-4902-9ede-91f917c6298c" targetNamespace="http://schemas.microsoft.com/office/2006/metadata/properties" ma:root="true" ma:fieldsID="0462f3abd3eea1e9813070414a2ed6a7" ns3:_="">
+    <xsd:import namespace="50dc16db-6b20-4902-9ede-91f917c6298c"/>
+    <xsd:element name="properties">
+      <xsd:complexType>
+        <xsd:sequence>
+          <xsd:element name="documentManagement">
+            <xsd:complexType>
+              <xsd:all>
+                <xsd:element ref="ns3:MediaServiceMetadata" minOccurs="0"/>
+                <xsd:element ref="ns3:MediaServiceFastMetadata" minOccurs="0"/>
+                <xsd:element ref="ns3:MediaServiceAutoKeyPoints" minOccurs="0"/>
+                <xsd:element ref="ns3:MediaServiceKeyPoints" minOccurs="0"/>
+                <xsd:element ref="ns3:MediaServiceDateTaken" minOccurs="0"/>
+                <xsd:element ref="ns3:MediaServiceAutoTags" minOccurs="0"/>
+                <xsd:element ref="ns3:MediaServiceLocation" minOccurs="0"/>
+                <xsd:element ref="ns3:MediaServiceGenerationTime" minOccurs="0"/>
+                <xsd:element ref="ns3:MediaServiceEventHashCode" minOccurs="0"/>
+                <xsd:element ref="ns3:MediaServiceOCR" minOccurs="0"/>
+              </xsd:all>
+            </xsd:complexType>
+          </xsd:element>
+        </xsd:sequence>
+      </xsd:complexType>
+    </xsd:element>
+  </xsd:schema>
+  <xsd:schema xmlns:xsd="http://www.w3.org/2001/XMLSchema" xmlns:xs="http://www.w3.org/2001/XMLSchema" xmlns:dms="http://schemas.microsoft.com/office/2006/documentManagement/types" xmlns:pc="http://schemas.microsoft.com/office/infopath/2007/PartnerControls" targetNamespace="50dc16db-6b20-4902-9ede-91f917c6298c" elementFormDefault="qualified">
+    <xsd:import namespace="http://schemas.microsoft.com/office/2006/documentManagement/types"/>
+    <xsd:import namespace="http://schemas.microsoft.com/office/infopath/2007/PartnerControls"/>
+    <xsd:element name="MediaServiceMetadata" ma:index="8" nillable="true" ma:displayName="MediaServiceMetadata" ma:hidden="true" ma:internalName="MediaServiceMetadata" ma:readOnly="true">
+      <xsd:simpleType>
+        <xsd:restriction base="dms:Note"/>
+      </xsd:simpleType>
+    </xsd:element>
+    <xsd:element name="MediaServiceFastMetadata" ma:index="9" nillable="true" ma:displayName="MediaServiceFastMetadata" ma:hidden="true" ma:internalName="MediaServiceFastMetadata" ma:readOnly="true">
+      <xsd:simpleType>
+        <xsd:restriction base="dms:Note"/>
+      </xsd:simpleType>
+    </xsd:element>
+    <xsd:element name="MediaServiceAutoKeyPoints" ma:index="10" nillable="true" ma:displayName="MediaServiceAutoKeyPoints" ma:hidden="true" ma:internalName="MediaServiceAutoKeyPoints" ma:readOnly="true">
+      <xsd:simpleType>
+        <xsd:restriction base="dms:Note"/>
+      </xsd:simpleType>
+    </xsd:element>
+    <xsd:element name="MediaServiceKeyPoints" ma:index="11" nillable="true" ma:displayName="KeyPoints" ma:internalName="MediaServiceKeyPoints" ma:readOnly="true">
+      <xsd:simpleType>
+        <xsd:restriction base="dms:Note">
+          <xsd:maxLength value="255"/>
+        </xsd:restriction>
+      </xsd:simpleType>
+    </xsd:element>
+    <xsd:element name="MediaServiceDateTaken" ma:index="12" nillable="true" ma:displayName="MediaServiceDateTaken" ma:hidden="true" ma:internalName="MediaServiceDateTaken" ma:readOnly="true">
+      <xsd:simpleType>
+        <xsd:restriction base="dms:Text"/>
+      </xsd:simpleType>
+    </xsd:element>
+    <xsd:element name="MediaServiceAutoTags" ma:index="13" nillable="true" ma:displayName="Tags" ma:internalName="MediaServiceAutoTags" ma:readOnly="true">
+      <xsd:simpleType>
+        <xsd:restriction base="dms:Text"/>
+      </xsd:simpleType>
+    </xsd:element>
+    <xsd:element name="MediaServiceLocation" ma:index="14" nillable="true" ma:displayName="Location" ma:internalName="MediaServiceLocation" ma:readOnly="true">
+      <xsd:simpleType>
+        <xsd:restriction base="dms:Text"/>
+      </xsd:simpleType>
+    </xsd:element>
+    <xsd:element name="MediaServiceGenerationTime" ma:index="15" nillable="true" ma:displayName="MediaServiceGenerationTime" ma:hidden="true" ma:internalName="MediaServiceGenerationTime" ma:readOnly="true">
+      <xsd:simpleType>
+        <xsd:restriction base="dms:Text"/>
+      </xsd:simpleType>
+    </xsd:element>
+    <xsd:element name="MediaServiceEventHashCode" ma:index="16" nillable="true" ma:displayName="MediaServiceEventHashCode" ma:hidden="true" ma:internalName="MediaServiceEventHashCode" ma:readOnly="true">
+      <xsd:simpleType>
+        <xsd:restriction base="dms:Text"/>
+      </xsd:simpleType>
+    </xsd:element>
+    <xsd:element name="MediaServiceOCR" ma:index="17" nillable="true" ma:displayName="Extracted Text" ma:internalName="MediaServiceOCR" ma:readOnly="true">
+      <xsd:simpleType>
+        <xsd:restriction base="dms:Note">
+          <xsd:maxLength value="255"/>
+        </xsd:restriction>
+      </xsd:simpleType>
+    </xsd:element>
+  </xsd:schema>
+  <xsd:schema xmlns="http://schemas.openxmlformats.org/package/2006/metadata/core-properties" xmlns:xsd="http://www.w3.org/2001/XMLSchema" xmlns:xsi="http://www.w3.org/2001/XMLSchema-instance" xmlns:dc="http://purl.org/dc/elements/1.1/" xmlns:dcterms="http://purl.org/dc/terms/" xmlns:odoc="http://schemas.microsoft.com/internal/obd" targetNamespace="http://schemas.openxmlformats.org/package/2006/metadata/core-properties" elementFormDefault="qualified" attributeFormDefault="unqualified" blockDefault="#all">
+    <xsd:import namespace="http://purl.org/dc/elements/1.1/" schemaLocation="http://dublincore.org/schemas/xmls/qdc/2003/04/02/dc.xsd"/>
+    <xsd:import namespace="http://purl.org/dc/terms/" schemaLocation="http://dublincore.org/schemas/xmls/qdc/2003/04/02/dcterms.xsd"/>
+    <xsd:element name="coreProperties" type="CT_coreProperties"/>
+    <xsd:complexType name="CT_coreProperties">
+      <xsd:all>
+        <xsd:element ref="dc:creator" minOccurs="0" maxOccurs="1"/>
+        <xsd:element ref="dcterms:created" minOccurs="0" maxOccurs="1"/>
+        <xsd:element ref="dc:identifier" minOccurs="0" maxOccurs="1"/>
+        <xsd:element name="contentType" minOccurs="0" maxOccurs="1" type="xsd:string" ma:index="0" ma:displayName="Content Type"/>
+        <xsd:element ref="dc:title" minOccurs="0" maxOccurs="1" ma:index="4" ma:displayName="Title"/>
+        <xsd:element ref="dc:subject" minOccurs="0" maxOccurs="1"/>
+        <xsd:element ref="dc:description" minOccurs="0" maxOccurs="1"/>
+        <xsd:element name="keywords" minOccurs="0" maxOccurs="1" type="xsd:string"/>
+        <xsd:element ref="dc:language" minOccurs="0" maxOccurs="1"/>
+        <xsd:element name="category" minOccurs="0" maxOccurs="1" type="xsd:string"/>
+        <xsd:element name="version" minOccurs="0" maxOccurs="1" type="xsd:string"/>
+        <xsd:element name="revision" minOccurs="0" maxOccurs="1" type="xsd:string">
+          <xsd:annotation>
+            <xsd:documentation>
+                        This value indicates the number of saves or revisions. The application is responsible for updating this value after each revision.
+                    </xsd:documentation>
+          </xsd:annotation>
+        </xsd:element>
+        <xsd:element name="lastModifiedBy" minOccurs="0" maxOccurs="1" type="xsd:string"/>
+        <xsd:element ref="dcterms:modified" minOccurs="0" maxOccurs="1"/>
+        <xsd:element name="contentStatus" minOccurs="0" maxOccurs="1" type="xsd:string"/>
+      </xsd:all>
+    </xsd:complexType>
+  </xsd:schema>
+  <xs:schema xmlns:pc="http://schemas.microsoft.com/office/infopath/2007/PartnerControls" xmlns:xs="http://www.w3.org/2001/XMLSchema" targetNamespace="http://schemas.microsoft.com/office/infopath/2007/PartnerControls" elementFormDefault="qualified" attributeFormDefault="unqualified">
+    <xs:element name="Person">
+      <xs:complexType>
+        <xs:sequence>
+          <xs:element ref="pc:DisplayName" minOccurs="0"/>
+          <xs:element ref="pc:AccountId" minOccurs="0"/>
+          <xs:element ref="pc:AccountType" minOccurs="0"/>
+        </xs:sequence>
+      </xs:complexType>
+    </xs:element>
+    <xs:element name="DisplayName" type="xs:string"/>
+    <xs:element name="AccountId" type="xs:string"/>
+    <xs:element name="AccountType" type="xs:string"/>
+    <xs:element name="BDCAssociatedEntity">
+      <xs:complexType>
+        <xs:sequence>
+          <xs:element ref="pc:BDCEntity" minOccurs="0" maxOccurs="unbounded"/>
+        </xs:sequence>
+        <xs:attribute ref="pc:EntityNamespace"/>
+        <xs:attribute ref="pc:EntityName"/>
+        <xs:attribute ref="pc:SystemInstanceName"/>
+        <xs:attribute ref="pc:AssociationName"/>
+      </xs:complexType>
+    </xs:element>
+    <xs:attribute name="EntityNamespace" type="xs:string"/>
+    <xs:attribute name="EntityName" type="xs:string"/>
+    <xs:attribute name="SystemInstanceName" type="xs:string"/>
+    <xs:attribute name="AssociationName" type="xs:string"/>
+    <xs:element name="BDCEntity">
+      <xs:complexType>
+        <xs:sequence>
+          <xs:element ref="pc:EntityDisplayName" minOccurs="0"/>
+          <xs:element ref="pc:EntityInstanceReference" minOccurs="0"/>
+          <xs:element ref="pc:EntityId1" minOccurs="0"/>
+          <xs:element ref="pc:EntityId2" minOccurs="0"/>
+          <xs:element ref="pc:EntityId3" minOccurs="0"/>
+          <xs:element ref="pc:EntityId4" minOccurs="0"/>
+          <xs:element ref="pc:EntityId5" minOccurs="0"/>
+        </xs:sequence>
+      </xs:complexType>
+    </xs:element>
+    <xs:element name="EntityDisplayName" type="xs:string"/>
+    <xs:element name="EntityInstanceReference" type="xs:string"/>
+    <xs:element name="EntityId1" type="xs:string"/>
+    <xs:element name="EntityId2" type="xs:string"/>
+    <xs:element name="EntityId3" type="xs:string"/>
+    <xs:element name="EntityId4" type="xs:string"/>
+    <xs:element name="EntityId5" type="xs:string"/>
+    <xs:element name="Terms">
+      <xs:complexType>
+        <xs:sequence>
+          <xs:element ref="pc:TermInfo" minOccurs="0" maxOccurs="unbounded"/>
+        </xs:sequence>
+      </xs:complexType>
+    </xs:element>
+    <xs:element name="TermInfo">
+      <xs:complexType>
+        <xs:sequence>
+          <xs:element ref="pc:TermName" minOccurs="0"/>
+          <xs:element ref="pc:TermId" minOccurs="0"/>
+        </xs:sequence>
+      </xs:complexType>
+    </xs:element>
+    <xs:element name="TermName" type="xs:string"/>
+    <xs:element name="TermId" type="xs:string"/>
+  </xs:schema>
+</ct:contentTypeSchema>
+</file>
+
+<file path=customXml/itemProps1.xml><?xml version="1.0" encoding="utf-8"?>
+<ds:datastoreItem xmlns:ds="http://schemas.openxmlformats.org/officeDocument/2006/customXml" ds:itemID="{6AD64A10-03A4-4AC2-ACF2-88CB41C745B8}">
+  <ds:schemaRefs>
+    <ds:schemaRef ds:uri="http://purl.org/dc/terms/"/>
+    <ds:schemaRef ds:uri="http://schemas.openxmlformats.org/package/2006/metadata/core-properties"/>
+    <ds:schemaRef ds:uri="http://purl.org/dc/dcmitype/"/>
+    <ds:schemaRef ds:uri="http://schemas.microsoft.com/office/infopath/2007/PartnerControls"/>
+    <ds:schemaRef ds:uri="http://purl.org/dc/elements/1.1/"/>
+    <ds:schemaRef ds:uri="http://schemas.microsoft.com/office/2006/metadata/properties"/>
+    <ds:schemaRef ds:uri="http://schemas.microsoft.com/office/2006/documentManagement/types"/>
+    <ds:schemaRef ds:uri="50dc16db-6b20-4902-9ede-91f917c6298c"/>
+    <ds:schemaRef ds:uri="http://www.w3.org/XML/1998/namespace"/>
+  </ds:schemaRefs>
+</ds:datastoreItem>
+</file>
+
+<file path=customXml/itemProps2.xml><?xml version="1.0" encoding="utf-8"?>
+<ds:datastoreItem xmlns:ds="http://schemas.openxmlformats.org/officeDocument/2006/customXml" ds:itemID="{68874924-E022-4341-86FC-EBF1CA2D2805}">
+  <ds:schemaRefs>
+    <ds:schemaRef ds:uri="http://schemas.microsoft.com/sharepoint/v3/contenttype/forms"/>
+  </ds:schemaRefs>
+</ds:datastoreItem>
+</file>
+
+<file path=customXml/itemProps3.xml><?xml version="1.0" encoding="utf-8"?>
+<ds:datastoreItem xmlns:ds="http://schemas.openxmlformats.org/officeDocument/2006/customXml" ds:itemID="{E178E161-0FE1-4233-B02F-9227385D2E82}">
+  <ds:schemaRefs>
+    <ds:schemaRef ds:uri="http://schemas.microsoft.com/office/2006/metadata/contentType"/>
+    <ds:schemaRef ds:uri="http://schemas.microsoft.com/office/2006/metadata/properties/metaAttributes"/>
+    <ds:schemaRef ds:uri="http://www.w3.org/2001/XMLSchema"/>
+    <ds:schemaRef ds:uri="http://schemas.microsoft.com/office/2006/metadata/properties"/>
+    <ds:schemaRef ds:uri="50dc16db-6b20-4902-9ede-91f917c6298c"/>
+    <ds:schemaRef ds:uri="http://schemas.microsoft.com/office/2006/documentManagement/types"/>
+    <ds:schemaRef ds:uri="http://schemas.microsoft.com/office/infopath/2007/PartnerControls"/>
+    <ds:schemaRef ds:uri="http://schemas.openxmlformats.org/package/2006/metadata/core-properties"/>
+    <ds:schemaRef ds:uri="http://purl.org/dc/elements/1.1/"/>
+    <ds:schemaRef ds:uri="http://purl.org/dc/terms/"/>
+    <ds:schemaRef ds:uri="http://schemas.microsoft.com/internal/obd"/>
+  </ds:schemaRefs>
+</ds:datastoreItem>
 </file>
</xml_diff>